<commit_message>
aave protocol notes updated
</commit_message>
<xml_diff>
--- a/protocols/uniswap/uniswap_v2.pptx
+++ b/protocols/uniswap/uniswap_v2.pptx
@@ -5,12 +5,18 @@
     <p:sldMasterId id="2147483648" r:id="rId1"/>
   </p:sldMasterIdLst>
   <p:notesMasterIdLst>
-    <p:notesMasterId r:id="rId5"/>
+    <p:notesMasterId r:id="rId11"/>
   </p:notesMasterIdLst>
   <p:sldIdLst>
-    <p:sldId id="256" r:id="rId2"/>
-    <p:sldId id="257" r:id="rId3"/>
-    <p:sldId id="258" r:id="rId4"/>
+    <p:sldId id="261" r:id="rId2"/>
+    <p:sldId id="256" r:id="rId3"/>
+    <p:sldId id="257" r:id="rId4"/>
+    <p:sldId id="258" r:id="rId5"/>
+    <p:sldId id="262" r:id="rId6"/>
+    <p:sldId id="259" r:id="rId7"/>
+    <p:sldId id="263" r:id="rId8"/>
+    <p:sldId id="264" r:id="rId9"/>
+    <p:sldId id="260" r:id="rId10"/>
   </p:sldIdLst>
   <p:sldSz cx="12192000" cy="6858000"/>
   <p:notesSz cx="6858000" cy="9144000"/>
@@ -5638,6 +5644,230 @@
 </inkml:ink>
 </file>
 
+<file path=ppt/ink/ink282.xml><?xml version="1.0" encoding="utf-8"?>
+<inkml:ink xmlns:inkml="http://www.w3.org/2003/InkML">
+  <inkml:definitions>
+    <inkml:context xml:id="ctx0">
+      <inkml:inkSource xml:id="inkSrc0">
+        <inkml:traceFormat>
+          <inkml:channel name="X" type="integer" min="-2.14748E9" max="2.14748E9" units="cm"/>
+          <inkml:channel name="Y" type="integer" min="-2.14748E9" max="2.14748E9" units="cm"/>
+          <inkml:channel name="F" type="integer" max="32767" units="dev"/>
+        </inkml:traceFormat>
+        <inkml:channelProperties>
+          <inkml:channelProperty channel="X" name="resolution" value="1000" units="1/cm"/>
+          <inkml:channelProperty channel="Y" name="resolution" value="1000" units="1/cm"/>
+          <inkml:channelProperty channel="F" name="resolution" value="0" units="1/dev"/>
+        </inkml:channelProperties>
+      </inkml:inkSource>
+      <inkml:timestamp xml:id="ts0" timeString="2022-07-22T11:59:14.119"/>
+    </inkml:context>
+    <inkml:brush xml:id="br0">
+      <inkml:brushProperty name="width" value="0.025" units="cm"/>
+      <inkml:brushProperty name="height" value="0.025" units="cm"/>
+      <inkml:brushProperty name="color" value="#F6630D"/>
+    </inkml:brush>
+  </inkml:definitions>
+  <inkml:trace contextRef="#ctx0" brushRef="#br0">0 1231 24575,'28'0'0,"30"0"0,-5 0 0,7 0 0,25-3 0,7-4 0,-14-2 0,4-4 0,2-5-888,6-5 1,2-5 0,1-4 887,-21 4 0,1-4 0,-1-2 0,0-1 0,0-2 0,0-3 0,0 0 0,0 1-214,0 0 1,1 0 0,0 1 0,1 2 213,-1 0 0,1 2 0,0 1 0,1 1 0,1 3 0,0 1 0,1 1 0,-1 2 0,-2 2 0,-1 2 0,-1 0 0,-1 2-180,17-3 1,-3 1-1,-1 3 180,-10 3 0,-2 3 0,-3 1 0,16 1 0,-6 3 0,-13 3 0,-5 2 1808,31 2-1808,-27 0 1595,-17 0-1595,-19 0 651,22 0-651,0-2 0,10-2 0,6-2 0,8-3 0,8-1-700,-11 1 0,6 0 1,4-1-1,2-1 1,2 1 699,-1 0 0,2 0 0,2 1 0,2-1 0,1 0 0,1 1-601,-5 2 0,2-1 0,0 0 0,2 1 0,0 1 1,1-1-1,-1 2 601,3 0 0,1 0 0,0 1 0,1 0 0,-1 1 0,-2 1 0,-1 1 0,7 1 0,0 1 0,-2 0 0,-2 2 0,-1 0 0,-2 2-236,7 0 0,-2 2 1,-2 1-1,-3 0 1,-5 2 235,1 1 0,-3 1 0,-5 1 0,-5 1 0,-5 2 0,-5 0 0,-7-1 0,-5 1 0,-4-3 2389,38-4-2389,-29-7 0,11-3 0,-4 2 0,8-1 0,7 0 0,3-1 202,4 1 0,5 0 0,4 0 0,3 0 0,2 0-202,-17 0 0,2 0 0,3 0 0,0 0 0,2 0 0,1 0 0,0 2-266,-6-1 0,2 1 0,1 0 0,1 0 0,0 1 0,-1 1 0,0 1 1,-1 0 265,8 2 0,-1 0 0,1 1 0,-2 1 0,0 2 0,-2 1 0,0 1 0,-5 2 0,0 1 0,-1 1 0,-1 1 0,-2 3 0,-1 0 0,-2 3 0,4 3 0,-2 2 0,-1 3 0,-2 1 0,-3 0 0,-2 2-317,2 4 0,-2 1 0,-3 2 0,-3 0 0,-2-1 317,4 7 0,-2 0 0,-4-1 0,-4-1 0,3 2 0,-4-2 0,-8-4 0,-7-6 0,-8-1 2704,8 42-2704,-37-27 0,-3 9 0,7 8 0,2 10 0,1 2 691,-1-7 1,0 4 0,1 0 0,1 1-692,1 4 0,0 1 0,1-1 0,-1-1 0,4 20 0,-1-3 0,-1-4 0,-5-20 0,-2-4 0,2-3 1176,6 16 1,3-7-1177,3-17 0,6-6 0,5-6 0,6-5 0,5-3 0,3-5 0,-2-3 0,0-4 0,34 18 1371,-23-11-1371,-22-2 0,-11 2 0,-6 5 0,3 7 0,1 3 0,2-3 0,5 1 0,1 0 0,5 4 0,-1 6 0,-4 6 0,-4 4 0,-7 5 0,-3 6 0,-5 4 0,1 3 0,1-1 0,2-6 0,3-7 0,3-7 0,4-4 0,4-1 0,0-4 0,-4-6 0,-6-8 0,-4-7 0,-3-4 0,0-3 0,-1-2 0,0-2 0,0-2 0,-1 0 0,0 2 0,-1 4 0,-3 1 0,-2 2 0,-2 2 0,0 3 0,3 4 0,-2-1 0,1-6 0,-2-8 0,-3-5 0,0-4 0,-2 3 0,0 4 0,0 4 0,0 0 0,0-5 0,0-6 0,0-6 0,0-3 0,0 1 0,0 3 0,0 4 0,0 4 0,0 3 0,0 0 0,0-7 0,0 0 0,0-6 0,0 4 0,0-6 0,0 2 0</inkml:trace>
+</inkml:ink>
+</file>
+
+<file path=ppt/ink/ink283.xml><?xml version="1.0" encoding="utf-8"?>
+<inkml:ink xmlns:inkml="http://www.w3.org/2003/InkML">
+  <inkml:definitions>
+    <inkml:context xml:id="ctx0">
+      <inkml:inkSource xml:id="inkSrc0">
+        <inkml:traceFormat>
+          <inkml:channel name="X" type="integer" min="-2.14748E9" max="2.14748E9" units="cm"/>
+          <inkml:channel name="Y" type="integer" min="-2.14748E9" max="2.14748E9" units="cm"/>
+          <inkml:channel name="F" type="integer" max="32767" units="dev"/>
+        </inkml:traceFormat>
+        <inkml:channelProperties>
+          <inkml:channelProperty channel="X" name="resolution" value="1000" units="1/cm"/>
+          <inkml:channelProperty channel="Y" name="resolution" value="1000" units="1/cm"/>
+          <inkml:channelProperty channel="F" name="resolution" value="0" units="1/dev"/>
+        </inkml:channelProperties>
+      </inkml:inkSource>
+      <inkml:timestamp xml:id="ts0" timeString="2022-07-22T11:59:38.286"/>
+    </inkml:context>
+    <inkml:brush xml:id="br0">
+      <inkml:brushProperty name="width" value="0.04286" units="cm"/>
+      <inkml:brushProperty name="height" value="0.04286" units="cm"/>
+      <inkml:brushProperty name="color" value="#F6630D"/>
+    </inkml:brush>
+  </inkml:definitions>
+  <inkml:trace contextRef="#ctx0" brushRef="#br0">0 3 25701,'39'-3'1310,"-5"13"-962,-21 32-213,-1 9-68,-1 5-67,-1 5-67,-2-1-494,-1-2-749,-2-7-865,1-12-1466,1-12-6190,2-14 8784,-1-24 1,-2 7-1,-4-13 1</inkml:trace>
+</inkml:ink>
+</file>
+
+<file path=ppt/ink/ink284.xml><?xml version="1.0" encoding="utf-8"?>
+<inkml:ink xmlns:inkml="http://www.w3.org/2003/InkML">
+  <inkml:definitions>
+    <inkml:context xml:id="ctx0">
+      <inkml:inkSource xml:id="inkSrc0">
+        <inkml:traceFormat>
+          <inkml:channel name="X" type="integer" min="-2.14748E9" max="2.14748E9" units="cm"/>
+          <inkml:channel name="Y" type="integer" min="-2.14748E9" max="2.14748E9" units="cm"/>
+          <inkml:channel name="F" type="integer" max="32767" units="dev"/>
+        </inkml:traceFormat>
+        <inkml:channelProperties>
+          <inkml:channelProperty channel="X" name="resolution" value="1000" units="1/cm"/>
+          <inkml:channelProperty channel="Y" name="resolution" value="1000" units="1/cm"/>
+          <inkml:channelProperty channel="F" name="resolution" value="0" units="1/dev"/>
+        </inkml:channelProperties>
+      </inkml:inkSource>
+      <inkml:timestamp xml:id="ts0" timeString="2022-07-22T11:59:38.523"/>
+    </inkml:context>
+    <inkml:brush xml:id="br0">
+      <inkml:brushProperty name="width" value="0.04286" units="cm"/>
+      <inkml:brushProperty name="height" value="0.04286" units="cm"/>
+      <inkml:brushProperty name="color" value="#F6630D"/>
+    </inkml:brush>
+  </inkml:definitions>
+  <inkml:trace contextRef="#ctx0" brushRef="#br0">1 1 25174,'11'50'801,"0"1"0,11 40-554,-3-35-79,-2-1-134,1 0-34,-2-1-56,-2-3-639,-1-7-885,-3-7-1110,-5-10-2083,-2-8-4896,-3-9 9669,-10-5 0,8-4 0,-8-1 0</inkml:trace>
+</inkml:ink>
+</file>
+
+<file path=ppt/ink/ink285.xml><?xml version="1.0" encoding="utf-8"?>
+<inkml:ink xmlns:inkml="http://www.w3.org/2003/InkML">
+  <inkml:definitions>
+    <inkml:context xml:id="ctx0">
+      <inkml:inkSource xml:id="inkSrc0">
+        <inkml:traceFormat>
+          <inkml:channel name="X" type="integer" min="-2.14748E9" max="2.14748E9" units="cm"/>
+          <inkml:channel name="Y" type="integer" min="-2.14748E9" max="2.14748E9" units="cm"/>
+          <inkml:channel name="F" type="integer" max="32767" units="dev"/>
+        </inkml:traceFormat>
+        <inkml:channelProperties>
+          <inkml:channelProperty channel="X" name="resolution" value="1000" units="1/cm"/>
+          <inkml:channelProperty channel="Y" name="resolution" value="1000" units="1/cm"/>
+          <inkml:channelProperty channel="F" name="resolution" value="0" units="1/dev"/>
+        </inkml:channelProperties>
+      </inkml:inkSource>
+      <inkml:timestamp xml:id="ts0" timeString="2022-07-22T11:59:38.725"/>
+    </inkml:context>
+    <inkml:brush xml:id="br0">
+      <inkml:brushProperty name="width" value="0.04286" units="cm"/>
+      <inkml:brushProperty name="height" value="0.04286" units="cm"/>
+      <inkml:brushProperty name="color" value="#F6630D"/>
+    </inkml:brush>
+  </inkml:definitions>
+  <inkml:trace contextRef="#ctx0" brushRef="#br0">0 288 26261,'32'-42'95,"0"0"0,36-30-95,5 43-112,1 2-571,-2 4-953,-5 3-2051,-7 6-2296,-6 3 5983,-9 6 0,-20 2 0,-9 3 0</inkml:trace>
+</inkml:ink>
+</file>
+
+<file path=ppt/ink/ink286.xml><?xml version="1.0" encoding="utf-8"?>
+<inkml:ink xmlns:inkml="http://www.w3.org/2003/InkML">
+  <inkml:definitions>
+    <inkml:context xml:id="ctx0">
+      <inkml:inkSource xml:id="inkSrc0">
+        <inkml:traceFormat>
+          <inkml:channel name="X" type="integer" min="-2.14748E9" max="2.14748E9" units="cm"/>
+          <inkml:channel name="Y" type="integer" min="-2.14748E9" max="2.14748E9" units="cm"/>
+          <inkml:channel name="F" type="integer" max="32767" units="dev"/>
+        </inkml:traceFormat>
+        <inkml:channelProperties>
+          <inkml:channelProperty channel="X" name="resolution" value="1000" units="1/cm"/>
+          <inkml:channelProperty channel="Y" name="resolution" value="1000" units="1/cm"/>
+          <inkml:channelProperty channel="F" name="resolution" value="0" units="1/dev"/>
+        </inkml:channelProperties>
+      </inkml:inkSource>
+      <inkml:timestamp xml:id="ts0" timeString="2022-07-22T11:59:39.475"/>
+    </inkml:context>
+    <inkml:brush xml:id="br0">
+      <inkml:brushProperty name="width" value="0.04286" units="cm"/>
+      <inkml:brushProperty name="height" value="0.04286" units="cm"/>
+      <inkml:brushProperty name="color" value="#F6630D"/>
+    </inkml:brush>
+  </inkml:definitions>
+  <inkml:trace contextRef="#ctx0" brushRef="#br0">21 209 18686,'-12'3'1603,"4"0"-1626,8-3-33,51-27-257,-31 12 234,39-21 79,-46 19 11,-7 3-11,-3 1-22,-3 4 22,-4 2 134,-5 3 180,-7 2 78,-7 2 213,-1 2 157,1 4-292,5 4 147,5 5-135,5 4-68,4 4 12,2 1-146,2 2-156,6-2-68,5-2-56,8-3 56,2-7-56,2-1 0,6-7-79,-9-1-10,4-7 44,-11-5 22,0-8-55,-1-4 78,-2-6 45,1 1 0,-2-3-1,2 1 360,4-11-12,-3 14 191,2-4-180,-6 19-257,-3 3-12,-2 5-123,2 2 146,-2 9-157,1 6 78,1 13-33,-1 19 1,2-12-92,-2 7-10,3-25 23,-1-7 33,3-6 33,4-6 46,5-11-68,19-26-11,-7 3 0,11-15 23,-18 21 10,-5 7-21,-6 7 21,-5 7-33,-3 5-56,-3 3-23,2 2 79,-1 8-22,1 5-45,-1 9-247,0 2-425,0-2-494,1-4-728,1-6-862,0-5-673,5-5 3496,8-7 0,-9 3 0,5-4 0</inkml:trace>
+</inkml:ink>
+</file>
+
+<file path=ppt/ink/ink287.xml><?xml version="1.0" encoding="utf-8"?>
+<inkml:ink xmlns:inkml="http://www.w3.org/2003/InkML">
+  <inkml:definitions>
+    <inkml:context xml:id="ctx0">
+      <inkml:inkSource xml:id="inkSrc0">
+        <inkml:traceFormat>
+          <inkml:channel name="X" type="integer" min="-2.14748E9" max="2.14748E9" units="cm"/>
+          <inkml:channel name="Y" type="integer" min="-2.14748E9" max="2.14748E9" units="cm"/>
+          <inkml:channel name="F" type="integer" max="32767" units="dev"/>
+        </inkml:traceFormat>
+        <inkml:channelProperties>
+          <inkml:channelProperty channel="X" name="resolution" value="1000" units="1/cm"/>
+          <inkml:channelProperty channel="Y" name="resolution" value="1000" units="1/cm"/>
+          <inkml:channelProperty channel="F" name="resolution" value="0" units="1/dev"/>
+        </inkml:channelProperties>
+      </inkml:inkSource>
+      <inkml:timestamp xml:id="ts0" timeString="2022-07-22T11:59:39.838"/>
+    </inkml:context>
+    <inkml:brush xml:id="br0">
+      <inkml:brushProperty name="width" value="0.04286" units="cm"/>
+      <inkml:brushProperty name="height" value="0.04286" units="cm"/>
+      <inkml:brushProperty name="color" value="#F6630D"/>
+    </inkml:brush>
+  </inkml:definitions>
+  <inkml:trace contextRef="#ctx0" brushRef="#br0">95 52 12333,'0'-4'3552,"0"1"-2857,0 3 1266,0 0-1211,0-20 68,0 15-168,-5-14 11,-3 19 45,-7 3 135,-2 7-113,-2 8-78,5 7 67,4 4-100,5 1-80,3-1-257,2-1-11,7-4-135,5-4 12,22-7-146,-4-6-235,14-8-840,-10-9-708,-3-3-1645,-4-4-1088,-7 1-3842,-6 2 8358,-4-1 0,-6 8 0,-1 1 0</inkml:trace>
+</inkml:ink>
+</file>
+
+<file path=ppt/ink/ink288.xml><?xml version="1.0" encoding="utf-8"?>
+<inkml:ink xmlns:inkml="http://www.w3.org/2003/InkML">
+  <inkml:definitions>
+    <inkml:context xml:id="ctx0">
+      <inkml:inkSource xml:id="inkSrc0">
+        <inkml:traceFormat>
+          <inkml:channel name="X" type="integer" min="-2.14748E9" max="2.14748E9" units="cm"/>
+          <inkml:channel name="Y" type="integer" min="-2.14748E9" max="2.14748E9" units="cm"/>
+          <inkml:channel name="F" type="integer" max="32767" units="dev"/>
+        </inkml:traceFormat>
+        <inkml:channelProperties>
+          <inkml:channelProperty channel="X" name="resolution" value="1000" units="1/cm"/>
+          <inkml:channelProperty channel="Y" name="resolution" value="1000" units="1/cm"/>
+          <inkml:channelProperty channel="F" name="resolution" value="0" units="1/dev"/>
+        </inkml:channelProperties>
+      </inkml:inkSource>
+      <inkml:timestamp xml:id="ts0" timeString="2022-07-22T11:59:40.143"/>
+    </inkml:context>
+    <inkml:brush xml:id="br0">
+      <inkml:brushProperty name="width" value="0.04286" units="cm"/>
+      <inkml:brushProperty name="height" value="0.04286" units="cm"/>
+      <inkml:brushProperty name="color" value="#F6630D"/>
+    </inkml:brush>
+  </inkml:definitions>
+  <inkml:trace contextRef="#ctx0" brushRef="#br0">54 153 21577,'57'-65'79,"-11"11"-214,-44 43 135,-1 0-67,-6 5 67,-6 2 101,-8 3 235,-6 2 168,-2 9 113,1 3-125,5 10-44,7 2 79,6 1-11,5 4-24,3-2-256,7 2-56,5-5-169,12-1-11,5-9 0,5-6-404,1-5-660,4-4-594,2-9-461,4-3-3315,1-10 5434,-3-1 0,-19 9 0,-7 3 0</inkml:trace>
+</inkml:ink>
+</file>
+
+<file path=ppt/ink/ink289.xml><?xml version="1.0" encoding="utf-8"?>
+<inkml:ink xmlns:inkml="http://www.w3.org/2003/InkML">
+  <inkml:definitions>
+    <inkml:context xml:id="ctx0">
+      <inkml:inkSource xml:id="inkSrc0">
+        <inkml:traceFormat>
+          <inkml:channel name="X" type="integer" min="-2.14748E9" max="2.14748E9" units="cm"/>
+          <inkml:channel name="Y" type="integer" min="-2.14748E9" max="2.14748E9" units="cm"/>
+          <inkml:channel name="F" type="integer" max="32767" units="dev"/>
+        </inkml:traceFormat>
+        <inkml:channelProperties>
+          <inkml:channelProperty channel="X" name="resolution" value="1000" units="1/cm"/>
+          <inkml:channelProperty channel="Y" name="resolution" value="1000" units="1/cm"/>
+          <inkml:channelProperty channel="F" name="resolution" value="0" units="1/dev"/>
+        </inkml:channelProperties>
+      </inkml:inkSource>
+      <inkml:timestamp xml:id="ts0" timeString="2022-07-22T11:59:40.870"/>
+    </inkml:context>
+    <inkml:brush xml:id="br0">
+      <inkml:brushProperty name="width" value="0.04286" units="cm"/>
+      <inkml:brushProperty name="height" value="0.04286" units="cm"/>
+      <inkml:brushProperty name="color" value="#F6630D"/>
+    </inkml:brush>
+  </inkml:definitions>
+  <inkml:trace contextRef="#ctx0" brushRef="#br0">3 272 20345,'-2'-10'4067,"1"2"-3540,24 64-57,-7-16-302,17 50-168,-13-30 46,-3 1-46,-5-7-24,-3-10-132,-6-12 21,-1-15 102,-2-9-68,-6-13 78,-5-12 1,-8-16-101,1-18 22,3-13-3291,7-10 3414,4-6-1281,4 0 1584,0 5 123,8 8 68,4 10-147,8 12-66,4 11 2594,1 11-2807,1 12-34,5 13-56,-11 17 1967,-2 15-1967,-14 18-89,-13 9-539,-9 8-1227,-3-19 1,-1-1-2258,-12 24-4438,-2 10 8550,25-46 0,7-18 0,4-12 0</inkml:trace>
+</inkml:ink>
+</file>
+
 <file path=ppt/ink/ink29.xml><?xml version="1.0" encoding="utf-8"?>
 <inkml:ink xmlns:inkml="http://www.w3.org/2003/InkML">
   <inkml:definitions>
@@ -5665,6 +5895,286 @@
 </inkml:ink>
 </file>
 
+<file path=ppt/ink/ink290.xml><?xml version="1.0" encoding="utf-8"?>
+<inkml:ink xmlns:inkml="http://www.w3.org/2003/InkML">
+  <inkml:definitions>
+    <inkml:context xml:id="ctx0">
+      <inkml:inkSource xml:id="inkSrc0">
+        <inkml:traceFormat>
+          <inkml:channel name="X" type="integer" min="-2.14748E9" max="2.14748E9" units="cm"/>
+          <inkml:channel name="Y" type="integer" min="-2.14748E9" max="2.14748E9" units="cm"/>
+          <inkml:channel name="F" type="integer" max="32767" units="dev"/>
+        </inkml:traceFormat>
+        <inkml:channelProperties>
+          <inkml:channelProperty channel="X" name="resolution" value="1000" units="1/cm"/>
+          <inkml:channelProperty channel="Y" name="resolution" value="1000" units="1/cm"/>
+          <inkml:channelProperty channel="F" name="resolution" value="0" units="1/dev"/>
+        </inkml:channelProperties>
+      </inkml:inkSource>
+      <inkml:timestamp xml:id="ts0" timeString="2022-07-22T11:59:42.717"/>
+    </inkml:context>
+    <inkml:brush xml:id="br0">
+      <inkml:brushProperty name="width" value="0.04286" units="cm"/>
+      <inkml:brushProperty name="height" value="0.04286" units="cm"/>
+      <inkml:brushProperty name="color" value="#F6630D"/>
+    </inkml:brush>
+  </inkml:definitions>
+  <inkml:trace contextRef="#ctx0" brushRef="#br0">29 895 16636,'-16'0'3798,"4"0"-3596,12 0 1142,0 0-536,44 1-170,-18 7 46,35 7 33,-34 8-247,-3 5-111,-9 2-236,-4-1-111,-7-1-12,-2-4 22,-2-6-33,-6-6 11,-2-7-45,-4-3-89,1-2-237,5-5-32,2-11-325,4-10-169,14-13-391,5-5-46,15-4 696,1 4 447,-3 5 191,-3 6 23,-8 7 425,-8 8 628,-4 6-147,-7 8-491,-1 2 122,-3 6 22,-6 11 360,-10 29-606,5-4-135,-2 16-167,13-23 78,3-7-101,6-7 101,17-9-112,0-8-112,11-13-202,-10-7-22,-3-7 79,-6-1 22,-7 2 111,-4 4-67,-5 4 124,-11 5 11,-17 7 101,1 1 11,-8 3-56,18 0 67,7 0-67,5 0-112,5 0 101,13-6-23,5-3-234,13-9 32,1-1 169,0-2 67,-3 2 0,-4 2 34,-3 2 145,-6 6 191,-5 1 67,-7 6 45,-2 1-34,0 8-135,3 7 24,3 12-35,4 8-167,1 3 33,4 0-79,-1-2-66,1-6 10,-1-5 12,-1-5 0,-6-9 45,-1-3 22,-5-7-112,-3-7-34,3-5-56,-1-10-145,3-7-168,6-23 302,-2 9 101,6-14 0,-5 19 0,-1 3 0,-2 5 11,-3 7 45,-1 7 56,-2 8-89,-1 4-23,0 4 0,0 0 101,-3 1-101,-1 4 11,-1 1 0,1 0 0,3 0 12,0-4 44,1 0-90,0-2-33,0 6 56,0 5 0,0 8-11,2 5 11,0 2 45,5-3-34,0-2-11,5-4 0,1-5 0,3-5 23,4-4-35,5-8 12,4-8-112,4-9 68,4-8-46,-1-3-67,-1-1 45,-5 2 67,-8 2 12,-9-3 33,-7 10-90,-4-2 79,-9 15 22,-2 5 45,-9 3 79,-9 4-12,7 6 0,-4 5 34,12 9-112,4 3 78,4 2-78,3 2 22,1-1-22,1-2-34,7-3-11,3-5-11,9-6-23,13-7-168,-4-5 158,7-8-113,-9-7 34,-2-6-45,-3-3 11,0 0-78,-4-1 88,0 0 102,-4 1-78,0 2 78,-4 2 34,0-2 11,-4 8-11,2 0-23,-4 5-10,2 4-12,-1-2-68,2 1 1,1 0 11,-1-1 34,2 1 44,0-1 45,-1 0-22,0 2 11,-3-1 0,1 3 0,-3 0 23,-1 0-35,-1 1-55,-1 1-67,0 0 335,-4 4 1,-2 6 156,-3 8-145,2 7-45,3 3 35,3-2-24,1-2-168,2-5 34,5-7 56,4-5 55,7-6-133,2-12 10,1-8-33,-3-14 101,-5-9-101,-6-5 224,-8-42-123,-13 19-101,4 22 0,-5 1-11,-22-10-112,-7 13-191,-4 14-1064,-4 16-1256,-1 9-2049,-2 19 4683,3 9 0,23-4 0,8 0 0</inkml:trace>
+</inkml:ink>
+</file>
+
+<file path=ppt/ink/ink291.xml><?xml version="1.0" encoding="utf-8"?>
+<inkml:ink xmlns:inkml="http://www.w3.org/2003/InkML">
+  <inkml:definitions>
+    <inkml:context xml:id="ctx0">
+      <inkml:inkSource xml:id="inkSrc0">
+        <inkml:traceFormat>
+          <inkml:channel name="X" type="integer" min="-2.14748E9" max="2.14748E9" units="cm"/>
+          <inkml:channel name="Y" type="integer" min="-2.14748E9" max="2.14748E9" units="cm"/>
+          <inkml:channel name="F" type="integer" max="32767" units="dev"/>
+        </inkml:traceFormat>
+        <inkml:channelProperties>
+          <inkml:channelProperty channel="X" name="resolution" value="1000" units="1/cm"/>
+          <inkml:channelProperty channel="Y" name="resolution" value="1000" units="1/cm"/>
+          <inkml:channelProperty channel="F" name="resolution" value="0" units="1/dev"/>
+        </inkml:channelProperties>
+      </inkml:inkSource>
+      <inkml:timestamp xml:id="ts0" timeString="2022-07-22T11:59:44.592"/>
+    </inkml:context>
+    <inkml:brush xml:id="br0">
+      <inkml:brushProperty name="width" value="0.04286" units="cm"/>
+      <inkml:brushProperty name="height" value="0.04286" units="cm"/>
+      <inkml:brushProperty name="color" value="#F6630D"/>
+    </inkml:brush>
+  </inkml:definitions>
+  <inkml:trace contextRef="#ctx0" brushRef="#br0">14 1 21779,'11'0'2263,"-2"0"-2263,-9 0-9831,0 0 8756,-15 12 1,11-9-1,-11 8 1</inkml:trace>
+</inkml:ink>
+</file>
+
+<file path=ppt/ink/ink292.xml><?xml version="1.0" encoding="utf-8"?>
+<inkml:ink xmlns:inkml="http://www.w3.org/2003/InkML">
+  <inkml:definitions>
+    <inkml:context xml:id="ctx0">
+      <inkml:inkSource xml:id="inkSrc0">
+        <inkml:traceFormat>
+          <inkml:channel name="X" type="integer" min="-2.14748E9" max="2.14748E9" units="cm"/>
+          <inkml:channel name="Y" type="integer" min="-2.14748E9" max="2.14748E9" units="cm"/>
+          <inkml:channel name="F" type="integer" max="32767" units="dev"/>
+        </inkml:traceFormat>
+        <inkml:channelProperties>
+          <inkml:channelProperty channel="X" name="resolution" value="1000" units="1/cm"/>
+          <inkml:channelProperty channel="Y" name="resolution" value="1000" units="1/cm"/>
+          <inkml:channelProperty channel="F" name="resolution" value="0" units="1/dev"/>
+        </inkml:channelProperties>
+      </inkml:inkSource>
+      <inkml:timestamp xml:id="ts0" timeString="2022-07-22T11:59:47.005"/>
+    </inkml:context>
+    <inkml:brush xml:id="br0">
+      <inkml:brushProperty name="width" value="0.04286" units="cm"/>
+      <inkml:brushProperty name="height" value="0.04286" units="cm"/>
+      <inkml:brushProperty name="color" value="#F6630D"/>
+    </inkml:brush>
+  </inkml:definitions>
+  <inkml:trace contextRef="#ctx0" brushRef="#br0">2460 16 10873,'-87'-8'907,"2"2"759,24 5-1229,-13 1-34,-13 0-22,-9 1-1301,46 1 0,0 1 1088,-2 0 0,0 1-373,1 2 0,1 0 266,0 0 1,0 0 650,-45 8-622,7-1-68,6 1 0,6 1 12,5 0 78,4 1-10,1 1-58,0 2 35,-2 3 22,-2 5 100,-3 4-33,-2 5 191,-2 2-23,1 1-11,3-2-67,5-1 151,6-2-62,-11 17-167,22-10-29,14-5 0,4 3-61,0 7 2433,-2 15-2422,17-18 2871,6-3-2905,2-1-11,5-2 23,1-1 22,3 1-45,1-1 156,0 2-55,7-1-45,10 17-45,0-12 12,7 13 22,-9-13-57,-1 1 35,-2 4-1,-2 2-32,-3 1 54,7 17-32,-2-20-24,6 9 12,1-23 12,3-4 21,4-1-78,5-1 79,1-1 56,20 7-57,-12-9-78,13 6 90,-15-10-22,1-1 10,5 0 68,2 0-90,7 2 79,34 9-124,-13-7-5,-23-9 0,0-1 5,26 3-11,2-2-11,-2-3 57,0 0-46,-1-4 79,-21-2 0,1-1 22,29 3-73,-30-4 0,0 1 51,21 2-90,-4-2 89,1-1-66,-2 2-1,4-4-22,0 1 34,3-2-34,-22 0 0,0 0 22,28 0 34,-30-2 0,-1-1 34,19-4 22,1-5-45,1-3 11,-1 2 1,-2-1-46,-5-1 1,-2 1 22,-4-2-56,-1 0 45,-4-2-45,-1-1 33,-1-2 12,3-1-11,0-2-11,3-3-12,2-1 11,0-2 23,-1-2 22,-1-2-56,-2-1 23,0-5-34,1 0 0,-1-5 11,0 0 0,-5-2-11,11-22-33,-22 15 33,6-16 0,-25 24 0,-8 0 0,-2 2-3392,-4-1 3381,-4 0 22,0-1-11,-3 2 11,-1-24-11,0 18-11,0-17-23,-6 24 12,-3 2 22,-7 1 11,-14-11-11,2 12 0,-12-8-11,5 15 3358,-27-13-3381,11 10 23,-22-7 0,21 15-23,-4 2 34,-1 2-23,-4-1 12,-2 3 11,-4 1-22,-5 2-1,-4 1 35,-3 0-24,-3 2-10,-1 0-486,-1 1 520,1 2-7,28 4 1,0 0 5,-24-2 0,-17-4 12,39 7-134,3 1 156,5 0-45,0 3 0,0 1-11,2 1-23,0 1 0,-10 0 23,16 0 0,-5 2-56,23 0 501,7 2-680,6-2-52,6-1-599,2-1-615,2 0-1715,0 2-3250,0 0 6477,0 2 0,0-2 0,0-1 0</inkml:trace>
+</inkml:ink>
+</file>
+
+<file path=ppt/ink/ink293.xml><?xml version="1.0" encoding="utf-8"?>
+<inkml:ink xmlns:inkml="http://www.w3.org/2003/InkML">
+  <inkml:definitions>
+    <inkml:context xml:id="ctx0">
+      <inkml:inkSource xml:id="inkSrc0">
+        <inkml:traceFormat>
+          <inkml:channel name="X" type="integer" min="-2.14748E9" max="2.14748E9" units="cm"/>
+          <inkml:channel name="Y" type="integer" min="-2.14748E9" max="2.14748E9" units="cm"/>
+          <inkml:channel name="F" type="integer" max="32767" units="dev"/>
+        </inkml:traceFormat>
+        <inkml:channelProperties>
+          <inkml:channelProperty channel="X" name="resolution" value="1000" units="1/cm"/>
+          <inkml:channelProperty channel="Y" name="resolution" value="1000" units="1/cm"/>
+          <inkml:channelProperty channel="F" name="resolution" value="0" units="1/dev"/>
+        </inkml:channelProperties>
+      </inkml:inkSource>
+      <inkml:timestamp xml:id="ts0" timeString="2022-07-22T11:59:56.271"/>
+    </inkml:context>
+    <inkml:brush xml:id="br0">
+      <inkml:brushProperty name="width" value="0.04286" units="cm"/>
+      <inkml:brushProperty name="height" value="0.04286" units="cm"/>
+      <inkml:brushProperty name="color" value="#F6630D"/>
+    </inkml:brush>
+  </inkml:definitions>
+  <inkml:trace contextRef="#ctx0" brushRef="#br0">1 0 27034,'46'44'1378,"-7"2"-1119,-20 1-259,0 2 0,1 0 0,2-1 0,-1-1-136,1-2-1051,-3-3-786,-2-6-1679,-2-7-3015,-4-8 6667,-3-11 0,-4-5 0,-3-5 0</inkml:trace>
+</inkml:ink>
+</file>
+
+<file path=ppt/ink/ink294.xml><?xml version="1.0" encoding="utf-8"?>
+<inkml:ink xmlns:inkml="http://www.w3.org/2003/InkML">
+  <inkml:definitions>
+    <inkml:context xml:id="ctx0">
+      <inkml:inkSource xml:id="inkSrc0">
+        <inkml:traceFormat>
+          <inkml:channel name="X" type="integer" min="-2.14748E9" max="2.14748E9" units="cm"/>
+          <inkml:channel name="Y" type="integer" min="-2.14748E9" max="2.14748E9" units="cm"/>
+          <inkml:channel name="F" type="integer" max="32767" units="dev"/>
+        </inkml:traceFormat>
+        <inkml:channelProperties>
+          <inkml:channelProperty channel="X" name="resolution" value="1000" units="1/cm"/>
+          <inkml:channelProperty channel="Y" name="resolution" value="1000" units="1/cm"/>
+          <inkml:channelProperty channel="F" name="resolution" value="0" units="1/dev"/>
+        </inkml:channelProperties>
+      </inkml:inkSource>
+      <inkml:timestamp xml:id="ts0" timeString="2022-07-22T11:59:57.619"/>
+    </inkml:context>
+    <inkml:brush xml:id="br0">
+      <inkml:brushProperty name="width" value="0.04286" units="cm"/>
+      <inkml:brushProperty name="height" value="0.04286" units="cm"/>
+      <inkml:brushProperty name="color" value="#F6630D"/>
+    </inkml:brush>
+  </inkml:definitions>
+  <inkml:trace contextRef="#ctx0" brushRef="#br0">0 74 18377,'55'-20'1019,"0"0"1,-3 3 0,-4 4-729,5 10 295,1 10-519,-1 7 56,-4 13-111,-3 7 185,-14 4-163,-9-1 82,-13 2-93,-9 1 216,-15 0-195,-8 2-44,-13-5-33,-2-2-2769,-3-4-223,17-15-3093,4-4 6118,20-19 0,0 5 0,2-6 0</inkml:trace>
+</inkml:ink>
+</file>
+
+<file path=ppt/ink/ink295.xml><?xml version="1.0" encoding="utf-8"?>
+<inkml:ink xmlns:inkml="http://www.w3.org/2003/InkML">
+  <inkml:definitions>
+    <inkml:context xml:id="ctx0">
+      <inkml:inkSource xml:id="inkSrc0">
+        <inkml:traceFormat>
+          <inkml:channel name="X" type="integer" min="-2.14748E9" max="2.14748E9" units="cm"/>
+          <inkml:channel name="Y" type="integer" min="-2.14748E9" max="2.14748E9" units="cm"/>
+          <inkml:channel name="F" type="integer" max="32767" units="dev"/>
+        </inkml:traceFormat>
+        <inkml:channelProperties>
+          <inkml:channelProperty channel="X" name="resolution" value="1000" units="1/cm"/>
+          <inkml:channelProperty channel="Y" name="resolution" value="1000" units="1/cm"/>
+          <inkml:channelProperty channel="F" name="resolution" value="0" units="1/dev"/>
+        </inkml:channelProperties>
+      </inkml:inkSource>
+      <inkml:timestamp xml:id="ts0" timeString="2022-07-22T11:59:58.534"/>
+    </inkml:context>
+    <inkml:brush xml:id="br0">
+      <inkml:brushProperty name="width" value="0.04286" units="cm"/>
+      <inkml:brushProperty name="height" value="0.04286" units="cm"/>
+      <inkml:brushProperty name="color" value="#F6630D"/>
+    </inkml:brush>
+  </inkml:definitions>
+  <inkml:trace contextRef="#ctx0" brushRef="#br0">41 212 16940,'5'1'4000,"-2"0"-2848,18 49-546,-11-14-270,15 45-90,-18-27-111,-4 1 18,-2 11-86,-1-23 54,-4 2 13,-3-29 187,-5-9-30,-5-4-258,-1-9 46,-2-12-68,3-18 0,5-18-237,6-15 237,4-9 0,11 23 0,4-1 112,12-25-112,-3 31 1,5 5 145,20-5-157,4 12-23,-2 15 1,15 13-34,-22 19 0,5 13 0,-29 15 11,-8 7 34,-11 6 11,-17 4-23,-10 2 272,-14-3-293,-2-5 21,-12 2 23,20-23 23,0-1-23,25-22 67,7-3-11,2-1-45,2 0 90,6-1-56,5-3 246,10 0-11,8-1 79,4 3-34,5 8-34,1 7-56,2 9-44,0 7-102,1 3-22,1 2-44,-2 1-12,0-2-11,-3-2-78,6 1-404,-15-13-493,3-1-425,-20-13-595,-3-2-1154,-5-2-3361,-2-7 6510,-1-9 0,-1 6 0,0-3 0</inkml:trace>
+</inkml:ink>
+</file>
+
+<file path=ppt/ink/ink296.xml><?xml version="1.0" encoding="utf-8"?>
+<inkml:ink xmlns:inkml="http://www.w3.org/2003/InkML">
+  <inkml:definitions>
+    <inkml:context xml:id="ctx0">
+      <inkml:inkSource xml:id="inkSrc0">
+        <inkml:traceFormat>
+          <inkml:channel name="X" type="integer" min="-2.14748E9" max="2.14748E9" units="cm"/>
+          <inkml:channel name="Y" type="integer" min="-2.14748E9" max="2.14748E9" units="cm"/>
+          <inkml:channel name="F" type="integer" max="32767" units="dev"/>
+        </inkml:traceFormat>
+        <inkml:channelProperties>
+          <inkml:channelProperty channel="X" name="resolution" value="1000" units="1/cm"/>
+          <inkml:channelProperty channel="Y" name="resolution" value="1000" units="1/cm"/>
+          <inkml:channelProperty channel="F" name="resolution" value="0" units="1/dev"/>
+        </inkml:channelProperties>
+      </inkml:inkSource>
+      <inkml:timestamp xml:id="ts0" timeString="2022-07-22T11:59:58.936"/>
+    </inkml:context>
+    <inkml:brush xml:id="br0">
+      <inkml:brushProperty name="width" value="0.04286" units="cm"/>
+      <inkml:brushProperty name="height" value="0.04286" units="cm"/>
+      <inkml:brushProperty name="color" value="#F6630D"/>
+    </inkml:brush>
+  </inkml:definitions>
+  <inkml:trace contextRef="#ctx0" brushRef="#br0">84 82 16468,'-3'-13'3373,"0"2"-3217,3 11 640,0 0-79,-17 15-23,8 1 226,-12 17-248,14 1-22,4 3-79,2 2-302,6-2-112,7-5-45,8-7-90,9-7 46,2-8 22,3-6-79,-2-5-11,0-10 67,5-26-33,-14-3-23,0-18 0,-17 12-22,-4 3-34,-8 5-11,-9 6-236,-12 8-145,-10 8-549,-7 8-470,-3 5-785,0 6-1266,8 5-3172,13 5 6679,12 3 0,10-7 0,4-3 0</inkml:trace>
+</inkml:ink>
+</file>
+
+<file path=ppt/ink/ink297.xml><?xml version="1.0" encoding="utf-8"?>
+<inkml:ink xmlns:inkml="http://www.w3.org/2003/InkML">
+  <inkml:definitions>
+    <inkml:context xml:id="ctx0">
+      <inkml:inkSource xml:id="inkSrc0">
+        <inkml:traceFormat>
+          <inkml:channel name="X" type="integer" min="-2.14748E9" max="2.14748E9" units="cm"/>
+          <inkml:channel name="Y" type="integer" min="-2.14748E9" max="2.14748E9" units="cm"/>
+          <inkml:channel name="F" type="integer" max="32767" units="dev"/>
+        </inkml:traceFormat>
+        <inkml:channelProperties>
+          <inkml:channelProperty channel="X" name="resolution" value="1000" units="1/cm"/>
+          <inkml:channelProperty channel="Y" name="resolution" value="1000" units="1/cm"/>
+          <inkml:channelProperty channel="F" name="resolution" value="0" units="1/dev"/>
+        </inkml:channelProperties>
+      </inkml:inkSource>
+      <inkml:timestamp xml:id="ts0" timeString="2022-07-22T11:59:59.308"/>
+    </inkml:context>
+    <inkml:brush xml:id="br0">
+      <inkml:brushProperty name="width" value="0.04286" units="cm"/>
+      <inkml:brushProperty name="height" value="0.04286" units="cm"/>
+      <inkml:brushProperty name="color" value="#F6630D"/>
+    </inkml:brush>
+  </inkml:definitions>
+  <inkml:trace contextRef="#ctx0" brushRef="#br0">73 50 21286,'-30'87'1401,"6"-9"-1076,35-36-57,3-4 1,14-8-78,2-9-57,3-10-33,4-6-45,-2-9 12,1-10-1,-5-8-22,-4-13 44,-6-4 23,-8-2 157,-7-1-90,-4 1-156,-11 4-23,-6 4-68,-12 9-111,-10 6-673,-5 9-3203,-28 6-371,19 11 4426,-10 2 0,41 0 0,9-4 0</inkml:trace>
+</inkml:ink>
+</file>
+
+<file path=ppt/ink/ink298.xml><?xml version="1.0" encoding="utf-8"?>
+<inkml:ink xmlns:inkml="http://www.w3.org/2003/InkML">
+  <inkml:definitions>
+    <inkml:context xml:id="ctx0">
+      <inkml:inkSource xml:id="inkSrc0">
+        <inkml:traceFormat>
+          <inkml:channel name="X" type="integer" min="-2.14748E9" max="2.14748E9" units="cm"/>
+          <inkml:channel name="Y" type="integer" min="-2.14748E9" max="2.14748E9" units="cm"/>
+          <inkml:channel name="F" type="integer" max="32767" units="dev"/>
+        </inkml:traceFormat>
+        <inkml:channelProperties>
+          <inkml:channelProperty channel="X" name="resolution" value="1000" units="1/cm"/>
+          <inkml:channelProperty channel="Y" name="resolution" value="1000" units="1/cm"/>
+          <inkml:channelProperty channel="F" name="resolution" value="0" units="1/dev"/>
+        </inkml:channelProperties>
+      </inkml:inkSource>
+      <inkml:timestamp xml:id="ts0" timeString="2022-07-22T11:59:59.657"/>
+    </inkml:context>
+    <inkml:brush xml:id="br0">
+      <inkml:brushProperty name="width" value="0.04286" units="cm"/>
+      <inkml:brushProperty name="height" value="0.04286" units="cm"/>
+      <inkml:brushProperty name="color" value="#F6630D"/>
+    </inkml:brush>
+  </inkml:definitions>
+  <inkml:trace contextRef="#ctx0" brushRef="#br0">29 10 21936,'-16'-5'3406,"3"1"-2677,13 4 21,0 0-369,15 62 79,-2-20-225,12 52-134,-7-34-45,-2-5-56,-3-1 0,-3-6-303,-5-8-885,-2-4-851,-3-9-1121,0-8-6671,-14-9 9182,3-14 0,-5 2 1,8-6-1</inkml:trace>
+</inkml:ink>
+</file>
+
+<file path=ppt/ink/ink299.xml><?xml version="1.0" encoding="utf-8"?>
+<inkml:ink xmlns:inkml="http://www.w3.org/2003/InkML">
+  <inkml:definitions>
+    <inkml:context xml:id="ctx0">
+      <inkml:inkSource xml:id="inkSrc0">
+        <inkml:traceFormat>
+          <inkml:channel name="X" type="integer" min="-2.14748E9" max="2.14748E9" units="cm"/>
+          <inkml:channel name="Y" type="integer" min="-2.14748E9" max="2.14748E9" units="cm"/>
+          <inkml:channel name="F" type="integer" max="32767" units="dev"/>
+        </inkml:traceFormat>
+        <inkml:channelProperties>
+          <inkml:channelProperty channel="X" name="resolution" value="1000" units="1/cm"/>
+          <inkml:channelProperty channel="Y" name="resolution" value="1000" units="1/cm"/>
+          <inkml:channelProperty channel="F" name="resolution" value="0" units="1/dev"/>
+        </inkml:channelProperties>
+      </inkml:inkSource>
+      <inkml:timestamp xml:id="ts0" timeString="2022-07-22T11:59:59.840"/>
+    </inkml:context>
+    <inkml:brush xml:id="br0">
+      <inkml:brushProperty name="width" value="0.04286" units="cm"/>
+      <inkml:brushProperty name="height" value="0.04286" units="cm"/>
+      <inkml:brushProperty name="color" value="#F6630D"/>
+    </inkml:brush>
+  </inkml:definitions>
+  <inkml:trace contextRef="#ctx0" brushRef="#br0">1 290 24121,'23'-93'1658,"6"12"-1490,11 48-123,4 3-11,-2 7-34,-5 6-90,-7 8-381,-7 5-1120,-8 8-1199,-7 14-1636,-7 14-4246,-18 21 8672,-11 9 0,6-25 0,0-6 0</inkml:trace>
+</inkml:ink>
+</file>
+
 <file path=ppt/ink/ink3.xml><?xml version="1.0" encoding="utf-8"?>
 <inkml:ink xmlns:inkml="http://www.w3.org/2003/InkML">
   <inkml:definitions>
@@ -5716,6 +6226,118 @@
     </inkml:brush>
   </inkml:definitions>
   <inkml:trace contextRef="#ctx0" brushRef="#br0">1 52 13207,'50'-2'-2611,"0"-1"1,45-6 2610,-32-8 0,-26 6 0,-8 1 0</inkml:trace>
+</inkml:ink>
+</file>
+
+<file path=ppt/ink/ink300.xml><?xml version="1.0" encoding="utf-8"?>
+<inkml:ink xmlns:inkml="http://www.w3.org/2003/InkML">
+  <inkml:definitions>
+    <inkml:context xml:id="ctx0">
+      <inkml:inkSource xml:id="inkSrc0">
+        <inkml:traceFormat>
+          <inkml:channel name="X" type="integer" min="-2.14748E9" max="2.14748E9" units="cm"/>
+          <inkml:channel name="Y" type="integer" min="-2.14748E9" max="2.14748E9" units="cm"/>
+          <inkml:channel name="F" type="integer" max="32767" units="dev"/>
+        </inkml:traceFormat>
+        <inkml:channelProperties>
+          <inkml:channelProperty channel="X" name="resolution" value="1000" units="1/cm"/>
+          <inkml:channelProperty channel="Y" name="resolution" value="1000" units="1/cm"/>
+          <inkml:channelProperty channel="F" name="resolution" value="0" units="1/dev"/>
+        </inkml:channelProperties>
+      </inkml:inkSource>
+      <inkml:timestamp xml:id="ts0" timeString="2022-07-22T11:59:59.994"/>
+    </inkml:context>
+    <inkml:brush xml:id="br0">
+      <inkml:brushProperty name="width" value="0.04286" units="cm"/>
+      <inkml:brushProperty name="height" value="0.04286" units="cm"/>
+      <inkml:brushProperty name="color" value="#F6630D"/>
+    </inkml:brush>
+  </inkml:definitions>
+  <inkml:trace contextRef="#ctx0" brushRef="#br0">0 134 22611,'51'-22'-34,"-1"0"1,37-15-1256,-50 22-1266,-3 4-2821,-7 0 5376,-6 3 0,-10 4 0,-5 1 0</inkml:trace>
+</inkml:ink>
+</file>
+
+<file path=ppt/ink/ink301.xml><?xml version="1.0" encoding="utf-8"?>
+<inkml:ink xmlns:inkml="http://www.w3.org/2003/InkML">
+  <inkml:definitions>
+    <inkml:context xml:id="ctx0">
+      <inkml:inkSource xml:id="inkSrc0">
+        <inkml:traceFormat>
+          <inkml:channel name="X" type="integer" min="-2.14748E9" max="2.14748E9" units="cm"/>
+          <inkml:channel name="Y" type="integer" min="-2.14748E9" max="2.14748E9" units="cm"/>
+          <inkml:channel name="F" type="integer" max="32767" units="dev"/>
+        </inkml:traceFormat>
+        <inkml:channelProperties>
+          <inkml:channelProperty channel="X" name="resolution" value="1000" units="1/cm"/>
+          <inkml:channelProperty channel="Y" name="resolution" value="1000" units="1/cm"/>
+          <inkml:channelProperty channel="F" name="resolution" value="0" units="1/dev"/>
+        </inkml:channelProperties>
+      </inkml:inkSource>
+      <inkml:timestamp xml:id="ts0" timeString="2022-07-22T12:00:00.176"/>
+    </inkml:context>
+    <inkml:brush xml:id="br0">
+      <inkml:brushProperty name="width" value="0.04286" units="cm"/>
+      <inkml:brushProperty name="height" value="0.04286" units="cm"/>
+      <inkml:brushProperty name="color" value="#F6630D"/>
+    </inkml:brush>
+  </inkml:definitions>
+  <inkml:trace contextRef="#ctx0" brushRef="#br0">118 36 22788,'-1'-11'3619,"0"2"-3619,1 9-864,0 0-1186,-11-15-1322,-1 26-1940,-16 0 5312,-2 38 0,12-19 0,2-3 0</inkml:trace>
+</inkml:ink>
+</file>
+
+<file path=ppt/ink/ink302.xml><?xml version="1.0" encoding="utf-8"?>
+<inkml:ink xmlns:inkml="http://www.w3.org/2003/InkML">
+  <inkml:definitions>
+    <inkml:context xml:id="ctx0">
+      <inkml:inkSource xml:id="inkSrc0">
+        <inkml:traceFormat>
+          <inkml:channel name="X" type="integer" min="-2.14748E9" max="2.14748E9" units="cm"/>
+          <inkml:channel name="Y" type="integer" min="-2.14748E9" max="2.14748E9" units="cm"/>
+          <inkml:channel name="F" type="integer" max="32767" units="dev"/>
+        </inkml:traceFormat>
+        <inkml:channelProperties>
+          <inkml:channelProperty channel="X" name="resolution" value="1000" units="1/cm"/>
+          <inkml:channelProperty channel="Y" name="resolution" value="1000" units="1/cm"/>
+          <inkml:channelProperty channel="F" name="resolution" value="0" units="1/dev"/>
+        </inkml:channelProperties>
+      </inkml:inkSource>
+      <inkml:timestamp xml:id="ts0" timeString="2022-07-22T12:00:00.343"/>
+    </inkml:context>
+    <inkml:brush xml:id="br0">
+      <inkml:brushProperty name="width" value="0.04286" units="cm"/>
+      <inkml:brushProperty name="height" value="0.04286" units="cm"/>
+      <inkml:brushProperty name="color" value="#F6630D"/>
+    </inkml:brush>
+  </inkml:definitions>
+  <inkml:trace contextRef="#ctx0" brushRef="#br0">5 27 21185,'3'0'3384,"0"0"-3384,-3 0-818,0 0-1759,11-11-1076,-8 8-2118,3-9 5771,-18 12 0,4 0 0,-3 0 0</inkml:trace>
+</inkml:ink>
+</file>
+
+<file path=ppt/ink/ink303.xml><?xml version="1.0" encoding="utf-8"?>
+<inkml:ink xmlns:inkml="http://www.w3.org/2003/InkML">
+  <inkml:definitions>
+    <inkml:context xml:id="ctx0">
+      <inkml:inkSource xml:id="inkSrc0">
+        <inkml:traceFormat>
+          <inkml:channel name="X" type="integer" min="-2.14748E9" max="2.14748E9" units="cm"/>
+          <inkml:channel name="Y" type="integer" min="-2.14748E9" max="2.14748E9" units="cm"/>
+          <inkml:channel name="F" type="integer" max="32767" units="dev"/>
+        </inkml:traceFormat>
+        <inkml:channelProperties>
+          <inkml:channelProperty channel="X" name="resolution" value="1000" units="1/cm"/>
+          <inkml:channelProperty channel="Y" name="resolution" value="1000" units="1/cm"/>
+          <inkml:channelProperty channel="F" name="resolution" value="0" units="1/dev"/>
+        </inkml:channelProperties>
+      </inkml:inkSource>
+      <inkml:timestamp xml:id="ts0" timeString="2022-07-22T12:00:00.835"/>
+    </inkml:context>
+    <inkml:brush xml:id="br0">
+      <inkml:brushProperty name="width" value="0.04286" units="cm"/>
+      <inkml:brushProperty name="height" value="0.04286" units="cm"/>
+      <inkml:brushProperty name="color" value="#F6630D"/>
+    </inkml:brush>
+  </inkml:definitions>
+  <inkml:trace contextRef="#ctx0" brushRef="#br0">0 222 24401,'74'-23'463,"0"0"0,1 1 1,0 4-257,-7 9 0,1 2-1154,11 0 1,2-1 1008,11 0 0,3 0 8,-23 3 1,3 0 0,1 0-677,9 0 0,2-1 0,1 0 610,7 1 0,2 0 0,1 0-4,-22 2 0,1 0 0,0 0 0,0 1 2,1 0 1,-1 0 0,0 0 0,-1 1-11,22-1 1,0 2-1,-3-1-59,-7 1 0,-2 0 0,-2-1-72,-9 1 1,-3 0 0,-2 0-24,17 1 0,-6-2 44,-16 1 0,-6-2-84,24 0 905,-34-2-938,-27-1-448,-13 2 55,-24 0-307,-13 2-1889,-21 1 3381,-31 5 0,38-3 0,-7 2 0</inkml:trace>
 </inkml:ink>
 </file>
 
@@ -7834,7 +8456,7 @@
           <a:p>
             <a:fld id="{A952054E-1796-8B41-91EB-0279AD14E0E5}" type="datetimeFigureOut">
               <a:rPr lang="en-US" smtClean="0"/>
-              <a:t>7/13/22</a:t>
+              <a:t>7/22/22</a:t>
             </a:fld>
             <a:endParaRPr lang="en-US"/>
           </a:p>
@@ -8167,7 +8789,7 @@
           <a:p>
             <a:fld id="{4F746DF2-6FE9-EC40-8FB0-DC052E7458D7}" type="slidenum">
               <a:rPr lang="en-US" smtClean="0"/>
-              <a:t>1</a:t>
+              <a:t>2</a:t>
             </a:fld>
             <a:endParaRPr lang="en-US"/>
           </a:p>
@@ -8251,7 +8873,7 @@
           <a:p>
             <a:fld id="{4F746DF2-6FE9-EC40-8FB0-DC052E7458D7}" type="slidenum">
               <a:rPr lang="en-US" smtClean="0"/>
-              <a:t>2</a:t>
+              <a:t>3</a:t>
             </a:fld>
             <a:endParaRPr lang="en-US"/>
           </a:p>
@@ -8335,7 +8957,7 @@
           <a:p>
             <a:fld id="{4F746DF2-6FE9-EC40-8FB0-DC052E7458D7}" type="slidenum">
               <a:rPr lang="en-US" smtClean="0"/>
-              <a:t>3</a:t>
+              <a:t>4</a:t>
             </a:fld>
             <a:endParaRPr lang="en-US"/>
           </a:p>
@@ -8503,7 +9125,7 @@
           <a:p>
             <a:fld id="{7DB33406-7FB1-4640-9B3B-5E0294528B21}" type="datetimeFigureOut">
               <a:rPr lang="en-US" smtClean="0"/>
-              <a:t>7/13/22</a:t>
+              <a:t>7/22/22</a:t>
             </a:fld>
             <a:endParaRPr lang="en-US" dirty="0"/>
           </a:p>
@@ -8703,7 +9325,7 @@
           <a:p>
             <a:fld id="{7DB33406-7FB1-4640-9B3B-5E0294528B21}" type="datetimeFigureOut">
               <a:rPr lang="en-US" smtClean="0"/>
-              <a:t>7/13/22</a:t>
+              <a:t>7/22/22</a:t>
             </a:fld>
             <a:endParaRPr lang="en-US" dirty="0"/>
           </a:p>
@@ -8913,7 +9535,7 @@
           <a:p>
             <a:fld id="{7DB33406-7FB1-4640-9B3B-5E0294528B21}" type="datetimeFigureOut">
               <a:rPr lang="en-US" smtClean="0"/>
-              <a:t>7/13/22</a:t>
+              <a:t>7/22/22</a:t>
             </a:fld>
             <a:endParaRPr lang="en-US" dirty="0"/>
           </a:p>
@@ -9113,7 +9735,7 @@
           <a:p>
             <a:fld id="{7DB33406-7FB1-4640-9B3B-5E0294528B21}" type="datetimeFigureOut">
               <a:rPr lang="en-US" smtClean="0"/>
-              <a:t>7/13/22</a:t>
+              <a:t>7/22/22</a:t>
             </a:fld>
             <a:endParaRPr lang="en-US" dirty="0"/>
           </a:p>
@@ -9389,7 +10011,7 @@
           <a:p>
             <a:fld id="{7DB33406-7FB1-4640-9B3B-5E0294528B21}" type="datetimeFigureOut">
               <a:rPr lang="en-US" smtClean="0"/>
-              <a:t>7/13/22</a:t>
+              <a:t>7/22/22</a:t>
             </a:fld>
             <a:endParaRPr lang="en-US" dirty="0"/>
           </a:p>
@@ -9657,7 +10279,7 @@
           <a:p>
             <a:fld id="{7DB33406-7FB1-4640-9B3B-5E0294528B21}" type="datetimeFigureOut">
               <a:rPr lang="en-US" smtClean="0"/>
-              <a:t>7/13/22</a:t>
+              <a:t>7/22/22</a:t>
             </a:fld>
             <a:endParaRPr lang="en-US" dirty="0"/>
           </a:p>
@@ -10072,7 +10694,7 @@
           <a:p>
             <a:fld id="{7DB33406-7FB1-4640-9B3B-5E0294528B21}" type="datetimeFigureOut">
               <a:rPr lang="en-US" smtClean="0"/>
-              <a:t>7/13/22</a:t>
+              <a:t>7/22/22</a:t>
             </a:fld>
             <a:endParaRPr lang="en-US" dirty="0"/>
           </a:p>
@@ -10214,7 +10836,7 @@
           <a:p>
             <a:fld id="{7DB33406-7FB1-4640-9B3B-5E0294528B21}" type="datetimeFigureOut">
               <a:rPr lang="en-US" smtClean="0"/>
-              <a:t>7/13/22</a:t>
+              <a:t>7/22/22</a:t>
             </a:fld>
             <a:endParaRPr lang="en-US" dirty="0"/>
           </a:p>
@@ -10327,7 +10949,7 @@
           <a:p>
             <a:fld id="{7DB33406-7FB1-4640-9B3B-5E0294528B21}" type="datetimeFigureOut">
               <a:rPr lang="en-US" smtClean="0"/>
-              <a:t>7/13/22</a:t>
+              <a:t>7/22/22</a:t>
             </a:fld>
             <a:endParaRPr lang="en-US" dirty="0"/>
           </a:p>
@@ -10640,7 +11262,7 @@
           <a:p>
             <a:fld id="{7DB33406-7FB1-4640-9B3B-5E0294528B21}" type="datetimeFigureOut">
               <a:rPr lang="en-US" smtClean="0"/>
-              <a:t>7/13/22</a:t>
+              <a:t>7/22/22</a:t>
             </a:fld>
             <a:endParaRPr lang="en-US" dirty="0"/>
           </a:p>
@@ -10929,7 +11551,7 @@
           <a:p>
             <a:fld id="{7DB33406-7FB1-4640-9B3B-5E0294528B21}" type="datetimeFigureOut">
               <a:rPr lang="en-US" smtClean="0"/>
-              <a:t>7/13/22</a:t>
+              <a:t>7/22/22</a:t>
             </a:fld>
             <a:endParaRPr lang="en-US" dirty="0"/>
           </a:p>
@@ -11172,7 +11794,7 @@
           <a:p>
             <a:fld id="{7DB33406-7FB1-4640-9B3B-5E0294528B21}" type="datetimeFigureOut">
               <a:rPr lang="en-US" smtClean="0"/>
-              <a:t>7/13/22</a:t>
+              <a:t>7/22/22</a:t>
             </a:fld>
             <a:endParaRPr lang="en-US" dirty="0"/>
           </a:p>
@@ -11589,6 +12211,94 @@
           <a:chExt cx="0" cy="0"/>
         </a:xfrm>
       </p:grpSpPr>
+      <p:sp>
+        <p:nvSpPr>
+          <p:cNvPr id="4" name="TextBox 3">
+            <a:extLst>
+              <a:ext uri="{FF2B5EF4-FFF2-40B4-BE49-F238E27FC236}">
+                <a16:creationId xmlns:a16="http://schemas.microsoft.com/office/drawing/2014/main" id="{7114289B-12C7-D3DB-0EAF-1FC74AB9FCCA}"/>
+              </a:ext>
+            </a:extLst>
+          </p:cNvPr>
+          <p:cNvSpPr txBox="1"/>
+          <p:nvPr/>
+        </p:nvSpPr>
+        <p:spPr>
+          <a:xfrm>
+            <a:off x="5101389" y="2967335"/>
+            <a:ext cx="1989221" cy="923330"/>
+          </a:xfrm>
+          <a:prstGeom prst="rect">
+            <a:avLst/>
+          </a:prstGeom>
+          <a:solidFill>
+            <a:schemeClr val="accent1"/>
+          </a:solidFill>
+          <a:ln>
+            <a:solidFill>
+              <a:schemeClr val="accent6"/>
+            </a:solidFill>
+          </a:ln>
+          <a:effectLst>
+            <a:outerShdw blurRad="50800" dist="38100" dir="2700000" algn="tl" rotWithShape="0">
+              <a:prstClr val="black">
+                <a:alpha val="40000"/>
+              </a:prstClr>
+            </a:outerShdw>
+          </a:effectLst>
+        </p:spPr>
+        <p:txBody>
+          <a:bodyPr wrap="square" rtlCol="0">
+            <a:spAutoFit/>
+          </a:bodyPr>
+          <a:lstStyle/>
+          <a:p>
+            <a:pPr algn="ctr"/>
+            <a:r>
+              <a:rPr lang="en-US" sz="5400" dirty="0">
+                <a:solidFill>
+                  <a:schemeClr val="bg1">
+                    <a:lumMod val="95000"/>
+                  </a:schemeClr>
+                </a:solidFill>
+                <a:latin typeface="Segoe UI" panose="020B0502040204020203" pitchFamily="34" charset="0"/>
+                <a:cs typeface="Segoe UI" panose="020B0502040204020203" pitchFamily="34" charset="0"/>
+              </a:rPr>
+              <a:t>Swap</a:t>
+            </a:r>
+          </a:p>
+        </p:txBody>
+      </p:sp>
+    </p:spTree>
+    <p:extLst>
+      <p:ext uri="{BB962C8B-B14F-4D97-AF65-F5344CB8AC3E}">
+        <p14:creationId xmlns:p14="http://schemas.microsoft.com/office/powerpoint/2010/main" val="2168583475"/>
+      </p:ext>
+    </p:extLst>
+  </p:cSld>
+  <p:clrMapOvr>
+    <a:masterClrMapping/>
+  </p:clrMapOvr>
+</p:sld>
+</file>
+
+<file path=ppt/slides/slide2.xml><?xml version="1.0" encoding="utf-8"?>
+<p:sld xmlns:a="http://schemas.openxmlformats.org/drawingml/2006/main" xmlns:r="http://schemas.openxmlformats.org/officeDocument/2006/relationships" xmlns:p="http://schemas.openxmlformats.org/presentationml/2006/main">
+  <p:cSld>
+    <p:spTree>
+      <p:nvGrpSpPr>
+        <p:cNvPr id="1" name=""/>
+        <p:cNvGrpSpPr/>
+        <p:nvPr/>
+      </p:nvGrpSpPr>
+      <p:grpSpPr>
+        <a:xfrm>
+          <a:off x="0" y="0"/>
+          <a:ext cx="0" cy="0"/>
+          <a:chOff x="0" y="0"/>
+          <a:chExt cx="0" cy="0"/>
+        </a:xfrm>
+      </p:grpSpPr>
       <p:grpSp>
         <p:nvGrpSpPr>
           <p:cNvPr id="28" name="Group 27">
@@ -17138,8 +17848,8 @@
             <a:chExt cx="538560" cy="1218240"/>
           </a:xfrm>
         </p:grpSpPr>
-        <mc:AlternateContent xmlns:mc="http://schemas.openxmlformats.org/markup-compatibility/2006">
-          <mc:Choice xmlns:p14="http://schemas.microsoft.com/office/powerpoint/2010/main" Requires="p14">
+        <mc:AlternateContent xmlns:mc="http://schemas.openxmlformats.org/markup-compatibility/2006" xmlns:p14="http://schemas.microsoft.com/office/powerpoint/2010/main">
+          <mc:Choice Requires="p14">
             <p:contentPart p14:bwMode="auto" r:id="rId205">
               <p14:nvContentPartPr>
                 <p14:cNvPr id="2" name="Ink 1">
@@ -17158,7 +17868,7 @@
               </p14:xfrm>
             </p:contentPart>
           </mc:Choice>
-          <mc:Fallback>
+          <mc:Fallback xmlns="">
             <p:pic>
               <p:nvPicPr>
                 <p:cNvPr id="2" name="Ink 1">
@@ -17189,8 +17899,8 @@
             </p:pic>
           </mc:Fallback>
         </mc:AlternateContent>
-        <mc:AlternateContent xmlns:mc="http://schemas.openxmlformats.org/markup-compatibility/2006">
-          <mc:Choice xmlns:p14="http://schemas.microsoft.com/office/powerpoint/2010/main" Requires="p14">
+        <mc:AlternateContent xmlns:mc="http://schemas.openxmlformats.org/markup-compatibility/2006" xmlns:p14="http://schemas.microsoft.com/office/powerpoint/2010/main">
+          <mc:Choice Requires="p14">
             <p:contentPart p14:bwMode="auto" r:id="rId207">
               <p14:nvContentPartPr>
                 <p14:cNvPr id="3" name="Ink 2">
@@ -17209,7 +17919,7 @@
               </p14:xfrm>
             </p:contentPart>
           </mc:Choice>
-          <mc:Fallback>
+          <mc:Fallback xmlns="">
             <p:pic>
               <p:nvPicPr>
                 <p:cNvPr id="3" name="Ink 2">
@@ -17241,8 +17951,8 @@
           </mc:Fallback>
         </mc:AlternateContent>
       </p:grpSp>
-      <mc:AlternateContent xmlns:mc="http://schemas.openxmlformats.org/markup-compatibility/2006">
-        <mc:Choice xmlns:p14="http://schemas.microsoft.com/office/powerpoint/2010/main" Requires="p14">
+      <mc:AlternateContent xmlns:mc="http://schemas.openxmlformats.org/markup-compatibility/2006" xmlns:p14="http://schemas.microsoft.com/office/powerpoint/2010/main">
+        <mc:Choice Requires="p14">
           <p:contentPart p14:bwMode="auto" r:id="rId209">
             <p14:nvContentPartPr>
               <p14:cNvPr id="5" name="Ink 4">
@@ -17261,7 +17971,7 @@
             </p14:xfrm>
           </p:contentPart>
         </mc:Choice>
-        <mc:Fallback>
+        <mc:Fallback xmlns="">
           <p:pic>
             <p:nvPicPr>
               <p:cNvPr id="5" name="Ink 4">
@@ -17292,8 +18002,8 @@
           </p:pic>
         </mc:Fallback>
       </mc:AlternateContent>
-      <mc:AlternateContent xmlns:mc="http://schemas.openxmlformats.org/markup-compatibility/2006">
-        <mc:Choice xmlns:p14="http://schemas.microsoft.com/office/powerpoint/2010/main" Requires="p14">
+      <mc:AlternateContent xmlns:mc="http://schemas.openxmlformats.org/markup-compatibility/2006" xmlns:p14="http://schemas.microsoft.com/office/powerpoint/2010/main">
+        <mc:Choice Requires="p14">
           <p:contentPart p14:bwMode="auto" r:id="rId211">
             <p14:nvContentPartPr>
               <p14:cNvPr id="8" name="Ink 7">
@@ -17312,7 +18022,7 @@
             </p14:xfrm>
           </p:contentPart>
         </mc:Choice>
-        <mc:Fallback>
+        <mc:Fallback xmlns="">
           <p:pic>
             <p:nvPicPr>
               <p:cNvPr id="8" name="Ink 7">
@@ -17363,8 +18073,8 @@
             <a:chExt cx="216720" cy="207720"/>
           </a:xfrm>
         </p:grpSpPr>
-        <mc:AlternateContent xmlns:mc="http://schemas.openxmlformats.org/markup-compatibility/2006">
-          <mc:Choice xmlns:p14="http://schemas.microsoft.com/office/powerpoint/2010/main" Requires="p14">
+        <mc:AlternateContent xmlns:mc="http://schemas.openxmlformats.org/markup-compatibility/2006" xmlns:p14="http://schemas.microsoft.com/office/powerpoint/2010/main">
+          <mc:Choice Requires="p14">
             <p:contentPart p14:bwMode="auto" r:id="rId213">
               <p14:nvContentPartPr>
                 <p14:cNvPr id="9" name="Ink 8">
@@ -17383,7 +18093,7 @@
               </p14:xfrm>
             </p:contentPart>
           </mc:Choice>
-          <mc:Fallback>
+          <mc:Fallback xmlns="">
             <p:pic>
               <p:nvPicPr>
                 <p:cNvPr id="9" name="Ink 8">
@@ -17414,8 +18124,8 @@
             </p:pic>
           </mc:Fallback>
         </mc:AlternateContent>
-        <mc:AlternateContent xmlns:mc="http://schemas.openxmlformats.org/markup-compatibility/2006">
-          <mc:Choice xmlns:p14="http://schemas.microsoft.com/office/powerpoint/2010/main" Requires="p14">
+        <mc:AlternateContent xmlns:mc="http://schemas.openxmlformats.org/markup-compatibility/2006" xmlns:p14="http://schemas.microsoft.com/office/powerpoint/2010/main">
+          <mc:Choice Requires="p14">
             <p:contentPart p14:bwMode="auto" r:id="rId215">
               <p14:nvContentPartPr>
                 <p14:cNvPr id="10" name="Ink 9">
@@ -17434,7 +18144,7 @@
               </p14:xfrm>
             </p:contentPart>
           </mc:Choice>
-          <mc:Fallback>
+          <mc:Fallback xmlns="">
             <p:pic>
               <p:nvPicPr>
                 <p:cNvPr id="10" name="Ink 9">
@@ -17486,8 +18196,8 @@
             <a:chExt cx="128520" cy="99000"/>
           </a:xfrm>
         </p:grpSpPr>
-        <mc:AlternateContent xmlns:mc="http://schemas.openxmlformats.org/markup-compatibility/2006">
-          <mc:Choice xmlns:p14="http://schemas.microsoft.com/office/powerpoint/2010/main" Requires="p14">
+        <mc:AlternateContent xmlns:mc="http://schemas.openxmlformats.org/markup-compatibility/2006" xmlns:p14="http://schemas.microsoft.com/office/powerpoint/2010/main">
+          <mc:Choice Requires="p14">
             <p:contentPart p14:bwMode="auto" r:id="rId217">
               <p14:nvContentPartPr>
                 <p14:cNvPr id="12" name="Ink 11">
@@ -17506,7 +18216,7 @@
               </p14:xfrm>
             </p:contentPart>
           </mc:Choice>
-          <mc:Fallback>
+          <mc:Fallback xmlns="">
             <p:pic>
               <p:nvPicPr>
                 <p:cNvPr id="12" name="Ink 11">
@@ -17537,8 +18247,8 @@
             </p:pic>
           </mc:Fallback>
         </mc:AlternateContent>
-        <mc:AlternateContent xmlns:mc="http://schemas.openxmlformats.org/markup-compatibility/2006">
-          <mc:Choice xmlns:p14="http://schemas.microsoft.com/office/powerpoint/2010/main" Requires="p14">
+        <mc:AlternateContent xmlns:mc="http://schemas.openxmlformats.org/markup-compatibility/2006" xmlns:p14="http://schemas.microsoft.com/office/powerpoint/2010/main">
+          <mc:Choice Requires="p14">
             <p:contentPart p14:bwMode="auto" r:id="rId219">
               <p14:nvContentPartPr>
                 <p14:cNvPr id="13" name="Ink 12">
@@ -17557,7 +18267,7 @@
               </p14:xfrm>
             </p:contentPart>
           </mc:Choice>
-          <mc:Fallback>
+          <mc:Fallback xmlns="">
             <p:pic>
               <p:nvPicPr>
                 <p:cNvPr id="13" name="Ink 12">
@@ -17609,8 +18319,8 @@
             <a:chExt cx="692640" cy="838080"/>
           </a:xfrm>
         </p:grpSpPr>
-        <mc:AlternateContent xmlns:mc="http://schemas.openxmlformats.org/markup-compatibility/2006">
-          <mc:Choice xmlns:p14="http://schemas.microsoft.com/office/powerpoint/2010/main" Requires="p14">
+        <mc:AlternateContent xmlns:mc="http://schemas.openxmlformats.org/markup-compatibility/2006" xmlns:p14="http://schemas.microsoft.com/office/powerpoint/2010/main">
+          <mc:Choice Requires="p14">
             <p:contentPart p14:bwMode="auto" r:id="rId221">
               <p14:nvContentPartPr>
                 <p14:cNvPr id="38" name="Ink 37">
@@ -17629,7 +18339,7 @@
               </p14:xfrm>
             </p:contentPart>
           </mc:Choice>
-          <mc:Fallback>
+          <mc:Fallback xmlns="">
             <p:pic>
               <p:nvPicPr>
                 <p:cNvPr id="38" name="Ink 37">
@@ -17660,8 +18370,8 @@
             </p:pic>
           </mc:Fallback>
         </mc:AlternateContent>
-        <mc:AlternateContent xmlns:mc="http://schemas.openxmlformats.org/markup-compatibility/2006">
-          <mc:Choice xmlns:p14="http://schemas.microsoft.com/office/powerpoint/2010/main" Requires="p14">
+        <mc:AlternateContent xmlns:mc="http://schemas.openxmlformats.org/markup-compatibility/2006" xmlns:p14="http://schemas.microsoft.com/office/powerpoint/2010/main">
+          <mc:Choice Requires="p14">
             <p:contentPart p14:bwMode="auto" r:id="rId223">
               <p14:nvContentPartPr>
                 <p14:cNvPr id="46" name="Ink 45">
@@ -17680,7 +18390,7 @@
               </p14:xfrm>
             </p:contentPart>
           </mc:Choice>
-          <mc:Fallback>
+          <mc:Fallback xmlns="">
             <p:pic>
               <p:nvPicPr>
                 <p:cNvPr id="46" name="Ink 45">
@@ -17711,8 +18421,8 @@
             </p:pic>
           </mc:Fallback>
         </mc:AlternateContent>
-        <mc:AlternateContent xmlns:mc="http://schemas.openxmlformats.org/markup-compatibility/2006">
-          <mc:Choice xmlns:p14="http://schemas.microsoft.com/office/powerpoint/2010/main" Requires="p14">
+        <mc:AlternateContent xmlns:mc="http://schemas.openxmlformats.org/markup-compatibility/2006" xmlns:p14="http://schemas.microsoft.com/office/powerpoint/2010/main">
+          <mc:Choice Requires="p14">
             <p:contentPart p14:bwMode="auto" r:id="rId225">
               <p14:nvContentPartPr>
                 <p14:cNvPr id="63" name="Ink 62">
@@ -17731,7 +18441,7 @@
               </p14:xfrm>
             </p:contentPart>
           </mc:Choice>
-          <mc:Fallback>
+          <mc:Fallback xmlns="">
             <p:pic>
               <p:nvPicPr>
                 <p:cNvPr id="63" name="Ink 62">
@@ -17762,8 +18472,8 @@
             </p:pic>
           </mc:Fallback>
         </mc:AlternateContent>
-        <mc:AlternateContent xmlns:mc="http://schemas.openxmlformats.org/markup-compatibility/2006">
-          <mc:Choice xmlns:p14="http://schemas.microsoft.com/office/powerpoint/2010/main" Requires="p14">
+        <mc:AlternateContent xmlns:mc="http://schemas.openxmlformats.org/markup-compatibility/2006" xmlns:p14="http://schemas.microsoft.com/office/powerpoint/2010/main">
+          <mc:Choice Requires="p14">
             <p:contentPart p14:bwMode="auto" r:id="rId227">
               <p14:nvContentPartPr>
                 <p14:cNvPr id="72" name="Ink 71">
@@ -17782,7 +18492,7 @@
               </p14:xfrm>
             </p:contentPart>
           </mc:Choice>
-          <mc:Fallback>
+          <mc:Fallback xmlns="">
             <p:pic>
               <p:nvPicPr>
                 <p:cNvPr id="72" name="Ink 71">
@@ -17834,8 +18544,8 @@
             <a:chExt cx="865440" cy="1129320"/>
           </a:xfrm>
         </p:grpSpPr>
-        <mc:AlternateContent xmlns:mc="http://schemas.openxmlformats.org/markup-compatibility/2006">
-          <mc:Choice xmlns:p14="http://schemas.microsoft.com/office/powerpoint/2010/main" Requires="p14">
+        <mc:AlternateContent xmlns:mc="http://schemas.openxmlformats.org/markup-compatibility/2006" xmlns:p14="http://schemas.microsoft.com/office/powerpoint/2010/main">
+          <mc:Choice Requires="p14">
             <p:contentPart p14:bwMode="auto" r:id="rId229">
               <p14:nvContentPartPr>
                 <p14:cNvPr id="74" name="Ink 73">
@@ -17854,7 +18564,7 @@
               </p14:xfrm>
             </p:contentPart>
           </mc:Choice>
-          <mc:Fallback>
+          <mc:Fallback xmlns="">
             <p:pic>
               <p:nvPicPr>
                 <p:cNvPr id="74" name="Ink 73">
@@ -17885,8 +18595,8 @@
             </p:pic>
           </mc:Fallback>
         </mc:AlternateContent>
-        <mc:AlternateContent xmlns:mc="http://schemas.openxmlformats.org/markup-compatibility/2006">
-          <mc:Choice xmlns:p14="http://schemas.microsoft.com/office/powerpoint/2010/main" Requires="p14">
+        <mc:AlternateContent xmlns:mc="http://schemas.openxmlformats.org/markup-compatibility/2006" xmlns:p14="http://schemas.microsoft.com/office/powerpoint/2010/main">
+          <mc:Choice Requires="p14">
             <p:contentPart p14:bwMode="auto" r:id="rId231">
               <p14:nvContentPartPr>
                 <p14:cNvPr id="75" name="Ink 74">
@@ -17905,7 +18615,7 @@
               </p14:xfrm>
             </p:contentPart>
           </mc:Choice>
-          <mc:Fallback>
+          <mc:Fallback xmlns="">
             <p:pic>
               <p:nvPicPr>
                 <p:cNvPr id="75" name="Ink 74">
@@ -17936,8 +18646,8 @@
             </p:pic>
           </mc:Fallback>
         </mc:AlternateContent>
-        <mc:AlternateContent xmlns:mc="http://schemas.openxmlformats.org/markup-compatibility/2006">
-          <mc:Choice xmlns:p14="http://schemas.microsoft.com/office/powerpoint/2010/main" Requires="p14">
+        <mc:AlternateContent xmlns:mc="http://schemas.openxmlformats.org/markup-compatibility/2006" xmlns:p14="http://schemas.microsoft.com/office/powerpoint/2010/main">
+          <mc:Choice Requires="p14">
             <p:contentPart p14:bwMode="auto" r:id="rId233">
               <p14:nvContentPartPr>
                 <p14:cNvPr id="76" name="Ink 75">
@@ -17956,7 +18666,7 @@
               </p14:xfrm>
             </p:contentPart>
           </mc:Choice>
-          <mc:Fallback>
+          <mc:Fallback xmlns="">
             <p:pic>
               <p:nvPicPr>
                 <p:cNvPr id="76" name="Ink 75">
@@ -17987,8 +18697,8 @@
             </p:pic>
           </mc:Fallback>
         </mc:AlternateContent>
-        <mc:AlternateContent xmlns:mc="http://schemas.openxmlformats.org/markup-compatibility/2006">
-          <mc:Choice xmlns:p14="http://schemas.microsoft.com/office/powerpoint/2010/main" Requires="p14">
+        <mc:AlternateContent xmlns:mc="http://schemas.openxmlformats.org/markup-compatibility/2006" xmlns:p14="http://schemas.microsoft.com/office/powerpoint/2010/main">
+          <mc:Choice Requires="p14">
             <p:contentPart p14:bwMode="auto" r:id="rId235">
               <p14:nvContentPartPr>
                 <p14:cNvPr id="77" name="Ink 76">
@@ -18007,7 +18717,7 @@
               </p14:xfrm>
             </p:contentPart>
           </mc:Choice>
-          <mc:Fallback>
+          <mc:Fallback xmlns="">
             <p:pic>
               <p:nvPicPr>
                 <p:cNvPr id="77" name="Ink 76">
@@ -18038,8 +18748,8 @@
             </p:pic>
           </mc:Fallback>
         </mc:AlternateContent>
-        <mc:AlternateContent xmlns:mc="http://schemas.openxmlformats.org/markup-compatibility/2006">
-          <mc:Choice xmlns:p14="http://schemas.microsoft.com/office/powerpoint/2010/main" Requires="p14">
+        <mc:AlternateContent xmlns:mc="http://schemas.openxmlformats.org/markup-compatibility/2006" xmlns:p14="http://schemas.microsoft.com/office/powerpoint/2010/main">
+          <mc:Choice Requires="p14">
             <p:contentPart p14:bwMode="auto" r:id="rId237">
               <p14:nvContentPartPr>
                 <p14:cNvPr id="78" name="Ink 77">
@@ -18058,7 +18768,7 @@
               </p14:xfrm>
             </p:contentPart>
           </mc:Choice>
-          <mc:Fallback>
+          <mc:Fallback xmlns="">
             <p:pic>
               <p:nvPicPr>
                 <p:cNvPr id="78" name="Ink 77">
@@ -18089,8 +18799,8 @@
             </p:pic>
           </mc:Fallback>
         </mc:AlternateContent>
-        <mc:AlternateContent xmlns:mc="http://schemas.openxmlformats.org/markup-compatibility/2006">
-          <mc:Choice xmlns:p14="http://schemas.microsoft.com/office/powerpoint/2010/main" Requires="p14">
+        <mc:AlternateContent xmlns:mc="http://schemas.openxmlformats.org/markup-compatibility/2006" xmlns:p14="http://schemas.microsoft.com/office/powerpoint/2010/main">
+          <mc:Choice Requires="p14">
             <p:contentPart p14:bwMode="auto" r:id="rId239">
               <p14:nvContentPartPr>
                 <p14:cNvPr id="102" name="Ink 101">
@@ -18109,7 +18819,7 @@
               </p14:xfrm>
             </p:contentPart>
           </mc:Choice>
-          <mc:Fallback>
+          <mc:Fallback xmlns="">
             <p:pic>
               <p:nvPicPr>
                 <p:cNvPr id="102" name="Ink 101">
@@ -18161,8 +18871,8 @@
             <a:chExt cx="613080" cy="328680"/>
           </a:xfrm>
         </p:grpSpPr>
-        <mc:AlternateContent xmlns:mc="http://schemas.openxmlformats.org/markup-compatibility/2006">
-          <mc:Choice xmlns:p14="http://schemas.microsoft.com/office/powerpoint/2010/main" Requires="p14">
+        <mc:AlternateContent xmlns:mc="http://schemas.openxmlformats.org/markup-compatibility/2006" xmlns:p14="http://schemas.microsoft.com/office/powerpoint/2010/main">
+          <mc:Choice Requires="p14">
             <p:contentPart p14:bwMode="auto" r:id="rId241">
               <p14:nvContentPartPr>
                 <p14:cNvPr id="115" name="Ink 114">
@@ -18181,7 +18891,7 @@
               </p14:xfrm>
             </p:contentPart>
           </mc:Choice>
-          <mc:Fallback>
+          <mc:Fallback xmlns="">
             <p:pic>
               <p:nvPicPr>
                 <p:cNvPr id="115" name="Ink 114">
@@ -18212,8 +18922,8 @@
             </p:pic>
           </mc:Fallback>
         </mc:AlternateContent>
-        <mc:AlternateContent xmlns:mc="http://schemas.openxmlformats.org/markup-compatibility/2006">
-          <mc:Choice xmlns:p14="http://schemas.microsoft.com/office/powerpoint/2010/main" Requires="p14">
+        <mc:AlternateContent xmlns:mc="http://schemas.openxmlformats.org/markup-compatibility/2006" xmlns:p14="http://schemas.microsoft.com/office/powerpoint/2010/main">
+          <mc:Choice Requires="p14">
             <p:contentPart p14:bwMode="auto" r:id="rId243">
               <p14:nvContentPartPr>
                 <p14:cNvPr id="116" name="Ink 115">
@@ -18232,7 +18942,7 @@
               </p14:xfrm>
             </p:contentPart>
           </mc:Choice>
-          <mc:Fallback>
+          <mc:Fallback xmlns="">
             <p:pic>
               <p:nvPicPr>
                 <p:cNvPr id="116" name="Ink 115">
@@ -18263,8 +18973,8 @@
             </p:pic>
           </mc:Fallback>
         </mc:AlternateContent>
-        <mc:AlternateContent xmlns:mc="http://schemas.openxmlformats.org/markup-compatibility/2006">
-          <mc:Choice xmlns:p14="http://schemas.microsoft.com/office/powerpoint/2010/main" Requires="p14">
+        <mc:AlternateContent xmlns:mc="http://schemas.openxmlformats.org/markup-compatibility/2006" xmlns:p14="http://schemas.microsoft.com/office/powerpoint/2010/main">
+          <mc:Choice Requires="p14">
             <p:contentPart p14:bwMode="auto" r:id="rId245">
               <p14:nvContentPartPr>
                 <p14:cNvPr id="131" name="Ink 130">
@@ -18283,7 +18993,7 @@
               </p14:xfrm>
             </p:contentPart>
           </mc:Choice>
-          <mc:Fallback>
+          <mc:Fallback xmlns="">
             <p:pic>
               <p:nvPicPr>
                 <p:cNvPr id="131" name="Ink 130">
@@ -18315,8 +19025,8 @@
           </mc:Fallback>
         </mc:AlternateContent>
       </p:grpSp>
-      <mc:AlternateContent xmlns:mc="http://schemas.openxmlformats.org/markup-compatibility/2006">
-        <mc:Choice xmlns:p14="http://schemas.microsoft.com/office/powerpoint/2010/main" Requires="p14">
+      <mc:AlternateContent xmlns:mc="http://schemas.openxmlformats.org/markup-compatibility/2006" xmlns:p14="http://schemas.microsoft.com/office/powerpoint/2010/main">
+        <mc:Choice Requires="p14">
           <p:contentPart p14:bwMode="auto" r:id="rId247">
             <p14:nvContentPartPr>
               <p14:cNvPr id="150" name="Ink 149">
@@ -18335,7 +19045,7 @@
             </p14:xfrm>
           </p:contentPart>
         </mc:Choice>
-        <mc:Fallback>
+        <mc:Fallback xmlns="">
           <p:pic>
             <p:nvPicPr>
               <p:cNvPr id="150" name="Ink 149">
@@ -18366,8 +19076,8 @@
           </p:pic>
         </mc:Fallback>
       </mc:AlternateContent>
-      <mc:AlternateContent xmlns:mc="http://schemas.openxmlformats.org/markup-compatibility/2006">
-        <mc:Choice xmlns:p14="http://schemas.microsoft.com/office/powerpoint/2010/main" Requires="p14">
+      <mc:AlternateContent xmlns:mc="http://schemas.openxmlformats.org/markup-compatibility/2006" xmlns:p14="http://schemas.microsoft.com/office/powerpoint/2010/main">
+        <mc:Choice Requires="p14">
           <p:contentPart p14:bwMode="auto" r:id="rId249">
             <p14:nvContentPartPr>
               <p14:cNvPr id="155" name="Ink 154">
@@ -18386,7 +19096,7 @@
             </p14:xfrm>
           </p:contentPart>
         </mc:Choice>
-        <mc:Fallback>
+        <mc:Fallback xmlns="">
           <p:pic>
             <p:nvPicPr>
               <p:cNvPr id="155" name="Ink 154">
@@ -18482,7 +19192,7 @@
 </p:sld>
 </file>
 
-<file path=ppt/slides/slide2.xml><?xml version="1.0" encoding="utf-8"?>
+<file path=ppt/slides/slide3.xml><?xml version="1.0" encoding="utf-8"?>
 <p:sld xmlns:a="http://schemas.openxmlformats.org/drawingml/2006/main" xmlns:r="http://schemas.openxmlformats.org/officeDocument/2006/relationships" xmlns:p="http://schemas.openxmlformats.org/presentationml/2006/main">
   <p:cSld>
     <p:spTree>
@@ -26680,7 +27390,7 @@
 </p:sld>
 </file>
 
-<file path=ppt/slides/slide3.xml><?xml version="1.0" encoding="utf-8"?>
+<file path=ppt/slides/slide4.xml><?xml version="1.0" encoding="utf-8"?>
 <p:sld xmlns:a="http://schemas.openxmlformats.org/drawingml/2006/main" xmlns:r="http://schemas.openxmlformats.org/officeDocument/2006/relationships" xmlns:p="http://schemas.openxmlformats.org/presentationml/2006/main">
   <p:cSld>
     <p:bg>
@@ -27068,8 +27778,8 @@
             <a:chExt cx="3252960" cy="3094200"/>
           </a:xfrm>
         </p:grpSpPr>
-        <mc:AlternateContent xmlns:mc="http://schemas.openxmlformats.org/markup-compatibility/2006">
-          <mc:Choice xmlns:p14="http://schemas.microsoft.com/office/powerpoint/2010/main" Requires="p14">
+        <mc:AlternateContent xmlns:mc="http://schemas.openxmlformats.org/markup-compatibility/2006" xmlns:p14="http://schemas.microsoft.com/office/powerpoint/2010/main">
+          <mc:Choice Requires="p14">
             <p:contentPart p14:bwMode="auto" r:id="rId4">
               <p14:nvContentPartPr>
                 <p14:cNvPr id="4" name="Ink 3">
@@ -27088,7 +27798,7 @@
               </p14:xfrm>
             </p:contentPart>
           </mc:Choice>
-          <mc:Fallback>
+          <mc:Fallback xmlns="">
             <p:pic>
               <p:nvPicPr>
                 <p:cNvPr id="4" name="Ink 3">
@@ -27119,8 +27829,8 @@
             </p:pic>
           </mc:Fallback>
         </mc:AlternateContent>
-        <mc:AlternateContent xmlns:mc="http://schemas.openxmlformats.org/markup-compatibility/2006">
-          <mc:Choice xmlns:p14="http://schemas.microsoft.com/office/powerpoint/2010/main" Requires="p14">
+        <mc:AlternateContent xmlns:mc="http://schemas.openxmlformats.org/markup-compatibility/2006" xmlns:p14="http://schemas.microsoft.com/office/powerpoint/2010/main">
+          <mc:Choice Requires="p14">
             <p:contentPart p14:bwMode="auto" r:id="rId6">
               <p14:nvContentPartPr>
                 <p14:cNvPr id="5" name="Ink 4">
@@ -27139,7 +27849,7 @@
               </p14:xfrm>
             </p:contentPart>
           </mc:Choice>
-          <mc:Fallback>
+          <mc:Fallback xmlns="">
             <p:pic>
               <p:nvPicPr>
                 <p:cNvPr id="5" name="Ink 4">
@@ -27170,8 +27880,8 @@
             </p:pic>
           </mc:Fallback>
         </mc:AlternateContent>
-        <mc:AlternateContent xmlns:mc="http://schemas.openxmlformats.org/markup-compatibility/2006">
-          <mc:Choice xmlns:p14="http://schemas.microsoft.com/office/powerpoint/2010/main" Requires="p14">
+        <mc:AlternateContent xmlns:mc="http://schemas.openxmlformats.org/markup-compatibility/2006" xmlns:p14="http://schemas.microsoft.com/office/powerpoint/2010/main">
+          <mc:Choice Requires="p14">
             <p:contentPart p14:bwMode="auto" r:id="rId8">
               <p14:nvContentPartPr>
                 <p14:cNvPr id="7" name="Ink 6">
@@ -27190,7 +27900,7 @@
               </p14:xfrm>
             </p:contentPart>
           </mc:Choice>
-          <mc:Fallback>
+          <mc:Fallback xmlns="">
             <p:pic>
               <p:nvPicPr>
                 <p:cNvPr id="7" name="Ink 6">
@@ -27221,8 +27931,8 @@
             </p:pic>
           </mc:Fallback>
         </mc:AlternateContent>
-        <mc:AlternateContent xmlns:mc="http://schemas.openxmlformats.org/markup-compatibility/2006">
-          <mc:Choice xmlns:p14="http://schemas.microsoft.com/office/powerpoint/2010/main" Requires="p14">
+        <mc:AlternateContent xmlns:mc="http://schemas.openxmlformats.org/markup-compatibility/2006" xmlns:p14="http://schemas.microsoft.com/office/powerpoint/2010/main">
+          <mc:Choice Requires="p14">
             <p:contentPart p14:bwMode="auto" r:id="rId10">
               <p14:nvContentPartPr>
                 <p14:cNvPr id="8" name="Ink 7">
@@ -27241,7 +27951,7 @@
               </p14:xfrm>
             </p:contentPart>
           </mc:Choice>
-          <mc:Fallback>
+          <mc:Fallback xmlns="">
             <p:pic>
               <p:nvPicPr>
                 <p:cNvPr id="8" name="Ink 7">
@@ -27312,6 +28022,2718 @@
     <p:extLst>
       <p:ext uri="{BB962C8B-B14F-4D97-AF65-F5344CB8AC3E}">
         <p14:creationId xmlns:p14="http://schemas.microsoft.com/office/powerpoint/2010/main" val="27982784"/>
+      </p:ext>
+    </p:extLst>
+  </p:cSld>
+  <p:clrMapOvr>
+    <a:masterClrMapping/>
+  </p:clrMapOvr>
+</p:sld>
+</file>
+
+<file path=ppt/slides/slide5.xml><?xml version="1.0" encoding="utf-8"?>
+<p:sld xmlns:a="http://schemas.openxmlformats.org/drawingml/2006/main" xmlns:r="http://schemas.openxmlformats.org/officeDocument/2006/relationships" xmlns:p="http://schemas.openxmlformats.org/presentationml/2006/main">
+  <p:cSld>
+    <p:bg>
+      <p:bgPr>
+        <a:solidFill>
+          <a:schemeClr val="bg1"/>
+        </a:solidFill>
+        <a:effectLst/>
+      </p:bgPr>
+    </p:bg>
+    <p:spTree>
+      <p:nvGrpSpPr>
+        <p:cNvPr id="1" name=""/>
+        <p:cNvGrpSpPr/>
+        <p:nvPr/>
+      </p:nvGrpSpPr>
+      <p:grpSpPr>
+        <a:xfrm>
+          <a:off x="0" y="0"/>
+          <a:ext cx="0" cy="0"/>
+          <a:chOff x="0" y="0"/>
+          <a:chExt cx="0" cy="0"/>
+        </a:xfrm>
+      </p:grpSpPr>
+      <p:sp useBgFill="1">
+        <p:nvSpPr>
+          <p:cNvPr id="23" name="Rectangle 8">
+            <a:extLst>
+              <a:ext uri="{FF2B5EF4-FFF2-40B4-BE49-F238E27FC236}">
+                <a16:creationId xmlns:a16="http://schemas.microsoft.com/office/drawing/2014/main" id="{AB8C311F-7253-4AED-9701-7FC0708C41C7}"/>
+              </a:ext>
+              <a:ext uri="{C183D7F6-B498-43B3-948B-1728B52AA6E4}">
+                <adec:decorative xmlns:adec="http://schemas.microsoft.com/office/drawing/2017/decorative" val="1"/>
+              </a:ext>
+            </a:extLst>
+          </p:cNvPr>
+          <p:cNvSpPr>
+            <a:spLocks noGrp="1" noRot="1" noChangeAspect="1" noMove="1" noResize="1" noEditPoints="1" noAdjustHandles="1" noChangeArrowheads="1" noChangeShapeType="1" noTextEdit="1"/>
+          </p:cNvSpPr>
+          <p:nvPr>
+            <p:extLst>
+              <p:ext uri="{386F3935-93C4-4BCD-93E2-E3B085C9AB24}">
+                <p16:designElem xmlns:p16="http://schemas.microsoft.com/office/powerpoint/2015/main" val="1"/>
+              </p:ext>
+            </p:extLst>
+          </p:nvPr>
+        </p:nvSpPr>
+        <p:spPr>
+          <a:xfrm>
+            <a:off x="0" y="0"/>
+            <a:ext cx="12192000" cy="6858000"/>
+          </a:xfrm>
+          <a:prstGeom prst="rect">
+            <a:avLst/>
+          </a:prstGeom>
+          <a:ln w="12700" cap="flat" cmpd="sng" algn="ctr">
+            <a:noFill/>
+            <a:prstDash val="solid"/>
+            <a:miter lim="800000"/>
+          </a:ln>
+          <a:effectLst/>
+          <a:extLst>
+            <a:ext uri="{91240B29-F687-4F45-9708-019B960494DF}">
+              <a14:hiddenLine xmlns:a14="http://schemas.microsoft.com/office/drawing/2010/main" w="12700" cap="flat" cmpd="sng" algn="ctr">
+                <a:solidFill>
+                  <a:schemeClr val="accent1">
+                    <a:shade val="50000"/>
+                  </a:schemeClr>
+                </a:solidFill>
+                <a:prstDash val="solid"/>
+                <a:miter lim="800000"/>
+              </a14:hiddenLine>
+            </a:ext>
+          </a:extLst>
+        </p:spPr>
+        <p:style>
+          <a:lnRef idx="2">
+            <a:schemeClr val="accent1">
+              <a:shade val="50000"/>
+            </a:schemeClr>
+          </a:lnRef>
+          <a:fillRef idx="1">
+            <a:schemeClr val="accent1"/>
+          </a:fillRef>
+          <a:effectRef idx="0">
+            <a:schemeClr val="accent1"/>
+          </a:effectRef>
+          <a:fontRef idx="minor">
+            <a:schemeClr val="lt1"/>
+          </a:fontRef>
+        </p:style>
+        <p:txBody>
+          <a:bodyPr rtlCol="0" anchor="ctr"/>
+          <a:lstStyle/>
+          <a:p>
+            <a:pPr algn="ctr"/>
+            <a:endParaRPr lang="en-US"/>
+          </a:p>
+        </p:txBody>
+      </p:sp>
+      <p:sp>
+        <p:nvSpPr>
+          <p:cNvPr id="24" name="Rectangle 10">
+            <a:extLst>
+              <a:ext uri="{FF2B5EF4-FFF2-40B4-BE49-F238E27FC236}">
+                <a16:creationId xmlns:a16="http://schemas.microsoft.com/office/drawing/2014/main" id="{E2384209-CB15-4CDF-9D31-C44FD9A3F20D}"/>
+              </a:ext>
+              <a:ext uri="{C183D7F6-B498-43B3-948B-1728B52AA6E4}">
+                <adec:decorative xmlns:adec="http://schemas.microsoft.com/office/drawing/2017/decorative" val="1"/>
+              </a:ext>
+            </a:extLst>
+          </p:cNvPr>
+          <p:cNvSpPr>
+            <a:spLocks noGrp="1" noRot="1" noChangeAspect="1" noMove="1" noResize="1" noEditPoints="1" noAdjustHandles="1" noChangeArrowheads="1" noChangeShapeType="1" noTextEdit="1"/>
+          </p:cNvSpPr>
+          <p:nvPr>
+            <p:extLst>
+              <p:ext uri="{386F3935-93C4-4BCD-93E2-E3B085C9AB24}">
+                <p16:designElem xmlns:p16="http://schemas.microsoft.com/office/powerpoint/2015/main" val="1"/>
+              </p:ext>
+            </p:extLst>
+          </p:nvPr>
+        </p:nvSpPr>
+        <p:spPr>
+          <a:xfrm rot="16200000" flipH="1">
+            <a:off x="2666617" y="-2666188"/>
+            <a:ext cx="6858000" cy="12191233"/>
+          </a:xfrm>
+          <a:prstGeom prst="rect">
+            <a:avLst/>
+          </a:prstGeom>
+          <a:gradFill>
+            <a:gsLst>
+              <a:gs pos="8000">
+                <a:schemeClr val="accent1"/>
+              </a:gs>
+              <a:gs pos="100000">
+                <a:schemeClr val="accent1">
+                  <a:lumMod val="50000"/>
+                </a:schemeClr>
+              </a:gs>
+            </a:gsLst>
+            <a:lin ang="12000000" scaled="0"/>
+          </a:gradFill>
+          <a:ln>
+            <a:noFill/>
+          </a:ln>
+        </p:spPr>
+        <p:style>
+          <a:lnRef idx="2">
+            <a:schemeClr val="accent1">
+              <a:shade val="50000"/>
+            </a:schemeClr>
+          </a:lnRef>
+          <a:fillRef idx="1">
+            <a:schemeClr val="accent1"/>
+          </a:fillRef>
+          <a:effectRef idx="0">
+            <a:schemeClr val="accent1"/>
+          </a:effectRef>
+          <a:fontRef idx="minor">
+            <a:schemeClr val="lt1"/>
+          </a:fontRef>
+        </p:style>
+        <p:txBody>
+          <a:bodyPr rtlCol="0" anchor="ctr"/>
+          <a:lstStyle/>
+          <a:p>
+            <a:pPr algn="ctr"/>
+            <a:endParaRPr lang="en-US"/>
+          </a:p>
+        </p:txBody>
+      </p:sp>
+      <p:sp>
+        <p:nvSpPr>
+          <p:cNvPr id="25" name="Rectangle 12">
+            <a:extLst>
+              <a:ext uri="{FF2B5EF4-FFF2-40B4-BE49-F238E27FC236}">
+                <a16:creationId xmlns:a16="http://schemas.microsoft.com/office/drawing/2014/main" id="{2633B3B5-CC90-43F0-8714-D31D1F3F0209}"/>
+              </a:ext>
+              <a:ext uri="{C183D7F6-B498-43B3-948B-1728B52AA6E4}">
+                <adec:decorative xmlns:adec="http://schemas.microsoft.com/office/drawing/2017/decorative" val="1"/>
+              </a:ext>
+            </a:extLst>
+          </p:cNvPr>
+          <p:cNvSpPr>
+            <a:spLocks noGrp="1" noRot="1" noChangeAspect="1" noMove="1" noResize="1" noEditPoints="1" noAdjustHandles="1" noChangeArrowheads="1" noChangeShapeType="1" noTextEdit="1"/>
+          </p:cNvSpPr>
+          <p:nvPr>
+            <p:extLst>
+              <p:ext uri="{386F3935-93C4-4BCD-93E2-E3B085C9AB24}">
+                <p16:designElem xmlns:p16="http://schemas.microsoft.com/office/powerpoint/2015/main" val="1"/>
+              </p:ext>
+            </p:extLst>
+          </p:nvPr>
+        </p:nvSpPr>
+        <p:spPr>
+          <a:xfrm rot="10800000" flipH="1">
+            <a:off x="-2311" y="0"/>
+            <a:ext cx="9070846" cy="6857572"/>
+          </a:xfrm>
+          <a:prstGeom prst="rect">
+            <a:avLst/>
+          </a:prstGeom>
+          <a:gradFill>
+            <a:gsLst>
+              <a:gs pos="8000">
+                <a:srgbClr val="000000">
+                  <a:alpha val="52000"/>
+                </a:srgbClr>
+              </a:gs>
+              <a:gs pos="100000">
+                <a:schemeClr val="accent1"/>
+              </a:gs>
+            </a:gsLst>
+            <a:lin ang="4800000" scaled="0"/>
+          </a:gradFill>
+          <a:ln>
+            <a:noFill/>
+          </a:ln>
+        </p:spPr>
+        <p:style>
+          <a:lnRef idx="2">
+            <a:schemeClr val="accent1">
+              <a:shade val="50000"/>
+            </a:schemeClr>
+          </a:lnRef>
+          <a:fillRef idx="1">
+            <a:schemeClr val="accent1"/>
+          </a:fillRef>
+          <a:effectRef idx="0">
+            <a:schemeClr val="accent1"/>
+          </a:effectRef>
+          <a:fontRef idx="minor">
+            <a:schemeClr val="lt1"/>
+          </a:fontRef>
+        </p:style>
+        <p:txBody>
+          <a:bodyPr rtlCol="0" anchor="ctr"/>
+          <a:lstStyle/>
+          <a:p>
+            <a:pPr algn="ctr"/>
+            <a:endParaRPr lang="en-US"/>
+          </a:p>
+        </p:txBody>
+      </p:sp>
+      <p:sp>
+        <p:nvSpPr>
+          <p:cNvPr id="26" name="Rectangle 14">
+            <a:extLst>
+              <a:ext uri="{FF2B5EF4-FFF2-40B4-BE49-F238E27FC236}">
+                <a16:creationId xmlns:a16="http://schemas.microsoft.com/office/drawing/2014/main" id="{A8D57A06-A426-446D-B02C-A2DC6B62E45E}"/>
+              </a:ext>
+              <a:ext uri="{C183D7F6-B498-43B3-948B-1728B52AA6E4}">
+                <adec:decorative xmlns:adec="http://schemas.microsoft.com/office/drawing/2017/decorative" val="1"/>
+              </a:ext>
+            </a:extLst>
+          </p:cNvPr>
+          <p:cNvSpPr>
+            <a:spLocks noGrp="1" noRot="1" noChangeAspect="1" noMove="1" noResize="1" noEditPoints="1" noAdjustHandles="1" noChangeArrowheads="1" noChangeShapeType="1" noTextEdit="1"/>
+          </p:cNvSpPr>
+          <p:nvPr>
+            <p:extLst>
+              <p:ext uri="{386F3935-93C4-4BCD-93E2-E3B085C9AB24}">
+                <p16:designElem xmlns:p16="http://schemas.microsoft.com/office/powerpoint/2015/main" val="1"/>
+              </p:ext>
+            </p:extLst>
+          </p:nvPr>
+        </p:nvSpPr>
+        <p:spPr>
+          <a:xfrm rot="16200000" flipH="1">
+            <a:off x="3649491" y="-1685840"/>
+            <a:ext cx="4894564" cy="12193546"/>
+          </a:xfrm>
+          <a:prstGeom prst="rect">
+            <a:avLst/>
+          </a:prstGeom>
+          <a:gradFill>
+            <a:gsLst>
+              <a:gs pos="0">
+                <a:schemeClr val="accent5">
+                  <a:lumMod val="60000"/>
+                  <a:lumOff val="40000"/>
+                  <a:alpha val="0"/>
+                </a:schemeClr>
+              </a:gs>
+              <a:gs pos="100000">
+                <a:srgbClr val="000000">
+                  <a:alpha val="46000"/>
+                </a:srgbClr>
+              </a:gs>
+            </a:gsLst>
+            <a:lin ang="1200000" scaled="0"/>
+          </a:gradFill>
+          <a:ln>
+            <a:noFill/>
+          </a:ln>
+        </p:spPr>
+        <p:style>
+          <a:lnRef idx="2">
+            <a:schemeClr val="accent1">
+              <a:shade val="50000"/>
+            </a:schemeClr>
+          </a:lnRef>
+          <a:fillRef idx="1">
+            <a:schemeClr val="accent1"/>
+          </a:fillRef>
+          <a:effectRef idx="0">
+            <a:schemeClr val="accent1"/>
+          </a:effectRef>
+          <a:fontRef idx="minor">
+            <a:schemeClr val="lt1"/>
+          </a:fontRef>
+        </p:style>
+        <p:txBody>
+          <a:bodyPr rtlCol="0" anchor="ctr"/>
+          <a:lstStyle/>
+          <a:p>
+            <a:pPr algn="ctr"/>
+            <a:endParaRPr lang="en-US"/>
+          </a:p>
+        </p:txBody>
+      </p:sp>
+      <p:pic>
+        <p:nvPicPr>
+          <p:cNvPr id="4" name="Picture 3" descr="Graphical user interface, text, application, email&#10;&#10;Description automatically generated">
+            <a:extLst>
+              <a:ext uri="{FF2B5EF4-FFF2-40B4-BE49-F238E27FC236}">
+                <a16:creationId xmlns:a16="http://schemas.microsoft.com/office/drawing/2014/main" id="{974EE501-B6C4-63C5-1583-1568BC6A91F1}"/>
+              </a:ext>
+            </a:extLst>
+          </p:cNvPr>
+          <p:cNvPicPr>
+            <a:picLocks noChangeAspect="1"/>
+          </p:cNvPicPr>
+          <p:nvPr/>
+        </p:nvPicPr>
+        <p:blipFill>
+          <a:blip r:embed="rId2"/>
+          <a:stretch>
+            <a:fillRect/>
+          </a:stretch>
+        </p:blipFill>
+        <p:spPr>
+          <a:xfrm>
+            <a:off x="2346093" y="457200"/>
+            <a:ext cx="7499813" cy="5943600"/>
+          </a:xfrm>
+          <a:prstGeom prst="rect">
+            <a:avLst/>
+          </a:prstGeom>
+        </p:spPr>
+      </p:pic>
+      <p:sp>
+        <p:nvSpPr>
+          <p:cNvPr id="6" name="TextBox 5">
+            <a:extLst>
+              <a:ext uri="{FF2B5EF4-FFF2-40B4-BE49-F238E27FC236}">
+                <a16:creationId xmlns:a16="http://schemas.microsoft.com/office/drawing/2014/main" id="{93E45175-7EF9-075A-5DE2-C815082006E5}"/>
+              </a:ext>
+            </a:extLst>
+          </p:cNvPr>
+          <p:cNvSpPr txBox="1"/>
+          <p:nvPr/>
+        </p:nvSpPr>
+        <p:spPr>
+          <a:xfrm>
+            <a:off x="411864" y="841093"/>
+            <a:ext cx="1673609" cy="461665"/>
+          </a:xfrm>
+          <a:prstGeom prst="rect">
+            <a:avLst/>
+          </a:prstGeom>
+          <a:noFill/>
+        </p:spPr>
+        <p:txBody>
+          <a:bodyPr wrap="square">
+            <a:spAutoFit/>
+          </a:bodyPr>
+          <a:lstStyle/>
+          <a:p>
+            <a:r>
+              <a:rPr lang="en-US" sz="2400" dirty="0">
+                <a:solidFill>
+                  <a:schemeClr val="bg1">
+                    <a:lumMod val="95000"/>
+                  </a:schemeClr>
+                </a:solidFill>
+                <a:hlinkClick r:id="rId3">
+                  <a:extLst>
+                    <a:ext uri="{A12FA001-AC4F-418D-AE19-62706E023703}">
+                      <ahyp:hlinkClr xmlns:ahyp="http://schemas.microsoft.com/office/drawing/2018/hyperlinkcolor" val="tx"/>
+                    </a:ext>
+                  </a:extLst>
+                </a:hlinkClick>
+              </a:rPr>
+              <a:t>REFERENCE</a:t>
+            </a:r>
+            <a:endParaRPr lang="en-US" sz="2400" dirty="0">
+              <a:solidFill>
+                <a:schemeClr val="bg1">
+                  <a:lumMod val="95000"/>
+                </a:schemeClr>
+              </a:solidFill>
+            </a:endParaRPr>
+          </a:p>
+        </p:txBody>
+      </p:sp>
+    </p:spTree>
+    <p:extLst>
+      <p:ext uri="{BB962C8B-B14F-4D97-AF65-F5344CB8AC3E}">
+        <p14:creationId xmlns:p14="http://schemas.microsoft.com/office/powerpoint/2010/main" val="1892313145"/>
+      </p:ext>
+    </p:extLst>
+  </p:cSld>
+  <p:clrMapOvr>
+    <a:masterClrMapping/>
+  </p:clrMapOvr>
+</p:sld>
+</file>
+
+<file path=ppt/slides/slide6.xml><?xml version="1.0" encoding="utf-8"?>
+<p:sld xmlns:a="http://schemas.openxmlformats.org/drawingml/2006/main" xmlns:r="http://schemas.openxmlformats.org/officeDocument/2006/relationships" xmlns:p="http://schemas.openxmlformats.org/presentationml/2006/main">
+  <p:cSld>
+    <p:spTree>
+      <p:nvGrpSpPr>
+        <p:cNvPr id="1" name=""/>
+        <p:cNvGrpSpPr/>
+        <p:nvPr/>
+      </p:nvGrpSpPr>
+      <p:grpSpPr>
+        <a:xfrm>
+          <a:off x="0" y="0"/>
+          <a:ext cx="0" cy="0"/>
+          <a:chOff x="0" y="0"/>
+          <a:chExt cx="0" cy="0"/>
+        </a:xfrm>
+      </p:grpSpPr>
+      <p:sp>
+        <p:nvSpPr>
+          <p:cNvPr id="4" name="TextBox 3">
+            <a:extLst>
+              <a:ext uri="{FF2B5EF4-FFF2-40B4-BE49-F238E27FC236}">
+                <a16:creationId xmlns:a16="http://schemas.microsoft.com/office/drawing/2014/main" id="{7114289B-12C7-D3DB-0EAF-1FC74AB9FCCA}"/>
+              </a:ext>
+            </a:extLst>
+          </p:cNvPr>
+          <p:cNvSpPr txBox="1"/>
+          <p:nvPr/>
+        </p:nvSpPr>
+        <p:spPr>
+          <a:xfrm>
+            <a:off x="4106779" y="2967335"/>
+            <a:ext cx="4315326" cy="923330"/>
+          </a:xfrm>
+          <a:prstGeom prst="rect">
+            <a:avLst/>
+          </a:prstGeom>
+          <a:solidFill>
+            <a:schemeClr val="accent6"/>
+          </a:solidFill>
+          <a:ln>
+            <a:solidFill>
+              <a:schemeClr val="accent6"/>
+            </a:solidFill>
+          </a:ln>
+          <a:effectLst>
+            <a:outerShdw blurRad="50800" dist="38100" dir="2700000" algn="tl" rotWithShape="0">
+              <a:prstClr val="black">
+                <a:alpha val="40000"/>
+              </a:prstClr>
+            </a:outerShdw>
+          </a:effectLst>
+        </p:spPr>
+        <p:txBody>
+          <a:bodyPr wrap="square" rtlCol="0">
+            <a:spAutoFit/>
+          </a:bodyPr>
+          <a:lstStyle/>
+          <a:p>
+            <a:pPr algn="ctr"/>
+            <a:r>
+              <a:rPr lang="en-US" sz="5400" dirty="0">
+                <a:solidFill>
+                  <a:schemeClr val="bg1">
+                    <a:lumMod val="95000"/>
+                  </a:schemeClr>
+                </a:solidFill>
+                <a:latin typeface="Segoe UI" panose="020B0502040204020203" pitchFamily="34" charset="0"/>
+                <a:cs typeface="Segoe UI" panose="020B0502040204020203" pitchFamily="34" charset="0"/>
+              </a:rPr>
+              <a:t>Add Liquidity</a:t>
+            </a:r>
+          </a:p>
+        </p:txBody>
+      </p:sp>
+    </p:spTree>
+    <p:extLst>
+      <p:ext uri="{BB962C8B-B14F-4D97-AF65-F5344CB8AC3E}">
+        <p14:creationId xmlns:p14="http://schemas.microsoft.com/office/powerpoint/2010/main" val="912402649"/>
+      </p:ext>
+    </p:extLst>
+  </p:cSld>
+  <p:clrMapOvr>
+    <a:masterClrMapping/>
+  </p:clrMapOvr>
+</p:sld>
+</file>
+
+<file path=ppt/slides/slide7.xml><?xml version="1.0" encoding="utf-8"?>
+<p:sld xmlns:a="http://schemas.openxmlformats.org/drawingml/2006/main" xmlns:r="http://schemas.openxmlformats.org/officeDocument/2006/relationships" xmlns:p="http://schemas.openxmlformats.org/presentationml/2006/main">
+  <p:cSld>
+    <p:bg>
+      <p:bgPr>
+        <a:solidFill>
+          <a:schemeClr val="bg1"/>
+        </a:solidFill>
+        <a:effectLst/>
+      </p:bgPr>
+    </p:bg>
+    <p:spTree>
+      <p:nvGrpSpPr>
+        <p:cNvPr id="1" name=""/>
+        <p:cNvGrpSpPr/>
+        <p:nvPr/>
+      </p:nvGrpSpPr>
+      <p:grpSpPr>
+        <a:xfrm>
+          <a:off x="0" y="0"/>
+          <a:ext cx="0" cy="0"/>
+          <a:chOff x="0" y="0"/>
+          <a:chExt cx="0" cy="0"/>
+        </a:xfrm>
+      </p:grpSpPr>
+      <p:sp useBgFill="1">
+        <p:nvSpPr>
+          <p:cNvPr id="9" name="Rectangle 8">
+            <a:extLst>
+              <a:ext uri="{FF2B5EF4-FFF2-40B4-BE49-F238E27FC236}">
+                <a16:creationId xmlns:a16="http://schemas.microsoft.com/office/drawing/2014/main" id="{22F15A2D-2324-487D-A02A-BF46C5C580EB}"/>
+              </a:ext>
+              <a:ext uri="{C183D7F6-B498-43B3-948B-1728B52AA6E4}">
+                <adec:decorative xmlns:adec="http://schemas.microsoft.com/office/drawing/2017/decorative" val="1"/>
+              </a:ext>
+            </a:extLst>
+          </p:cNvPr>
+          <p:cNvSpPr>
+            <a:spLocks noGrp="1" noRot="1" noChangeAspect="1" noMove="1" noResize="1" noEditPoints="1" noAdjustHandles="1" noChangeArrowheads="1" noChangeShapeType="1" noTextEdit="1"/>
+          </p:cNvSpPr>
+          <p:nvPr>
+            <p:extLst>
+              <p:ext uri="{386F3935-93C4-4BCD-93E2-E3B085C9AB24}">
+                <p16:designElem xmlns:p16="http://schemas.microsoft.com/office/powerpoint/2015/main" val="1"/>
+              </p:ext>
+            </p:extLst>
+          </p:nvPr>
+        </p:nvSpPr>
+        <p:spPr>
+          <a:xfrm>
+            <a:off x="0" y="0"/>
+            <a:ext cx="12192000" cy="6858000"/>
+          </a:xfrm>
+          <a:prstGeom prst="rect">
+            <a:avLst/>
+          </a:prstGeom>
+          <a:ln>
+            <a:noFill/>
+          </a:ln>
+        </p:spPr>
+        <p:style>
+          <a:lnRef idx="2">
+            <a:schemeClr val="accent1">
+              <a:shade val="50000"/>
+            </a:schemeClr>
+          </a:lnRef>
+          <a:fillRef idx="1">
+            <a:schemeClr val="accent1"/>
+          </a:fillRef>
+          <a:effectRef idx="0">
+            <a:schemeClr val="accent1"/>
+          </a:effectRef>
+          <a:fontRef idx="minor">
+            <a:schemeClr val="lt1"/>
+          </a:fontRef>
+        </p:style>
+        <p:txBody>
+          <a:bodyPr rtlCol="0" anchor="ctr"/>
+          <a:lstStyle/>
+          <a:p>
+            <a:pPr algn="ctr"/>
+            <a:endParaRPr lang="en-US"/>
+          </a:p>
+        </p:txBody>
+      </p:sp>
+      <p:sp>
+        <p:nvSpPr>
+          <p:cNvPr id="11" name="Freeform: Shape 10">
+            <a:extLst>
+              <a:ext uri="{FF2B5EF4-FFF2-40B4-BE49-F238E27FC236}">
+                <a16:creationId xmlns:a16="http://schemas.microsoft.com/office/drawing/2014/main" id="{17A7F34E-D418-47E2-9F86-2C45BBC31210}"/>
+              </a:ext>
+              <a:ext uri="{C183D7F6-B498-43B3-948B-1728B52AA6E4}">
+                <adec:decorative xmlns:adec="http://schemas.microsoft.com/office/drawing/2017/decorative" val="1"/>
+              </a:ext>
+            </a:extLst>
+          </p:cNvPr>
+          <p:cNvSpPr>
+            <a:spLocks noGrp="1" noRot="1" noChangeAspect="1" noMove="1" noResize="1" noEditPoints="1" noAdjustHandles="1" noChangeArrowheads="1" noChangeShapeType="1" noTextEdit="1"/>
+          </p:cNvSpPr>
+          <p:nvPr>
+            <p:extLst>
+              <p:ext uri="{386F3935-93C4-4BCD-93E2-E3B085C9AB24}">
+                <p16:designElem xmlns:p16="http://schemas.microsoft.com/office/powerpoint/2015/main" val="1"/>
+              </p:ext>
+            </p:extLst>
+          </p:nvPr>
+        </p:nvSpPr>
+        <p:spPr>
+          <a:xfrm>
+            <a:off x="321732" y="321733"/>
+            <a:ext cx="11546828" cy="6214534"/>
+          </a:xfrm>
+          <a:custGeom>
+            <a:avLst/>
+            <a:gdLst>
+              <a:gd name="connsiteX0" fmla="*/ 0 w 11546828"/>
+              <a:gd name="connsiteY0" fmla="*/ 0 h 6214534"/>
+              <a:gd name="connsiteX1" fmla="*/ 7965430 w 11546828"/>
+              <a:gd name="connsiteY1" fmla="*/ 0 h 6214534"/>
+              <a:gd name="connsiteX2" fmla="*/ 7965430 w 11546828"/>
+              <a:gd name="connsiteY2" fmla="*/ 1786 h 6214534"/>
+              <a:gd name="connsiteX3" fmla="*/ 11546828 w 11546828"/>
+              <a:gd name="connsiteY3" fmla="*/ 1786 h 6214534"/>
+              <a:gd name="connsiteX4" fmla="*/ 11546828 w 11546828"/>
+              <a:gd name="connsiteY4" fmla="*/ 2866740 h 6214534"/>
+              <a:gd name="connsiteX5" fmla="*/ 11225095 w 11546828"/>
+              <a:gd name="connsiteY5" fmla="*/ 3179536 h 6214534"/>
+              <a:gd name="connsiteX6" fmla="*/ 11225095 w 11546828"/>
+              <a:gd name="connsiteY6" fmla="*/ 301542 h 6214534"/>
+              <a:gd name="connsiteX7" fmla="*/ 320042 w 11546828"/>
+              <a:gd name="connsiteY7" fmla="*/ 301542 h 6214534"/>
+              <a:gd name="connsiteX8" fmla="*/ 320042 w 11546828"/>
+              <a:gd name="connsiteY8" fmla="*/ 5909424 h 6214534"/>
+              <a:gd name="connsiteX9" fmla="*/ 8417210 w 11546828"/>
+              <a:gd name="connsiteY9" fmla="*/ 5909424 h 6214534"/>
+              <a:gd name="connsiteX10" fmla="*/ 8103383 w 11546828"/>
+              <a:gd name="connsiteY10" fmla="*/ 6214534 h 6214534"/>
+              <a:gd name="connsiteX11" fmla="*/ 7222929 w 11546828"/>
+              <a:gd name="connsiteY11" fmla="*/ 6214534 h 6214534"/>
+              <a:gd name="connsiteX12" fmla="*/ 7222929 w 11546828"/>
+              <a:gd name="connsiteY12" fmla="*/ 6212748 h 6214534"/>
+              <a:gd name="connsiteX13" fmla="*/ 0 w 11546828"/>
+              <a:gd name="connsiteY13" fmla="*/ 6212748 h 6214534"/>
+            </a:gdLst>
+            <a:ahLst/>
+            <a:cxnLst>
+              <a:cxn ang="0">
+                <a:pos x="connsiteX0" y="connsiteY0"/>
+              </a:cxn>
+              <a:cxn ang="0">
+                <a:pos x="connsiteX1" y="connsiteY1"/>
+              </a:cxn>
+              <a:cxn ang="0">
+                <a:pos x="connsiteX2" y="connsiteY2"/>
+              </a:cxn>
+              <a:cxn ang="0">
+                <a:pos x="connsiteX3" y="connsiteY3"/>
+              </a:cxn>
+              <a:cxn ang="0">
+                <a:pos x="connsiteX4" y="connsiteY4"/>
+              </a:cxn>
+              <a:cxn ang="0">
+                <a:pos x="connsiteX5" y="connsiteY5"/>
+              </a:cxn>
+              <a:cxn ang="0">
+                <a:pos x="connsiteX6" y="connsiteY6"/>
+              </a:cxn>
+              <a:cxn ang="0">
+                <a:pos x="connsiteX7" y="connsiteY7"/>
+              </a:cxn>
+              <a:cxn ang="0">
+                <a:pos x="connsiteX8" y="connsiteY8"/>
+              </a:cxn>
+              <a:cxn ang="0">
+                <a:pos x="connsiteX9" y="connsiteY9"/>
+              </a:cxn>
+              <a:cxn ang="0">
+                <a:pos x="connsiteX10" y="connsiteY10"/>
+              </a:cxn>
+              <a:cxn ang="0">
+                <a:pos x="connsiteX11" y="connsiteY11"/>
+              </a:cxn>
+              <a:cxn ang="0">
+                <a:pos x="connsiteX12" y="connsiteY12"/>
+              </a:cxn>
+              <a:cxn ang="0">
+                <a:pos x="connsiteX13" y="connsiteY13"/>
+              </a:cxn>
+            </a:cxnLst>
+            <a:rect l="l" t="t" r="r" b="b"/>
+            <a:pathLst>
+              <a:path w="11546828" h="6214534">
+                <a:moveTo>
+                  <a:pt x="0" y="0"/>
+                </a:moveTo>
+                <a:lnTo>
+                  <a:pt x="7965430" y="0"/>
+                </a:lnTo>
+                <a:lnTo>
+                  <a:pt x="7965430" y="1786"/>
+                </a:lnTo>
+                <a:lnTo>
+                  <a:pt x="11546828" y="1786"/>
+                </a:lnTo>
+                <a:lnTo>
+                  <a:pt x="11546828" y="2866740"/>
+                </a:lnTo>
+                <a:lnTo>
+                  <a:pt x="11225095" y="3179536"/>
+                </a:lnTo>
+                <a:lnTo>
+                  <a:pt x="11225095" y="301542"/>
+                </a:lnTo>
+                <a:lnTo>
+                  <a:pt x="320042" y="301542"/>
+                </a:lnTo>
+                <a:lnTo>
+                  <a:pt x="320042" y="5909424"/>
+                </a:lnTo>
+                <a:lnTo>
+                  <a:pt x="8417210" y="5909424"/>
+                </a:lnTo>
+                <a:lnTo>
+                  <a:pt x="8103383" y="6214534"/>
+                </a:lnTo>
+                <a:lnTo>
+                  <a:pt x="7222929" y="6214534"/>
+                </a:lnTo>
+                <a:lnTo>
+                  <a:pt x="7222929" y="6212748"/>
+                </a:lnTo>
+                <a:lnTo>
+                  <a:pt x="0" y="6212748"/>
+                </a:lnTo>
+                <a:close/>
+              </a:path>
+            </a:pathLst>
+          </a:custGeom>
+          <a:solidFill>
+            <a:schemeClr val="tx1">
+              <a:lumMod val="50000"/>
+              <a:lumOff val="50000"/>
+              <a:alpha val="25000"/>
+            </a:schemeClr>
+          </a:solidFill>
+          <a:ln>
+            <a:noFill/>
+          </a:ln>
+        </p:spPr>
+        <p:style>
+          <a:lnRef idx="2">
+            <a:schemeClr val="accent1">
+              <a:shade val="50000"/>
+            </a:schemeClr>
+          </a:lnRef>
+          <a:fillRef idx="1">
+            <a:schemeClr val="accent1"/>
+          </a:fillRef>
+          <a:effectRef idx="0">
+            <a:schemeClr val="accent1"/>
+          </a:effectRef>
+          <a:fontRef idx="minor">
+            <a:schemeClr val="lt1"/>
+          </a:fontRef>
+        </p:style>
+        <p:txBody>
+          <a:bodyPr wrap="square" rtlCol="0" anchor="ctr">
+            <a:noAutofit/>
+          </a:bodyPr>
+          <a:lstStyle/>
+          <a:p>
+            <a:pPr algn="ctr"/>
+            <a:endParaRPr lang="en-US"/>
+          </a:p>
+        </p:txBody>
+      </p:sp>
+      <p:sp>
+        <p:nvSpPr>
+          <p:cNvPr id="13" name="Right Triangle 12">
+            <a:extLst>
+              <a:ext uri="{FF2B5EF4-FFF2-40B4-BE49-F238E27FC236}">
+                <a16:creationId xmlns:a16="http://schemas.microsoft.com/office/drawing/2014/main" id="{2AEAFA59-923A-4F54-8B49-44C970BCC323}"/>
+              </a:ext>
+              <a:ext uri="{C183D7F6-B498-43B3-948B-1728B52AA6E4}">
+                <adec:decorative xmlns:adec="http://schemas.microsoft.com/office/drawing/2017/decorative" val="1"/>
+              </a:ext>
+            </a:extLst>
+          </p:cNvPr>
+          <p:cNvSpPr>
+            <a:spLocks noGrp="1" noRot="1" noChangeAspect="1" noMove="1" noResize="1" noEditPoints="1" noAdjustHandles="1" noChangeArrowheads="1" noChangeShapeType="1" noTextEdit="1"/>
+          </p:cNvSpPr>
+          <p:nvPr>
+            <p:extLst>
+              <p:ext uri="{386F3935-93C4-4BCD-93E2-E3B085C9AB24}">
+                <p16:designElem xmlns:p16="http://schemas.microsoft.com/office/powerpoint/2015/main" val="1"/>
+              </p:ext>
+            </p:extLst>
+          </p:nvPr>
+        </p:nvSpPr>
+        <p:spPr>
+          <a:xfrm flipH="1">
+            <a:off x="8576720" y="3335867"/>
+            <a:ext cx="3291840" cy="3200400"/>
+          </a:xfrm>
+          <a:prstGeom prst="rtTriangle">
+            <a:avLst/>
+          </a:prstGeom>
+          <a:solidFill>
+            <a:schemeClr val="accent4"/>
+          </a:solidFill>
+          <a:ln>
+            <a:noFill/>
+          </a:ln>
+        </p:spPr>
+        <p:style>
+          <a:lnRef idx="2">
+            <a:schemeClr val="accent1">
+              <a:shade val="50000"/>
+            </a:schemeClr>
+          </a:lnRef>
+          <a:fillRef idx="1">
+            <a:schemeClr val="accent1"/>
+          </a:fillRef>
+          <a:effectRef idx="0">
+            <a:schemeClr val="accent1"/>
+          </a:effectRef>
+          <a:fontRef idx="minor">
+            <a:schemeClr val="lt1"/>
+          </a:fontRef>
+        </p:style>
+        <p:txBody>
+          <a:bodyPr rtlCol="0" anchor="ctr"/>
+          <a:lstStyle/>
+          <a:p>
+            <a:pPr algn="ctr"/>
+            <a:endParaRPr lang="en-US" dirty="0"/>
+          </a:p>
+        </p:txBody>
+      </p:sp>
+      <p:pic>
+        <p:nvPicPr>
+          <p:cNvPr id="4" name="Picture 3" descr="Diagram&#10;&#10;Description automatically generated">
+            <a:extLst>
+              <a:ext uri="{FF2B5EF4-FFF2-40B4-BE49-F238E27FC236}">
+                <a16:creationId xmlns:a16="http://schemas.microsoft.com/office/drawing/2014/main" id="{A14B216C-291A-0388-8088-64D3884E49AC}"/>
+              </a:ext>
+            </a:extLst>
+          </p:cNvPr>
+          <p:cNvPicPr>
+            <a:picLocks noChangeAspect="1"/>
+          </p:cNvPicPr>
+          <p:nvPr/>
+        </p:nvPicPr>
+        <p:blipFill>
+          <a:blip r:embed="rId2"/>
+          <a:stretch>
+            <a:fillRect/>
+          </a:stretch>
+        </p:blipFill>
+        <p:spPr>
+          <a:xfrm>
+            <a:off x="881184" y="939333"/>
+            <a:ext cx="5213962" cy="4979334"/>
+          </a:xfrm>
+          <a:prstGeom prst="rect">
+            <a:avLst/>
+          </a:prstGeom>
+        </p:spPr>
+      </p:pic>
+      <p:pic>
+        <p:nvPicPr>
+          <p:cNvPr id="5" name="Picture 4">
+            <a:extLst>
+              <a:ext uri="{FF2B5EF4-FFF2-40B4-BE49-F238E27FC236}">
+                <a16:creationId xmlns:a16="http://schemas.microsoft.com/office/drawing/2014/main" id="{2B9F3138-8654-34A2-200E-1F17C8FDD2D9}"/>
+              </a:ext>
+            </a:extLst>
+          </p:cNvPr>
+          <p:cNvPicPr>
+            <a:picLocks noChangeAspect="1"/>
+          </p:cNvPicPr>
+          <p:nvPr/>
+        </p:nvPicPr>
+        <p:blipFill>
+          <a:blip r:embed="rId3"/>
+          <a:stretch>
+            <a:fillRect/>
+          </a:stretch>
+        </p:blipFill>
+        <p:spPr>
+          <a:xfrm>
+            <a:off x="7267780" y="2351617"/>
+            <a:ext cx="3187700" cy="1968500"/>
+          </a:xfrm>
+          <a:prstGeom prst="rect">
+            <a:avLst/>
+          </a:prstGeom>
+        </p:spPr>
+      </p:pic>
+      <p:cxnSp>
+        <p:nvCxnSpPr>
+          <p:cNvPr id="10" name="Straight Connector 9">
+            <a:extLst>
+              <a:ext uri="{FF2B5EF4-FFF2-40B4-BE49-F238E27FC236}">
+                <a16:creationId xmlns:a16="http://schemas.microsoft.com/office/drawing/2014/main" id="{20EEC673-2FD9-24A3-BB70-17E772101ADB}"/>
+              </a:ext>
+            </a:extLst>
+          </p:cNvPr>
+          <p:cNvCxnSpPr>
+            <a:cxnSpLocks/>
+          </p:cNvCxnSpPr>
+          <p:nvPr/>
+        </p:nvCxnSpPr>
+        <p:spPr>
+          <a:xfrm>
+            <a:off x="4459705" y="3031958"/>
+            <a:ext cx="2894297" cy="303909"/>
+          </a:xfrm>
+          <a:prstGeom prst="line">
+            <a:avLst/>
+          </a:prstGeom>
+          <a:ln w="19050">
+            <a:solidFill>
+              <a:schemeClr val="accent6">
+                <a:lumMod val="50000"/>
+              </a:schemeClr>
+            </a:solidFill>
+          </a:ln>
+        </p:spPr>
+        <p:style>
+          <a:lnRef idx="1">
+            <a:schemeClr val="accent1"/>
+          </a:lnRef>
+          <a:fillRef idx="0">
+            <a:schemeClr val="accent1"/>
+          </a:fillRef>
+          <a:effectRef idx="0">
+            <a:schemeClr val="accent1"/>
+          </a:effectRef>
+          <a:fontRef idx="minor">
+            <a:schemeClr val="tx1"/>
+          </a:fontRef>
+        </p:style>
+      </p:cxnSp>
+      <p:cxnSp>
+        <p:nvCxnSpPr>
+          <p:cNvPr id="12" name="Straight Connector 11">
+            <a:extLst>
+              <a:ext uri="{FF2B5EF4-FFF2-40B4-BE49-F238E27FC236}">
+                <a16:creationId xmlns:a16="http://schemas.microsoft.com/office/drawing/2014/main" id="{8DFD5899-A21A-07EF-C837-42E845908853}"/>
+              </a:ext>
+            </a:extLst>
+          </p:cNvPr>
+          <p:cNvCxnSpPr>
+            <a:cxnSpLocks/>
+          </p:cNvCxnSpPr>
+          <p:nvPr/>
+        </p:nvCxnSpPr>
+        <p:spPr>
+          <a:xfrm flipV="1">
+            <a:off x="5277426" y="3335867"/>
+            <a:ext cx="2076576" cy="1600200"/>
+          </a:xfrm>
+          <a:prstGeom prst="line">
+            <a:avLst/>
+          </a:prstGeom>
+          <a:ln w="19050">
+            <a:solidFill>
+              <a:schemeClr val="accent6">
+                <a:lumMod val="50000"/>
+              </a:schemeClr>
+            </a:solidFill>
+          </a:ln>
+        </p:spPr>
+        <p:style>
+          <a:lnRef idx="1">
+            <a:schemeClr val="accent1"/>
+          </a:lnRef>
+          <a:fillRef idx="0">
+            <a:schemeClr val="accent1"/>
+          </a:fillRef>
+          <a:effectRef idx="0">
+            <a:schemeClr val="accent1"/>
+          </a:effectRef>
+          <a:fontRef idx="minor">
+            <a:schemeClr val="tx1"/>
+          </a:fontRef>
+        </p:style>
+      </p:cxnSp>
+      <p:sp>
+        <p:nvSpPr>
+          <p:cNvPr id="19" name="TextBox 18">
+            <a:extLst>
+              <a:ext uri="{FF2B5EF4-FFF2-40B4-BE49-F238E27FC236}">
+                <a16:creationId xmlns:a16="http://schemas.microsoft.com/office/drawing/2014/main" id="{FD21E799-8F56-6FB5-9D6A-56C7473FDA51}"/>
+              </a:ext>
+            </a:extLst>
+          </p:cNvPr>
+          <p:cNvSpPr txBox="1"/>
+          <p:nvPr/>
+        </p:nvSpPr>
+        <p:spPr>
+          <a:xfrm>
+            <a:off x="4233244" y="708500"/>
+            <a:ext cx="1673609" cy="461665"/>
+          </a:xfrm>
+          <a:prstGeom prst="rect">
+            <a:avLst/>
+          </a:prstGeom>
+          <a:noFill/>
+        </p:spPr>
+        <p:txBody>
+          <a:bodyPr wrap="square">
+            <a:spAutoFit/>
+          </a:bodyPr>
+          <a:lstStyle/>
+          <a:p>
+            <a:r>
+              <a:rPr lang="en-US" sz="2400" dirty="0">
+                <a:solidFill>
+                  <a:schemeClr val="tx1">
+                    <a:lumMod val="50000"/>
+                    <a:lumOff val="50000"/>
+                  </a:schemeClr>
+                </a:solidFill>
+                <a:hlinkClick r:id="rId4">
+                  <a:extLst>
+                    <a:ext uri="{A12FA001-AC4F-418D-AE19-62706E023703}">
+                      <ahyp:hlinkClr xmlns:ahyp="http://schemas.microsoft.com/office/drawing/2018/hyperlinkcolor" val="tx"/>
+                    </a:ext>
+                  </a:extLst>
+                </a:hlinkClick>
+              </a:rPr>
+              <a:t>REFERENCE</a:t>
+            </a:r>
+            <a:endParaRPr lang="en-US" sz="2400" dirty="0">
+              <a:solidFill>
+                <a:schemeClr val="tx1">
+                  <a:lumMod val="50000"/>
+                  <a:lumOff val="50000"/>
+                </a:schemeClr>
+              </a:solidFill>
+            </a:endParaRPr>
+          </a:p>
+        </p:txBody>
+      </p:sp>
+    </p:spTree>
+    <p:extLst>
+      <p:ext uri="{BB962C8B-B14F-4D97-AF65-F5344CB8AC3E}">
+        <p14:creationId xmlns:p14="http://schemas.microsoft.com/office/powerpoint/2010/main" val="3705446685"/>
+      </p:ext>
+    </p:extLst>
+  </p:cSld>
+  <p:clrMapOvr>
+    <a:masterClrMapping/>
+  </p:clrMapOvr>
+</p:sld>
+</file>
+
+<file path=ppt/slides/slide8.xml><?xml version="1.0" encoding="utf-8"?>
+<p:sld xmlns:a="http://schemas.openxmlformats.org/drawingml/2006/main" xmlns:r="http://schemas.openxmlformats.org/officeDocument/2006/relationships" xmlns:p="http://schemas.openxmlformats.org/presentationml/2006/main">
+  <p:cSld>
+    <p:bg>
+      <p:bgPr>
+        <a:solidFill>
+          <a:schemeClr val="bg1"/>
+        </a:solidFill>
+        <a:effectLst/>
+      </p:bgPr>
+    </p:bg>
+    <p:spTree>
+      <p:nvGrpSpPr>
+        <p:cNvPr id="1" name=""/>
+        <p:cNvGrpSpPr/>
+        <p:nvPr/>
+      </p:nvGrpSpPr>
+      <p:grpSpPr>
+        <a:xfrm>
+          <a:off x="0" y="0"/>
+          <a:ext cx="0" cy="0"/>
+          <a:chOff x="0" y="0"/>
+          <a:chExt cx="0" cy="0"/>
+        </a:xfrm>
+      </p:grpSpPr>
+      <p:sp>
+        <p:nvSpPr>
+          <p:cNvPr id="18" name="Rectangle 17">
+            <a:extLst>
+              <a:ext uri="{FF2B5EF4-FFF2-40B4-BE49-F238E27FC236}">
+                <a16:creationId xmlns:a16="http://schemas.microsoft.com/office/drawing/2014/main" id="{A9F529C3-C941-49FD-8C67-82F134F64BDB}"/>
+              </a:ext>
+              <a:ext uri="{C183D7F6-B498-43B3-948B-1728B52AA6E4}">
+                <adec:decorative xmlns:adec="http://schemas.microsoft.com/office/drawing/2017/decorative" val="1"/>
+              </a:ext>
+            </a:extLst>
+          </p:cNvPr>
+          <p:cNvSpPr>
+            <a:spLocks noGrp="1" noRot="1" noChangeAspect="1" noMove="1" noResize="1" noEditPoints="1" noAdjustHandles="1" noChangeArrowheads="1" noChangeShapeType="1" noTextEdit="1"/>
+          </p:cNvSpPr>
+          <p:nvPr>
+            <p:extLst>
+              <p:ext uri="{386F3935-93C4-4BCD-93E2-E3B085C9AB24}">
+                <p16:designElem xmlns:p16="http://schemas.microsoft.com/office/powerpoint/2015/main" val="1"/>
+              </p:ext>
+            </p:extLst>
+          </p:nvPr>
+        </p:nvSpPr>
+        <p:spPr>
+          <a:xfrm>
+            <a:off x="0" y="0"/>
+            <a:ext cx="12192000" cy="6858000"/>
+          </a:xfrm>
+          <a:prstGeom prst="rect">
+            <a:avLst/>
+          </a:prstGeom>
+          <a:solidFill>
+            <a:schemeClr val="tx1">
+              <a:lumMod val="50000"/>
+              <a:lumOff val="50000"/>
+              <a:alpha val="30000"/>
+            </a:schemeClr>
+          </a:solidFill>
+          <a:ln>
+            <a:noFill/>
+          </a:ln>
+        </p:spPr>
+        <p:style>
+          <a:lnRef idx="2">
+            <a:schemeClr val="accent1">
+              <a:shade val="50000"/>
+            </a:schemeClr>
+          </a:lnRef>
+          <a:fillRef idx="1">
+            <a:schemeClr val="accent1"/>
+          </a:fillRef>
+          <a:effectRef idx="0">
+            <a:schemeClr val="accent1"/>
+          </a:effectRef>
+          <a:fontRef idx="minor">
+            <a:schemeClr val="lt1"/>
+          </a:fontRef>
+        </p:style>
+        <p:txBody>
+          <a:bodyPr rtlCol="0" anchor="ctr"/>
+          <a:lstStyle/>
+          <a:p>
+            <a:pPr algn="ctr"/>
+            <a:endParaRPr lang="en-US"/>
+          </a:p>
+        </p:txBody>
+      </p:sp>
+      <p:sp>
+        <p:nvSpPr>
+          <p:cNvPr id="20" name="Rectangle 19">
+            <a:extLst>
+              <a:ext uri="{FF2B5EF4-FFF2-40B4-BE49-F238E27FC236}">
+                <a16:creationId xmlns:a16="http://schemas.microsoft.com/office/drawing/2014/main" id="{20586029-32A0-47E5-9AEC-AE3ABA6B94D0}"/>
+              </a:ext>
+              <a:ext uri="{C183D7F6-B498-43B3-948B-1728B52AA6E4}">
+                <adec:decorative xmlns:adec="http://schemas.microsoft.com/office/drawing/2017/decorative" val="1"/>
+              </a:ext>
+            </a:extLst>
+          </p:cNvPr>
+          <p:cNvSpPr>
+            <a:spLocks noGrp="1" noRot="1" noChangeAspect="1" noMove="1" noResize="1" noEditPoints="1" noAdjustHandles="1" noChangeArrowheads="1" noChangeShapeType="1" noTextEdit="1"/>
+          </p:cNvSpPr>
+          <p:nvPr>
+            <p:extLst>
+              <p:ext uri="{386F3935-93C4-4BCD-93E2-E3B085C9AB24}">
+                <p16:designElem xmlns:p16="http://schemas.microsoft.com/office/powerpoint/2015/main" val="1"/>
+              </p:ext>
+            </p:extLst>
+          </p:nvPr>
+        </p:nvSpPr>
+        <p:spPr>
+          <a:xfrm>
+            <a:off x="477012" y="480060"/>
+            <a:ext cx="11237976" cy="5897880"/>
+          </a:xfrm>
+          <a:prstGeom prst="rect">
+            <a:avLst/>
+          </a:prstGeom>
+          <a:solidFill>
+            <a:srgbClr val="FFFFFF"/>
+          </a:solidFill>
+          <a:ln w="9525">
+            <a:noFill/>
+          </a:ln>
+          <a:effectLst>
+            <a:outerShdw blurRad="63500" dist="17780" dir="5400000" algn="t" rotWithShape="0">
+              <a:prstClr val="black">
+                <a:alpha val="43000"/>
+              </a:prstClr>
+            </a:outerShdw>
+          </a:effectLst>
+        </p:spPr>
+        <p:style>
+          <a:lnRef idx="2">
+            <a:schemeClr val="accent1">
+              <a:shade val="50000"/>
+            </a:schemeClr>
+          </a:lnRef>
+          <a:fillRef idx="1">
+            <a:schemeClr val="accent1"/>
+          </a:fillRef>
+          <a:effectRef idx="0">
+            <a:schemeClr val="accent1"/>
+          </a:effectRef>
+          <a:fontRef idx="minor">
+            <a:schemeClr val="lt1"/>
+          </a:fontRef>
+        </p:style>
+        <p:txBody>
+          <a:bodyPr rtlCol="0" anchor="ctr"/>
+          <a:lstStyle/>
+          <a:p>
+            <a:pPr algn="ctr"/>
+            <a:endParaRPr lang="en-US"/>
+          </a:p>
+        </p:txBody>
+      </p:sp>
+      <p:pic>
+        <p:nvPicPr>
+          <p:cNvPr id="4" name="Picture 3">
+            <a:extLst>
+              <a:ext uri="{FF2B5EF4-FFF2-40B4-BE49-F238E27FC236}">
+                <a16:creationId xmlns:a16="http://schemas.microsoft.com/office/drawing/2014/main" id="{D76A2864-22AA-67A7-FFB6-EA78D6598245}"/>
+              </a:ext>
+            </a:extLst>
+          </p:cNvPr>
+          <p:cNvPicPr>
+            <a:picLocks noChangeAspect="1"/>
+          </p:cNvPicPr>
+          <p:nvPr/>
+        </p:nvPicPr>
+        <p:blipFill>
+          <a:blip r:embed="rId2"/>
+          <a:stretch>
+            <a:fillRect/>
+          </a:stretch>
+        </p:blipFill>
+        <p:spPr>
+          <a:xfrm>
+            <a:off x="643467" y="1052996"/>
+            <a:ext cx="5294716" cy="4752006"/>
+          </a:xfrm>
+          <a:prstGeom prst="rect">
+            <a:avLst/>
+          </a:prstGeom>
+        </p:spPr>
+      </p:pic>
+      <p:cxnSp>
+        <p:nvCxnSpPr>
+          <p:cNvPr id="22" name="Straight Connector 21">
+            <a:extLst>
+              <a:ext uri="{FF2B5EF4-FFF2-40B4-BE49-F238E27FC236}">
+                <a16:creationId xmlns:a16="http://schemas.microsoft.com/office/drawing/2014/main" id="{8C730EAB-A532-4295-A302-FB4B90DB9F5E}"/>
+              </a:ext>
+              <a:ext uri="{C183D7F6-B498-43B3-948B-1728B52AA6E4}">
+                <adec:decorative xmlns:adec="http://schemas.microsoft.com/office/drawing/2017/decorative" val="1"/>
+              </a:ext>
+            </a:extLst>
+          </p:cNvPr>
+          <p:cNvCxnSpPr>
+            <a:cxnSpLocks noGrp="1" noRot="1" noChangeAspect="1" noMove="1" noResize="1" noEditPoints="1" noAdjustHandles="1" noChangeArrowheads="1" noChangeShapeType="1"/>
+          </p:cNvCxnSpPr>
+          <p:nvPr>
+            <p:extLst>
+              <p:ext uri="{386F3935-93C4-4BCD-93E2-E3B085C9AB24}">
+                <p16:designElem xmlns:p16="http://schemas.microsoft.com/office/powerpoint/2015/main" val="1"/>
+              </p:ext>
+            </p:extLst>
+          </p:nvPr>
+        </p:nvCxnSpPr>
+        <p:spPr>
+          <a:xfrm>
+            <a:off x="6079958" y="1143000"/>
+            <a:ext cx="0" cy="4572000"/>
+          </a:xfrm>
+          <a:prstGeom prst="line">
+            <a:avLst/>
+          </a:prstGeom>
+          <a:ln>
+            <a:solidFill>
+              <a:srgbClr val="4E4E4E"/>
+            </a:solidFill>
+          </a:ln>
+        </p:spPr>
+        <p:style>
+          <a:lnRef idx="1">
+            <a:schemeClr val="accent1"/>
+          </a:lnRef>
+          <a:fillRef idx="0">
+            <a:schemeClr val="accent1"/>
+          </a:fillRef>
+          <a:effectRef idx="0">
+            <a:schemeClr val="accent1"/>
+          </a:effectRef>
+          <a:fontRef idx="minor">
+            <a:schemeClr val="tx1"/>
+          </a:fontRef>
+        </p:style>
+      </p:cxnSp>
+      <p:pic>
+        <p:nvPicPr>
+          <p:cNvPr id="5" name="Picture 4">
+            <a:extLst>
+              <a:ext uri="{FF2B5EF4-FFF2-40B4-BE49-F238E27FC236}">
+                <a16:creationId xmlns:a16="http://schemas.microsoft.com/office/drawing/2014/main" id="{4BC9EA5B-F4FC-B0DC-0DF7-5F5D61E65A92}"/>
+              </a:ext>
+            </a:extLst>
+          </p:cNvPr>
+          <p:cNvPicPr>
+            <a:picLocks noChangeAspect="1"/>
+          </p:cNvPicPr>
+          <p:nvPr/>
+        </p:nvPicPr>
+        <p:blipFill rotWithShape="1">
+          <a:blip r:embed="rId3"/>
+          <a:srcRect l="1246" t="96" r="1754" b="-96"/>
+          <a:stretch/>
+        </p:blipFill>
+        <p:spPr>
+          <a:xfrm rot="1206095">
+            <a:off x="6292897" y="793828"/>
+            <a:ext cx="5135873" cy="5135873"/>
+          </a:xfrm>
+          <a:prstGeom prst="snipRoundRect">
+            <a:avLst/>
+          </a:prstGeom>
+        </p:spPr>
+      </p:pic>
+      <p:sp>
+        <p:nvSpPr>
+          <p:cNvPr id="6" name="Right Triangle 5">
+            <a:extLst>
+              <a:ext uri="{FF2B5EF4-FFF2-40B4-BE49-F238E27FC236}">
+                <a16:creationId xmlns:a16="http://schemas.microsoft.com/office/drawing/2014/main" id="{3A1B59DA-ED75-DE7F-B2F3-A9102A79966D}"/>
+              </a:ext>
+            </a:extLst>
+          </p:cNvPr>
+          <p:cNvSpPr/>
+          <p:nvPr/>
+        </p:nvSpPr>
+        <p:spPr>
+          <a:xfrm rot="16200000">
+            <a:off x="4211926" y="3937001"/>
+            <a:ext cx="1192661" cy="2543340"/>
+          </a:xfrm>
+          <a:prstGeom prst="rtTriangle">
+            <a:avLst/>
+          </a:prstGeom>
+          <a:solidFill>
+            <a:schemeClr val="bg1"/>
+          </a:solidFill>
+          <a:ln>
+            <a:noFill/>
+          </a:ln>
+        </p:spPr>
+        <p:style>
+          <a:lnRef idx="2">
+            <a:schemeClr val="accent1">
+              <a:shade val="50000"/>
+            </a:schemeClr>
+          </a:lnRef>
+          <a:fillRef idx="1">
+            <a:schemeClr val="accent1"/>
+          </a:fillRef>
+          <a:effectRef idx="0">
+            <a:schemeClr val="accent1"/>
+          </a:effectRef>
+          <a:fontRef idx="minor">
+            <a:schemeClr val="lt1"/>
+          </a:fontRef>
+        </p:style>
+        <p:txBody>
+          <a:bodyPr rtlCol="0" anchor="ctr"/>
+          <a:lstStyle/>
+          <a:p>
+            <a:pPr algn="ctr"/>
+            <a:endParaRPr lang="en-US"/>
+          </a:p>
+        </p:txBody>
+      </p:sp>
+      <mc:AlternateContent xmlns:mc="http://schemas.openxmlformats.org/markup-compatibility/2006">
+        <mc:Choice xmlns:p14="http://schemas.microsoft.com/office/powerpoint/2010/main" Requires="p14">
+          <p:contentPart p14:bwMode="auto" r:id="rId4">
+            <p14:nvContentPartPr>
+              <p14:cNvPr id="7" name="Ink 6">
+                <a:extLst>
+                  <a:ext uri="{FF2B5EF4-FFF2-40B4-BE49-F238E27FC236}">
+                    <a16:creationId xmlns:a16="http://schemas.microsoft.com/office/drawing/2014/main" id="{51789039-9DA3-329E-9BDB-5C2DDA6AC31E}"/>
+                  </a:ext>
+                </a:extLst>
+              </p14:cNvPr>
+              <p14:cNvContentPartPr/>
+              <p14:nvPr/>
+            </p14:nvContentPartPr>
+            <p14:xfrm>
+              <a:off x="649991" y="1949252"/>
+              <a:ext cx="5269680" cy="1981440"/>
+            </p14:xfrm>
+          </p:contentPart>
+        </mc:Choice>
+        <mc:Fallback>
+          <p:pic>
+            <p:nvPicPr>
+              <p:cNvPr id="7" name="Ink 6">
+                <a:extLst>
+                  <a:ext uri="{FF2B5EF4-FFF2-40B4-BE49-F238E27FC236}">
+                    <a16:creationId xmlns:a16="http://schemas.microsoft.com/office/drawing/2014/main" id="{51789039-9DA3-329E-9BDB-5C2DDA6AC31E}"/>
+                  </a:ext>
+                </a:extLst>
+              </p:cNvPr>
+              <p:cNvPicPr/>
+              <p:nvPr/>
+            </p:nvPicPr>
+            <p:blipFill>
+              <a:blip r:embed="rId5"/>
+              <a:stretch>
+                <a:fillRect/>
+              </a:stretch>
+            </p:blipFill>
+            <p:spPr>
+              <a:xfrm>
+                <a:off x="645671" y="1944932"/>
+                <a:ext cx="5278320" cy="1990080"/>
+              </a:xfrm>
+              <a:prstGeom prst="rect">
+                <a:avLst/>
+              </a:prstGeom>
+            </p:spPr>
+          </p:pic>
+        </mc:Fallback>
+      </mc:AlternateContent>
+      <p:grpSp>
+        <p:nvGrpSpPr>
+          <p:cNvPr id="26" name="Group 25">
+            <a:extLst>
+              <a:ext uri="{FF2B5EF4-FFF2-40B4-BE49-F238E27FC236}">
+                <a16:creationId xmlns:a16="http://schemas.microsoft.com/office/drawing/2014/main" id="{87CD6126-4D3E-235D-EB5F-E0D10F9152E7}"/>
+              </a:ext>
+            </a:extLst>
+          </p:cNvPr>
+          <p:cNvGrpSpPr/>
+          <p:nvPr/>
+        </p:nvGrpSpPr>
+        <p:grpSpPr>
+          <a:xfrm>
+            <a:off x="4402271" y="1849172"/>
+            <a:ext cx="1504800" cy="770760"/>
+            <a:chOff x="4402271" y="1849172"/>
+            <a:chExt cx="1504800" cy="770760"/>
+          </a:xfrm>
+        </p:grpSpPr>
+        <mc:AlternateContent xmlns:mc="http://schemas.openxmlformats.org/markup-compatibility/2006">
+          <mc:Choice xmlns:p14="http://schemas.microsoft.com/office/powerpoint/2010/main" Requires="p14">
+            <p:contentPart p14:bwMode="auto" r:id="rId6">
+              <p14:nvContentPartPr>
+                <p14:cNvPr id="8" name="Ink 7">
+                  <a:extLst>
+                    <a:ext uri="{FF2B5EF4-FFF2-40B4-BE49-F238E27FC236}">
+                      <a16:creationId xmlns:a16="http://schemas.microsoft.com/office/drawing/2014/main" id="{ACEA224B-A709-DC43-B3F7-A2311DDF7B31}"/>
+                    </a:ext>
+                  </a:extLst>
+                </p14:cNvPr>
+                <p14:cNvContentPartPr/>
+                <p14:nvPr/>
+              </p14:nvContentPartPr>
+              <p14:xfrm>
+                <a:off x="4617551" y="2094692"/>
+                <a:ext cx="64080" cy="168840"/>
+              </p14:xfrm>
+            </p:contentPart>
+          </mc:Choice>
+          <mc:Fallback>
+            <p:pic>
+              <p:nvPicPr>
+                <p:cNvPr id="8" name="Ink 7">
+                  <a:extLst>
+                    <a:ext uri="{FF2B5EF4-FFF2-40B4-BE49-F238E27FC236}">
+                      <a16:creationId xmlns:a16="http://schemas.microsoft.com/office/drawing/2014/main" id="{ACEA224B-A709-DC43-B3F7-A2311DDF7B31}"/>
+                    </a:ext>
+                  </a:extLst>
+                </p:cNvPr>
+                <p:cNvPicPr/>
+                <p:nvPr/>
+              </p:nvPicPr>
+              <p:blipFill>
+                <a:blip r:embed="rId7"/>
+                <a:stretch>
+                  <a:fillRect/>
+                </a:stretch>
+              </p:blipFill>
+              <p:spPr>
+                <a:xfrm>
+                  <a:off x="4609991" y="2087132"/>
+                  <a:ext cx="79200" cy="183960"/>
+                </a:xfrm>
+                <a:prstGeom prst="rect">
+                  <a:avLst/>
+                </a:prstGeom>
+              </p:spPr>
+            </p:pic>
+          </mc:Fallback>
+        </mc:AlternateContent>
+        <mc:AlternateContent xmlns:mc="http://schemas.openxmlformats.org/markup-compatibility/2006">
+          <mc:Choice xmlns:p14="http://schemas.microsoft.com/office/powerpoint/2010/main" Requires="p14">
+            <p:contentPart p14:bwMode="auto" r:id="rId8">
+              <p14:nvContentPartPr>
+                <p14:cNvPr id="10" name="Ink 9">
+                  <a:extLst>
+                    <a:ext uri="{FF2B5EF4-FFF2-40B4-BE49-F238E27FC236}">
+                      <a16:creationId xmlns:a16="http://schemas.microsoft.com/office/drawing/2014/main" id="{A45A7148-8327-8FC4-0438-227C28342D4A}"/>
+                    </a:ext>
+                  </a:extLst>
+                </p14:cNvPr>
+                <p14:cNvContentPartPr/>
+                <p14:nvPr/>
+              </p14:nvContentPartPr>
+              <p14:xfrm>
+                <a:off x="4728071" y="2029172"/>
+                <a:ext cx="57600" cy="218520"/>
+              </p14:xfrm>
+            </p:contentPart>
+          </mc:Choice>
+          <mc:Fallback>
+            <p:pic>
+              <p:nvPicPr>
+                <p:cNvPr id="10" name="Ink 9">
+                  <a:extLst>
+                    <a:ext uri="{FF2B5EF4-FFF2-40B4-BE49-F238E27FC236}">
+                      <a16:creationId xmlns:a16="http://schemas.microsoft.com/office/drawing/2014/main" id="{A45A7148-8327-8FC4-0438-227C28342D4A}"/>
+                    </a:ext>
+                  </a:extLst>
+                </p:cNvPr>
+                <p:cNvPicPr/>
+                <p:nvPr/>
+              </p:nvPicPr>
+              <p:blipFill>
+                <a:blip r:embed="rId9"/>
+                <a:stretch>
+                  <a:fillRect/>
+                </a:stretch>
+              </p:blipFill>
+              <p:spPr>
+                <a:xfrm>
+                  <a:off x="4720511" y="2021972"/>
+                  <a:ext cx="72720" cy="233640"/>
+                </a:xfrm>
+                <a:prstGeom prst="rect">
+                  <a:avLst/>
+                </a:prstGeom>
+              </p:spPr>
+            </p:pic>
+          </mc:Fallback>
+        </mc:AlternateContent>
+        <mc:AlternateContent xmlns:mc="http://schemas.openxmlformats.org/markup-compatibility/2006">
+          <mc:Choice xmlns:p14="http://schemas.microsoft.com/office/powerpoint/2010/main" Requires="p14">
+            <p:contentPart p14:bwMode="auto" r:id="rId10">
+              <p14:nvContentPartPr>
+                <p14:cNvPr id="12" name="Ink 11">
+                  <a:extLst>
+                    <a:ext uri="{FF2B5EF4-FFF2-40B4-BE49-F238E27FC236}">
+                      <a16:creationId xmlns:a16="http://schemas.microsoft.com/office/drawing/2014/main" id="{AE9A87BA-91DA-9FE1-3FEA-0EF69F28B3BA}"/>
+                    </a:ext>
+                  </a:extLst>
+                </p14:cNvPr>
+                <p14:cNvContentPartPr/>
+                <p14:nvPr/>
+              </p14:nvContentPartPr>
+              <p14:xfrm>
+                <a:off x="4635911" y="2093972"/>
+                <a:ext cx="222480" cy="104040"/>
+              </p14:xfrm>
+            </p:contentPart>
+          </mc:Choice>
+          <mc:Fallback>
+            <p:pic>
+              <p:nvPicPr>
+                <p:cNvPr id="12" name="Ink 11">
+                  <a:extLst>
+                    <a:ext uri="{FF2B5EF4-FFF2-40B4-BE49-F238E27FC236}">
+                      <a16:creationId xmlns:a16="http://schemas.microsoft.com/office/drawing/2014/main" id="{AE9A87BA-91DA-9FE1-3FEA-0EF69F28B3BA}"/>
+                    </a:ext>
+                  </a:extLst>
+                </p:cNvPr>
+                <p:cNvPicPr/>
+                <p:nvPr/>
+              </p:nvPicPr>
+              <p:blipFill>
+                <a:blip r:embed="rId11"/>
+                <a:stretch>
+                  <a:fillRect/>
+                </a:stretch>
+              </p:blipFill>
+              <p:spPr>
+                <a:xfrm>
+                  <a:off x="4628351" y="2086412"/>
+                  <a:ext cx="237600" cy="119160"/>
+                </a:xfrm>
+                <a:prstGeom prst="rect">
+                  <a:avLst/>
+                </a:prstGeom>
+              </p:spPr>
+            </p:pic>
+          </mc:Fallback>
+        </mc:AlternateContent>
+        <mc:AlternateContent xmlns:mc="http://schemas.openxmlformats.org/markup-compatibility/2006">
+          <mc:Choice xmlns:p14="http://schemas.microsoft.com/office/powerpoint/2010/main" Requires="p14">
+            <p:contentPart p14:bwMode="auto" r:id="rId12">
+              <p14:nvContentPartPr>
+                <p14:cNvPr id="14" name="Ink 13">
+                  <a:extLst>
+                    <a:ext uri="{FF2B5EF4-FFF2-40B4-BE49-F238E27FC236}">
+                      <a16:creationId xmlns:a16="http://schemas.microsoft.com/office/drawing/2014/main" id="{C9B04809-4DE4-1F03-B1C3-882456EDF327}"/>
+                    </a:ext>
+                  </a:extLst>
+                </p14:cNvPr>
+                <p14:cNvContentPartPr/>
+                <p14:nvPr/>
+              </p14:nvContentPartPr>
+              <p14:xfrm>
+                <a:off x="4842911" y="2073092"/>
+                <a:ext cx="225720" cy="104760"/>
+              </p14:xfrm>
+            </p:contentPart>
+          </mc:Choice>
+          <mc:Fallback>
+            <p:pic>
+              <p:nvPicPr>
+                <p:cNvPr id="14" name="Ink 13">
+                  <a:extLst>
+                    <a:ext uri="{FF2B5EF4-FFF2-40B4-BE49-F238E27FC236}">
+                      <a16:creationId xmlns:a16="http://schemas.microsoft.com/office/drawing/2014/main" id="{C9B04809-4DE4-1F03-B1C3-882456EDF327}"/>
+                    </a:ext>
+                  </a:extLst>
+                </p:cNvPr>
+                <p:cNvPicPr/>
+                <p:nvPr/>
+              </p:nvPicPr>
+              <p:blipFill>
+                <a:blip r:embed="rId13"/>
+                <a:stretch>
+                  <a:fillRect/>
+                </a:stretch>
+              </p:blipFill>
+              <p:spPr>
+                <a:xfrm>
+                  <a:off x="4835351" y="2065532"/>
+                  <a:ext cx="240840" cy="119880"/>
+                </a:xfrm>
+                <a:prstGeom prst="rect">
+                  <a:avLst/>
+                </a:prstGeom>
+              </p:spPr>
+            </p:pic>
+          </mc:Fallback>
+        </mc:AlternateContent>
+        <mc:AlternateContent xmlns:mc="http://schemas.openxmlformats.org/markup-compatibility/2006">
+          <mc:Choice xmlns:p14="http://schemas.microsoft.com/office/powerpoint/2010/main" Requires="p14">
+            <p:contentPart p14:bwMode="auto" r:id="rId14">
+              <p14:nvContentPartPr>
+                <p14:cNvPr id="15" name="Ink 14">
+                  <a:extLst>
+                    <a:ext uri="{FF2B5EF4-FFF2-40B4-BE49-F238E27FC236}">
+                      <a16:creationId xmlns:a16="http://schemas.microsoft.com/office/drawing/2014/main" id="{926ED7C0-5DD5-35F1-9409-22FC557E2D35}"/>
+                    </a:ext>
+                  </a:extLst>
+                </p14:cNvPr>
+                <p14:cNvContentPartPr/>
+                <p14:nvPr/>
+              </p14:nvContentPartPr>
+              <p14:xfrm>
+                <a:off x="5087711" y="2025212"/>
+                <a:ext cx="97560" cy="85320"/>
+              </p14:xfrm>
+            </p:contentPart>
+          </mc:Choice>
+          <mc:Fallback>
+            <p:pic>
+              <p:nvPicPr>
+                <p:cNvPr id="15" name="Ink 14">
+                  <a:extLst>
+                    <a:ext uri="{FF2B5EF4-FFF2-40B4-BE49-F238E27FC236}">
+                      <a16:creationId xmlns:a16="http://schemas.microsoft.com/office/drawing/2014/main" id="{926ED7C0-5DD5-35F1-9409-22FC557E2D35}"/>
+                    </a:ext>
+                  </a:extLst>
+                </p:cNvPr>
+                <p:cNvPicPr/>
+                <p:nvPr/>
+              </p:nvPicPr>
+              <p:blipFill>
+                <a:blip r:embed="rId15"/>
+                <a:stretch>
+                  <a:fillRect/>
+                </a:stretch>
+              </p:blipFill>
+              <p:spPr>
+                <a:xfrm>
+                  <a:off x="5080151" y="2017652"/>
+                  <a:ext cx="112680" cy="100440"/>
+                </a:xfrm>
+                <a:prstGeom prst="rect">
+                  <a:avLst/>
+                </a:prstGeom>
+              </p:spPr>
+            </p:pic>
+          </mc:Fallback>
+        </mc:AlternateContent>
+        <mc:AlternateContent xmlns:mc="http://schemas.openxmlformats.org/markup-compatibility/2006">
+          <mc:Choice xmlns:p14="http://schemas.microsoft.com/office/powerpoint/2010/main" Requires="p14">
+            <p:contentPart p14:bwMode="auto" r:id="rId16">
+              <p14:nvContentPartPr>
+                <p14:cNvPr id="16" name="Ink 15">
+                  <a:extLst>
+                    <a:ext uri="{FF2B5EF4-FFF2-40B4-BE49-F238E27FC236}">
+                      <a16:creationId xmlns:a16="http://schemas.microsoft.com/office/drawing/2014/main" id="{DC7576C8-DB0C-B502-C378-0D86327D163E}"/>
+                    </a:ext>
+                  </a:extLst>
+                </p14:cNvPr>
+                <p14:cNvContentPartPr/>
+                <p14:nvPr/>
+              </p14:nvContentPartPr>
+              <p14:xfrm>
+                <a:off x="5198951" y="1991012"/>
+                <a:ext cx="142920" cy="95400"/>
+              </p14:xfrm>
+            </p:contentPart>
+          </mc:Choice>
+          <mc:Fallback>
+            <p:pic>
+              <p:nvPicPr>
+                <p:cNvPr id="16" name="Ink 15">
+                  <a:extLst>
+                    <a:ext uri="{FF2B5EF4-FFF2-40B4-BE49-F238E27FC236}">
+                      <a16:creationId xmlns:a16="http://schemas.microsoft.com/office/drawing/2014/main" id="{DC7576C8-DB0C-B502-C378-0D86327D163E}"/>
+                    </a:ext>
+                  </a:extLst>
+                </p:cNvPr>
+                <p:cNvPicPr/>
+                <p:nvPr/>
+              </p:nvPicPr>
+              <p:blipFill>
+                <a:blip r:embed="rId17"/>
+                <a:stretch>
+                  <a:fillRect/>
+                </a:stretch>
+              </p:blipFill>
+              <p:spPr>
+                <a:xfrm>
+                  <a:off x="5191391" y="1983452"/>
+                  <a:ext cx="158040" cy="110160"/>
+                </a:xfrm>
+                <a:prstGeom prst="rect">
+                  <a:avLst/>
+                </a:prstGeom>
+              </p:spPr>
+            </p:pic>
+          </mc:Fallback>
+        </mc:AlternateContent>
+        <mc:AlternateContent xmlns:mc="http://schemas.openxmlformats.org/markup-compatibility/2006">
+          <mc:Choice xmlns:p14="http://schemas.microsoft.com/office/powerpoint/2010/main" Requires="p14">
+            <p:contentPart p14:bwMode="auto" r:id="rId18">
+              <p14:nvContentPartPr>
+                <p14:cNvPr id="17" name="Ink 16">
+                  <a:extLst>
+                    <a:ext uri="{FF2B5EF4-FFF2-40B4-BE49-F238E27FC236}">
+                      <a16:creationId xmlns:a16="http://schemas.microsoft.com/office/drawing/2014/main" id="{04007477-6BA0-2633-99A3-0953FC6B31E8}"/>
+                    </a:ext>
+                  </a:extLst>
+                </p14:cNvPr>
+                <p14:cNvContentPartPr/>
+                <p14:nvPr/>
+              </p14:nvContentPartPr>
+              <p14:xfrm>
+                <a:off x="4846151" y="2335532"/>
+                <a:ext cx="87120" cy="258120"/>
+              </p14:xfrm>
+            </p:contentPart>
+          </mc:Choice>
+          <mc:Fallback>
+            <p:pic>
+              <p:nvPicPr>
+                <p:cNvPr id="17" name="Ink 16">
+                  <a:extLst>
+                    <a:ext uri="{FF2B5EF4-FFF2-40B4-BE49-F238E27FC236}">
+                      <a16:creationId xmlns:a16="http://schemas.microsoft.com/office/drawing/2014/main" id="{04007477-6BA0-2633-99A3-0953FC6B31E8}"/>
+                    </a:ext>
+                  </a:extLst>
+                </p:cNvPr>
+                <p:cNvPicPr/>
+                <p:nvPr/>
+              </p:nvPicPr>
+              <p:blipFill>
+                <a:blip r:embed="rId19"/>
+                <a:stretch>
+                  <a:fillRect/>
+                </a:stretch>
+              </p:blipFill>
+              <p:spPr>
+                <a:xfrm>
+                  <a:off x="4838591" y="2327972"/>
+                  <a:ext cx="102240" cy="273240"/>
+                </a:xfrm>
+                <a:prstGeom prst="rect">
+                  <a:avLst/>
+                </a:prstGeom>
+              </p:spPr>
+            </p:pic>
+          </mc:Fallback>
+        </mc:AlternateContent>
+        <mc:AlternateContent xmlns:mc="http://schemas.openxmlformats.org/markup-compatibility/2006">
+          <mc:Choice xmlns:p14="http://schemas.microsoft.com/office/powerpoint/2010/main" Requires="p14">
+            <p:contentPart p14:bwMode="auto" r:id="rId20">
+              <p14:nvContentPartPr>
+                <p14:cNvPr id="19" name="Ink 18">
+                  <a:extLst>
+                    <a:ext uri="{FF2B5EF4-FFF2-40B4-BE49-F238E27FC236}">
+                      <a16:creationId xmlns:a16="http://schemas.microsoft.com/office/drawing/2014/main" id="{2E111F46-DB42-8854-449B-11741A68431E}"/>
+                    </a:ext>
+                  </a:extLst>
+                </p14:cNvPr>
+                <p14:cNvContentPartPr/>
+                <p14:nvPr/>
+              </p14:nvContentPartPr>
+              <p14:xfrm>
+                <a:off x="4962431" y="2144012"/>
+                <a:ext cx="545040" cy="402840"/>
+              </p14:xfrm>
+            </p:contentPart>
+          </mc:Choice>
+          <mc:Fallback>
+            <p:pic>
+              <p:nvPicPr>
+                <p:cNvPr id="19" name="Ink 18">
+                  <a:extLst>
+                    <a:ext uri="{FF2B5EF4-FFF2-40B4-BE49-F238E27FC236}">
+                      <a16:creationId xmlns:a16="http://schemas.microsoft.com/office/drawing/2014/main" id="{2E111F46-DB42-8854-449B-11741A68431E}"/>
+                    </a:ext>
+                  </a:extLst>
+                </p:cNvPr>
+                <p:cNvPicPr/>
+                <p:nvPr/>
+              </p:nvPicPr>
+              <p:blipFill>
+                <a:blip r:embed="rId21"/>
+                <a:stretch>
+                  <a:fillRect/>
+                </a:stretch>
+              </p:blipFill>
+              <p:spPr>
+                <a:xfrm>
+                  <a:off x="4954871" y="2136452"/>
+                  <a:ext cx="560160" cy="417960"/>
+                </a:xfrm>
+                <a:prstGeom prst="rect">
+                  <a:avLst/>
+                </a:prstGeom>
+              </p:spPr>
+            </p:pic>
+          </mc:Fallback>
+        </mc:AlternateContent>
+        <mc:AlternateContent xmlns:mc="http://schemas.openxmlformats.org/markup-compatibility/2006">
+          <mc:Choice xmlns:p14="http://schemas.microsoft.com/office/powerpoint/2010/main" Requires="p14">
+            <p:contentPart p14:bwMode="auto" r:id="rId22">
+              <p14:nvContentPartPr>
+                <p14:cNvPr id="23" name="Ink 22">
+                  <a:extLst>
+                    <a:ext uri="{FF2B5EF4-FFF2-40B4-BE49-F238E27FC236}">
+                      <a16:creationId xmlns:a16="http://schemas.microsoft.com/office/drawing/2014/main" id="{20FBBA81-638A-FF6C-0BBA-0334983DF93F}"/>
+                    </a:ext>
+                  </a:extLst>
+                </p14:cNvPr>
+                <p14:cNvContentPartPr/>
+                <p14:nvPr/>
+              </p14:nvContentPartPr>
+              <p14:xfrm>
+                <a:off x="5644631" y="2294492"/>
+                <a:ext cx="12240" cy="10080"/>
+              </p14:xfrm>
+            </p:contentPart>
+          </mc:Choice>
+          <mc:Fallback>
+            <p:pic>
+              <p:nvPicPr>
+                <p:cNvPr id="23" name="Ink 22">
+                  <a:extLst>
+                    <a:ext uri="{FF2B5EF4-FFF2-40B4-BE49-F238E27FC236}">
+                      <a16:creationId xmlns:a16="http://schemas.microsoft.com/office/drawing/2014/main" id="{20FBBA81-638A-FF6C-0BBA-0334983DF93F}"/>
+                    </a:ext>
+                  </a:extLst>
+                </p:cNvPr>
+                <p:cNvPicPr/>
+                <p:nvPr/>
+              </p:nvPicPr>
+              <p:blipFill>
+                <a:blip r:embed="rId23"/>
+                <a:stretch>
+                  <a:fillRect/>
+                </a:stretch>
+              </p:blipFill>
+              <p:spPr>
+                <a:xfrm>
+                  <a:off x="5637071" y="2286932"/>
+                  <a:ext cx="27360" cy="24840"/>
+                </a:xfrm>
+                <a:prstGeom prst="rect">
+                  <a:avLst/>
+                </a:prstGeom>
+              </p:spPr>
+            </p:pic>
+          </mc:Fallback>
+        </mc:AlternateContent>
+        <mc:AlternateContent xmlns:mc="http://schemas.openxmlformats.org/markup-compatibility/2006">
+          <mc:Choice xmlns:p14="http://schemas.microsoft.com/office/powerpoint/2010/main" Requires="p14">
+            <p:contentPart p14:bwMode="auto" r:id="rId24">
+              <p14:nvContentPartPr>
+                <p14:cNvPr id="25" name="Ink 24">
+                  <a:extLst>
+                    <a:ext uri="{FF2B5EF4-FFF2-40B4-BE49-F238E27FC236}">
+                      <a16:creationId xmlns:a16="http://schemas.microsoft.com/office/drawing/2014/main" id="{06413E8C-4D2E-2672-E937-15A19C0BAE8B}"/>
+                    </a:ext>
+                  </a:extLst>
+                </p14:cNvPr>
+                <p14:cNvContentPartPr/>
+                <p14:nvPr/>
+              </p14:nvContentPartPr>
+              <p14:xfrm>
+                <a:off x="4402271" y="1849172"/>
+                <a:ext cx="1504800" cy="770760"/>
+              </p14:xfrm>
+            </p:contentPart>
+          </mc:Choice>
+          <mc:Fallback>
+            <p:pic>
+              <p:nvPicPr>
+                <p:cNvPr id="25" name="Ink 24">
+                  <a:extLst>
+                    <a:ext uri="{FF2B5EF4-FFF2-40B4-BE49-F238E27FC236}">
+                      <a16:creationId xmlns:a16="http://schemas.microsoft.com/office/drawing/2014/main" id="{06413E8C-4D2E-2672-E937-15A19C0BAE8B}"/>
+                    </a:ext>
+                  </a:extLst>
+                </p:cNvPr>
+                <p:cNvPicPr/>
+                <p:nvPr/>
+              </p:nvPicPr>
+              <p:blipFill>
+                <a:blip r:embed="rId25"/>
+                <a:stretch>
+                  <a:fillRect/>
+                </a:stretch>
+              </p:blipFill>
+              <p:spPr>
+                <a:xfrm>
+                  <a:off x="4394711" y="1841612"/>
+                  <a:ext cx="1519920" cy="785880"/>
+                </a:xfrm>
+                <a:prstGeom prst="rect">
+                  <a:avLst/>
+                </a:prstGeom>
+              </p:spPr>
+            </p:pic>
+          </mc:Fallback>
+        </mc:AlternateContent>
+      </p:grpSp>
+      <p:grpSp>
+        <p:nvGrpSpPr>
+          <p:cNvPr id="38" name="Group 37">
+            <a:extLst>
+              <a:ext uri="{FF2B5EF4-FFF2-40B4-BE49-F238E27FC236}">
+                <a16:creationId xmlns:a16="http://schemas.microsoft.com/office/drawing/2014/main" id="{83DC958C-2CFA-0EF1-580C-2736232FAC84}"/>
+              </a:ext>
+            </a:extLst>
+          </p:cNvPr>
+          <p:cNvGrpSpPr/>
+          <p:nvPr/>
+        </p:nvGrpSpPr>
+        <p:grpSpPr>
+          <a:xfrm>
+            <a:off x="3928151" y="533732"/>
+            <a:ext cx="1335960" cy="347760"/>
+            <a:chOff x="3928151" y="533732"/>
+            <a:chExt cx="1335960" cy="347760"/>
+          </a:xfrm>
+        </p:grpSpPr>
+        <mc:AlternateContent xmlns:mc="http://schemas.openxmlformats.org/markup-compatibility/2006">
+          <mc:Choice xmlns:p14="http://schemas.microsoft.com/office/powerpoint/2010/main" Requires="p14">
+            <p:contentPart p14:bwMode="auto" r:id="rId26">
+              <p14:nvContentPartPr>
+                <p14:cNvPr id="27" name="Ink 26">
+                  <a:extLst>
+                    <a:ext uri="{FF2B5EF4-FFF2-40B4-BE49-F238E27FC236}">
+                      <a16:creationId xmlns:a16="http://schemas.microsoft.com/office/drawing/2014/main" id="{52D8BEAE-53A6-40C8-3704-3F9060927A34}"/>
+                    </a:ext>
+                  </a:extLst>
+                </p14:cNvPr>
+                <p14:cNvContentPartPr/>
+                <p14:nvPr/>
+              </p14:nvContentPartPr>
+              <p14:xfrm>
+                <a:off x="4026791" y="694652"/>
+                <a:ext cx="102240" cy="186840"/>
+              </p14:xfrm>
+            </p:contentPart>
+          </mc:Choice>
+          <mc:Fallback>
+            <p:pic>
+              <p:nvPicPr>
+                <p:cNvPr id="27" name="Ink 26">
+                  <a:extLst>
+                    <a:ext uri="{FF2B5EF4-FFF2-40B4-BE49-F238E27FC236}">
+                      <a16:creationId xmlns:a16="http://schemas.microsoft.com/office/drawing/2014/main" id="{52D8BEAE-53A6-40C8-3704-3F9060927A34}"/>
+                    </a:ext>
+                  </a:extLst>
+                </p:cNvPr>
+                <p:cNvPicPr/>
+                <p:nvPr/>
+              </p:nvPicPr>
+              <p:blipFill>
+                <a:blip r:embed="rId27"/>
+                <a:stretch>
+                  <a:fillRect/>
+                </a:stretch>
+              </p:blipFill>
+              <p:spPr>
+                <a:xfrm>
+                  <a:off x="4019591" y="687092"/>
+                  <a:ext cx="117360" cy="201960"/>
+                </a:xfrm>
+                <a:prstGeom prst="rect">
+                  <a:avLst/>
+                </a:prstGeom>
+              </p:spPr>
+            </p:pic>
+          </mc:Fallback>
+        </mc:AlternateContent>
+        <mc:AlternateContent xmlns:mc="http://schemas.openxmlformats.org/markup-compatibility/2006">
+          <mc:Choice xmlns:p14="http://schemas.microsoft.com/office/powerpoint/2010/main" Requires="p14">
+            <p:contentPart p14:bwMode="auto" r:id="rId28">
+              <p14:nvContentPartPr>
+                <p14:cNvPr id="28" name="Ink 27">
+                  <a:extLst>
+                    <a:ext uri="{FF2B5EF4-FFF2-40B4-BE49-F238E27FC236}">
+                      <a16:creationId xmlns:a16="http://schemas.microsoft.com/office/drawing/2014/main" id="{703D6108-D707-2A94-4B7D-B96684B1950A}"/>
+                    </a:ext>
+                  </a:extLst>
+                </p14:cNvPr>
+                <p14:cNvContentPartPr/>
+                <p14:nvPr/>
+              </p14:nvContentPartPr>
+              <p14:xfrm>
+                <a:off x="3928151" y="611492"/>
+                <a:ext cx="191160" cy="162000"/>
+              </p14:xfrm>
+            </p:contentPart>
+          </mc:Choice>
+          <mc:Fallback>
+            <p:pic>
+              <p:nvPicPr>
+                <p:cNvPr id="28" name="Ink 27">
+                  <a:extLst>
+                    <a:ext uri="{FF2B5EF4-FFF2-40B4-BE49-F238E27FC236}">
+                      <a16:creationId xmlns:a16="http://schemas.microsoft.com/office/drawing/2014/main" id="{703D6108-D707-2A94-4B7D-B96684B1950A}"/>
+                    </a:ext>
+                  </a:extLst>
+                </p:cNvPr>
+                <p:cNvPicPr/>
+                <p:nvPr/>
+              </p:nvPicPr>
+              <p:blipFill>
+                <a:blip r:embed="rId29"/>
+                <a:stretch>
+                  <a:fillRect/>
+                </a:stretch>
+              </p:blipFill>
+              <p:spPr>
+                <a:xfrm>
+                  <a:off x="3920591" y="604292"/>
+                  <a:ext cx="206280" cy="177120"/>
+                </a:xfrm>
+                <a:prstGeom prst="rect">
+                  <a:avLst/>
+                </a:prstGeom>
+              </p:spPr>
+            </p:pic>
+          </mc:Fallback>
+        </mc:AlternateContent>
+        <mc:AlternateContent xmlns:mc="http://schemas.openxmlformats.org/markup-compatibility/2006">
+          <mc:Choice xmlns:p14="http://schemas.microsoft.com/office/powerpoint/2010/main" Requires="p14">
+            <p:contentPart p14:bwMode="auto" r:id="rId30">
+              <p14:nvContentPartPr>
+                <p14:cNvPr id="29" name="Ink 28">
+                  <a:extLst>
+                    <a:ext uri="{FF2B5EF4-FFF2-40B4-BE49-F238E27FC236}">
+                      <a16:creationId xmlns:a16="http://schemas.microsoft.com/office/drawing/2014/main" id="{86143D9D-73BC-802C-DABE-310932524CE9}"/>
+                    </a:ext>
+                  </a:extLst>
+                </p14:cNvPr>
+                <p14:cNvContentPartPr/>
+                <p14:nvPr/>
+              </p14:nvContentPartPr>
+              <p14:xfrm>
+                <a:off x="4276271" y="572252"/>
+                <a:ext cx="268200" cy="280440"/>
+              </p14:xfrm>
+            </p:contentPart>
+          </mc:Choice>
+          <mc:Fallback>
+            <p:pic>
+              <p:nvPicPr>
+                <p:cNvPr id="29" name="Ink 28">
+                  <a:extLst>
+                    <a:ext uri="{FF2B5EF4-FFF2-40B4-BE49-F238E27FC236}">
+                      <a16:creationId xmlns:a16="http://schemas.microsoft.com/office/drawing/2014/main" id="{86143D9D-73BC-802C-DABE-310932524CE9}"/>
+                    </a:ext>
+                  </a:extLst>
+                </p:cNvPr>
+                <p:cNvPicPr/>
+                <p:nvPr/>
+              </p:nvPicPr>
+              <p:blipFill>
+                <a:blip r:embed="rId31"/>
+                <a:stretch>
+                  <a:fillRect/>
+                </a:stretch>
+              </p:blipFill>
+              <p:spPr>
+                <a:xfrm>
+                  <a:off x="4268711" y="564692"/>
+                  <a:ext cx="283320" cy="295560"/>
+                </a:xfrm>
+                <a:prstGeom prst="rect">
+                  <a:avLst/>
+                </a:prstGeom>
+              </p:spPr>
+            </p:pic>
+          </mc:Fallback>
+        </mc:AlternateContent>
+        <mc:AlternateContent xmlns:mc="http://schemas.openxmlformats.org/markup-compatibility/2006">
+          <mc:Choice xmlns:p14="http://schemas.microsoft.com/office/powerpoint/2010/main" Requires="p14">
+            <p:contentPart p14:bwMode="auto" r:id="rId32">
+              <p14:nvContentPartPr>
+                <p14:cNvPr id="30" name="Ink 29">
+                  <a:extLst>
+                    <a:ext uri="{FF2B5EF4-FFF2-40B4-BE49-F238E27FC236}">
+                      <a16:creationId xmlns:a16="http://schemas.microsoft.com/office/drawing/2014/main" id="{A5EEE675-655D-CDBA-93F6-9B2F8F4F2543}"/>
+                    </a:ext>
+                  </a:extLst>
+                </p14:cNvPr>
+                <p14:cNvContentPartPr/>
+                <p14:nvPr/>
+              </p14:nvContentPartPr>
+              <p14:xfrm>
+                <a:off x="4572911" y="654692"/>
+                <a:ext cx="110520" cy="129240"/>
+              </p14:xfrm>
+            </p:contentPart>
+          </mc:Choice>
+          <mc:Fallback>
+            <p:pic>
+              <p:nvPicPr>
+                <p:cNvPr id="30" name="Ink 29">
+                  <a:extLst>
+                    <a:ext uri="{FF2B5EF4-FFF2-40B4-BE49-F238E27FC236}">
+                      <a16:creationId xmlns:a16="http://schemas.microsoft.com/office/drawing/2014/main" id="{A5EEE675-655D-CDBA-93F6-9B2F8F4F2543}"/>
+                    </a:ext>
+                  </a:extLst>
+                </p:cNvPr>
+                <p:cNvPicPr/>
+                <p:nvPr/>
+              </p:nvPicPr>
+              <p:blipFill>
+                <a:blip r:embed="rId33"/>
+                <a:stretch>
+                  <a:fillRect/>
+                </a:stretch>
+              </p:blipFill>
+              <p:spPr>
+                <a:xfrm>
+                  <a:off x="4565351" y="647132"/>
+                  <a:ext cx="125280" cy="144000"/>
+                </a:xfrm>
+                <a:prstGeom prst="rect">
+                  <a:avLst/>
+                </a:prstGeom>
+              </p:spPr>
+            </p:pic>
+          </mc:Fallback>
+        </mc:AlternateContent>
+        <mc:AlternateContent xmlns:mc="http://schemas.openxmlformats.org/markup-compatibility/2006">
+          <mc:Choice xmlns:p14="http://schemas.microsoft.com/office/powerpoint/2010/main" Requires="p14">
+            <p:contentPart p14:bwMode="auto" r:id="rId34">
+              <p14:nvContentPartPr>
+                <p14:cNvPr id="31" name="Ink 30">
+                  <a:extLst>
+                    <a:ext uri="{FF2B5EF4-FFF2-40B4-BE49-F238E27FC236}">
+                      <a16:creationId xmlns:a16="http://schemas.microsoft.com/office/drawing/2014/main" id="{4755322E-7727-B176-0139-D56368FA4D07}"/>
+                    </a:ext>
+                  </a:extLst>
+                </p14:cNvPr>
+                <p14:cNvContentPartPr/>
+                <p14:nvPr/>
+              </p14:nvContentPartPr>
+              <p14:xfrm>
+                <a:off x="4729871" y="627332"/>
+                <a:ext cx="123840" cy="130680"/>
+              </p14:xfrm>
+            </p:contentPart>
+          </mc:Choice>
+          <mc:Fallback>
+            <p:pic>
+              <p:nvPicPr>
+                <p:cNvPr id="31" name="Ink 30">
+                  <a:extLst>
+                    <a:ext uri="{FF2B5EF4-FFF2-40B4-BE49-F238E27FC236}">
+                      <a16:creationId xmlns:a16="http://schemas.microsoft.com/office/drawing/2014/main" id="{4755322E-7727-B176-0139-D56368FA4D07}"/>
+                    </a:ext>
+                  </a:extLst>
+                </p:cNvPr>
+                <p:cNvPicPr/>
+                <p:nvPr/>
+              </p:nvPicPr>
+              <p:blipFill>
+                <a:blip r:embed="rId35"/>
+                <a:stretch>
+                  <a:fillRect/>
+                </a:stretch>
+              </p:blipFill>
+              <p:spPr>
+                <a:xfrm>
+                  <a:off x="4722311" y="619772"/>
+                  <a:ext cx="138960" cy="145800"/>
+                </a:xfrm>
+                <a:prstGeom prst="rect">
+                  <a:avLst/>
+                </a:prstGeom>
+              </p:spPr>
+            </p:pic>
+          </mc:Fallback>
+        </mc:AlternateContent>
+        <mc:AlternateContent xmlns:mc="http://schemas.openxmlformats.org/markup-compatibility/2006">
+          <mc:Choice xmlns:p14="http://schemas.microsoft.com/office/powerpoint/2010/main" Requires="p14">
+            <p:contentPart p14:bwMode="auto" r:id="rId36">
+              <p14:nvContentPartPr>
+                <p14:cNvPr id="32" name="Ink 31">
+                  <a:extLst>
+                    <a:ext uri="{FF2B5EF4-FFF2-40B4-BE49-F238E27FC236}">
+                      <a16:creationId xmlns:a16="http://schemas.microsoft.com/office/drawing/2014/main" id="{DCE3CA0F-9256-AC29-7916-5D2FCCF1470F}"/>
+                    </a:ext>
+                  </a:extLst>
+                </p14:cNvPr>
+                <p14:cNvContentPartPr/>
+                <p14:nvPr/>
+              </p14:nvContentPartPr>
+              <p14:xfrm>
+                <a:off x="4950551" y="599612"/>
+                <a:ext cx="42480" cy="197280"/>
+              </p14:xfrm>
+            </p:contentPart>
+          </mc:Choice>
+          <mc:Fallback>
+            <p:pic>
+              <p:nvPicPr>
+                <p:cNvPr id="32" name="Ink 31">
+                  <a:extLst>
+                    <a:ext uri="{FF2B5EF4-FFF2-40B4-BE49-F238E27FC236}">
+                      <a16:creationId xmlns:a16="http://schemas.microsoft.com/office/drawing/2014/main" id="{DCE3CA0F-9256-AC29-7916-5D2FCCF1470F}"/>
+                    </a:ext>
+                  </a:extLst>
+                </p:cNvPr>
+                <p:cNvPicPr/>
+                <p:nvPr/>
+              </p:nvPicPr>
+              <p:blipFill>
+                <a:blip r:embed="rId37"/>
+                <a:stretch>
+                  <a:fillRect/>
+                </a:stretch>
+              </p:blipFill>
+              <p:spPr>
+                <a:xfrm>
+                  <a:off x="4942991" y="592052"/>
+                  <a:ext cx="57600" cy="212400"/>
+                </a:xfrm>
+                <a:prstGeom prst="rect">
+                  <a:avLst/>
+                </a:prstGeom>
+              </p:spPr>
+            </p:pic>
+          </mc:Fallback>
+        </mc:AlternateContent>
+        <mc:AlternateContent xmlns:mc="http://schemas.openxmlformats.org/markup-compatibility/2006">
+          <mc:Choice xmlns:p14="http://schemas.microsoft.com/office/powerpoint/2010/main" Requires="p14">
+            <p:contentPart p14:bwMode="auto" r:id="rId38">
+              <p14:nvContentPartPr>
+                <p14:cNvPr id="33" name="Ink 32">
+                  <a:extLst>
+                    <a:ext uri="{FF2B5EF4-FFF2-40B4-BE49-F238E27FC236}">
+                      <a16:creationId xmlns:a16="http://schemas.microsoft.com/office/drawing/2014/main" id="{7701AAEC-9B11-B310-7C61-8CBB4D0492C5}"/>
+                    </a:ext>
+                  </a:extLst>
+                </p14:cNvPr>
+                <p14:cNvContentPartPr/>
+                <p14:nvPr/>
+              </p14:nvContentPartPr>
+              <p14:xfrm>
+                <a:off x="4959191" y="533732"/>
+                <a:ext cx="105480" cy="104760"/>
+              </p14:xfrm>
+            </p:contentPart>
+          </mc:Choice>
+          <mc:Fallback>
+            <p:pic>
+              <p:nvPicPr>
+                <p:cNvPr id="33" name="Ink 32">
+                  <a:extLst>
+                    <a:ext uri="{FF2B5EF4-FFF2-40B4-BE49-F238E27FC236}">
+                      <a16:creationId xmlns:a16="http://schemas.microsoft.com/office/drawing/2014/main" id="{7701AAEC-9B11-B310-7C61-8CBB4D0492C5}"/>
+                    </a:ext>
+                  </a:extLst>
+                </p:cNvPr>
+                <p:cNvPicPr/>
+                <p:nvPr/>
+              </p:nvPicPr>
+              <p:blipFill>
+                <a:blip r:embed="rId39"/>
+                <a:stretch>
+                  <a:fillRect/>
+                </a:stretch>
+              </p:blipFill>
+              <p:spPr>
+                <a:xfrm>
+                  <a:off x="4951631" y="526172"/>
+                  <a:ext cx="120600" cy="119880"/>
+                </a:xfrm>
+                <a:prstGeom prst="rect">
+                  <a:avLst/>
+                </a:prstGeom>
+              </p:spPr>
+            </p:pic>
+          </mc:Fallback>
+        </mc:AlternateContent>
+        <mc:AlternateContent xmlns:mc="http://schemas.openxmlformats.org/markup-compatibility/2006">
+          <mc:Choice xmlns:p14="http://schemas.microsoft.com/office/powerpoint/2010/main" Requires="p14">
+            <p:contentPart p14:bwMode="auto" r:id="rId40">
+              <p14:nvContentPartPr>
+                <p14:cNvPr id="34" name="Ink 33">
+                  <a:extLst>
+                    <a:ext uri="{FF2B5EF4-FFF2-40B4-BE49-F238E27FC236}">
+                      <a16:creationId xmlns:a16="http://schemas.microsoft.com/office/drawing/2014/main" id="{07E8AD0B-6D37-2D93-40F9-B84FCB8D31A3}"/>
+                    </a:ext>
+                  </a:extLst>
+                </p14:cNvPr>
+                <p14:cNvContentPartPr/>
+                <p14:nvPr/>
+              </p14:nvContentPartPr>
+              <p14:xfrm>
+                <a:off x="4991951" y="673772"/>
+                <a:ext cx="116640" cy="48240"/>
+              </p14:xfrm>
+            </p:contentPart>
+          </mc:Choice>
+          <mc:Fallback>
+            <p:pic>
+              <p:nvPicPr>
+                <p:cNvPr id="34" name="Ink 33">
+                  <a:extLst>
+                    <a:ext uri="{FF2B5EF4-FFF2-40B4-BE49-F238E27FC236}">
+                      <a16:creationId xmlns:a16="http://schemas.microsoft.com/office/drawing/2014/main" id="{07E8AD0B-6D37-2D93-40F9-B84FCB8D31A3}"/>
+                    </a:ext>
+                  </a:extLst>
+                </p:cNvPr>
+                <p:cNvPicPr/>
+                <p:nvPr/>
+              </p:nvPicPr>
+              <p:blipFill>
+                <a:blip r:embed="rId41"/>
+                <a:stretch>
+                  <a:fillRect/>
+                </a:stretch>
+              </p:blipFill>
+              <p:spPr>
+                <a:xfrm>
+                  <a:off x="4984391" y="666212"/>
+                  <a:ext cx="131760" cy="63360"/>
+                </a:xfrm>
+                <a:prstGeom prst="rect">
+                  <a:avLst/>
+                </a:prstGeom>
+              </p:spPr>
+            </p:pic>
+          </mc:Fallback>
+        </mc:AlternateContent>
+        <mc:AlternateContent xmlns:mc="http://schemas.openxmlformats.org/markup-compatibility/2006">
+          <mc:Choice xmlns:p14="http://schemas.microsoft.com/office/powerpoint/2010/main" Requires="p14">
+            <p:contentPart p14:bwMode="auto" r:id="rId42">
+              <p14:nvContentPartPr>
+                <p14:cNvPr id="35" name="Ink 34">
+                  <a:extLst>
+                    <a:ext uri="{FF2B5EF4-FFF2-40B4-BE49-F238E27FC236}">
+                      <a16:creationId xmlns:a16="http://schemas.microsoft.com/office/drawing/2014/main" id="{ACD9BE88-FF2E-15D6-2322-67E458AE7CD6}"/>
+                    </a:ext>
+                  </a:extLst>
+                </p14:cNvPr>
+                <p14:cNvContentPartPr/>
+                <p14:nvPr/>
+              </p14:nvContentPartPr>
+              <p14:xfrm>
+                <a:off x="5194991" y="618692"/>
+                <a:ext cx="42480" cy="46800"/>
+              </p14:xfrm>
+            </p:contentPart>
+          </mc:Choice>
+          <mc:Fallback>
+            <p:pic>
+              <p:nvPicPr>
+                <p:cNvPr id="35" name="Ink 34">
+                  <a:extLst>
+                    <a:ext uri="{FF2B5EF4-FFF2-40B4-BE49-F238E27FC236}">
+                      <a16:creationId xmlns:a16="http://schemas.microsoft.com/office/drawing/2014/main" id="{ACD9BE88-FF2E-15D6-2322-67E458AE7CD6}"/>
+                    </a:ext>
+                  </a:extLst>
+                </p:cNvPr>
+                <p:cNvPicPr/>
+                <p:nvPr/>
+              </p:nvPicPr>
+              <p:blipFill>
+                <a:blip r:embed="rId43"/>
+                <a:stretch>
+                  <a:fillRect/>
+                </a:stretch>
+              </p:blipFill>
+              <p:spPr>
+                <a:xfrm>
+                  <a:off x="5187791" y="611132"/>
+                  <a:ext cx="57600" cy="61920"/>
+                </a:xfrm>
+                <a:prstGeom prst="rect">
+                  <a:avLst/>
+                </a:prstGeom>
+              </p:spPr>
+            </p:pic>
+          </mc:Fallback>
+        </mc:AlternateContent>
+        <mc:AlternateContent xmlns:mc="http://schemas.openxmlformats.org/markup-compatibility/2006">
+          <mc:Choice xmlns:p14="http://schemas.microsoft.com/office/powerpoint/2010/main" Requires="p14">
+            <p:contentPart p14:bwMode="auto" r:id="rId44">
+              <p14:nvContentPartPr>
+                <p14:cNvPr id="36" name="Ink 35">
+                  <a:extLst>
+                    <a:ext uri="{FF2B5EF4-FFF2-40B4-BE49-F238E27FC236}">
+                      <a16:creationId xmlns:a16="http://schemas.microsoft.com/office/drawing/2014/main" id="{EB50BE77-5D96-C4F3-3239-6060BF2C6757}"/>
+                    </a:ext>
+                  </a:extLst>
+                </p14:cNvPr>
+                <p14:cNvContentPartPr/>
+                <p14:nvPr/>
+              </p14:nvContentPartPr>
+              <p14:xfrm>
+                <a:off x="5252591" y="812372"/>
+                <a:ext cx="11520" cy="10080"/>
+              </p14:xfrm>
+            </p:contentPart>
+          </mc:Choice>
+          <mc:Fallback>
+            <p:pic>
+              <p:nvPicPr>
+                <p:cNvPr id="36" name="Ink 35">
+                  <a:extLst>
+                    <a:ext uri="{FF2B5EF4-FFF2-40B4-BE49-F238E27FC236}">
+                      <a16:creationId xmlns:a16="http://schemas.microsoft.com/office/drawing/2014/main" id="{EB50BE77-5D96-C4F3-3239-6060BF2C6757}"/>
+                    </a:ext>
+                  </a:extLst>
+                </p:cNvPr>
+                <p:cNvPicPr/>
+                <p:nvPr/>
+              </p:nvPicPr>
+              <p:blipFill>
+                <a:blip r:embed="rId45"/>
+                <a:stretch>
+                  <a:fillRect/>
+                </a:stretch>
+              </p:blipFill>
+              <p:spPr>
+                <a:xfrm>
+                  <a:off x="5245031" y="804812"/>
+                  <a:ext cx="26280" cy="24840"/>
+                </a:xfrm>
+                <a:prstGeom prst="rect">
+                  <a:avLst/>
+                </a:prstGeom>
+              </p:spPr>
+            </p:pic>
+          </mc:Fallback>
+        </mc:AlternateContent>
+      </p:grpSp>
+      <mc:AlternateContent xmlns:mc="http://schemas.openxmlformats.org/markup-compatibility/2006">
+        <mc:Choice xmlns:p14="http://schemas.microsoft.com/office/powerpoint/2010/main" Requires="p14">
+          <p:contentPart p14:bwMode="auto" r:id="rId46">
+            <p14:nvContentPartPr>
+              <p14:cNvPr id="37" name="Ink 36">
+                <a:extLst>
+                  <a:ext uri="{FF2B5EF4-FFF2-40B4-BE49-F238E27FC236}">
+                    <a16:creationId xmlns:a16="http://schemas.microsoft.com/office/drawing/2014/main" id="{98009025-476B-05B4-5128-3CECC75FCB72}"/>
+                  </a:ext>
+                </a:extLst>
+              </p14:cNvPr>
+              <p14:cNvContentPartPr/>
+              <p14:nvPr/>
+            </p14:nvContentPartPr>
+            <p14:xfrm>
+              <a:off x="4173671" y="990212"/>
+              <a:ext cx="1234800" cy="79920"/>
+            </p14:xfrm>
+          </p:contentPart>
+        </mc:Choice>
+        <mc:Fallback>
+          <p:pic>
+            <p:nvPicPr>
+              <p:cNvPr id="37" name="Ink 36">
+                <a:extLst>
+                  <a:ext uri="{FF2B5EF4-FFF2-40B4-BE49-F238E27FC236}">
+                    <a16:creationId xmlns:a16="http://schemas.microsoft.com/office/drawing/2014/main" id="{98009025-476B-05B4-5128-3CECC75FCB72}"/>
+                  </a:ext>
+                </a:extLst>
+              </p:cNvPr>
+              <p:cNvPicPr/>
+              <p:nvPr/>
+            </p:nvPicPr>
+            <p:blipFill>
+              <a:blip r:embed="rId47"/>
+              <a:stretch>
+                <a:fillRect/>
+              </a:stretch>
+            </p:blipFill>
+            <p:spPr>
+              <a:xfrm>
+                <a:off x="4166111" y="982652"/>
+                <a:ext cx="1249920" cy="95040"/>
+              </a:xfrm>
+              <a:prstGeom prst="rect">
+                <a:avLst/>
+              </a:prstGeom>
+            </p:spPr>
+          </p:pic>
+        </mc:Fallback>
+      </mc:AlternateContent>
+      <p:sp>
+        <p:nvSpPr>
+          <p:cNvPr id="39" name="Rectangle 38">
+            <a:extLst>
+              <a:ext uri="{FF2B5EF4-FFF2-40B4-BE49-F238E27FC236}">
+                <a16:creationId xmlns:a16="http://schemas.microsoft.com/office/drawing/2014/main" id="{0231EB07-37B0-B665-15B4-BA3B397B675F}"/>
+              </a:ext>
+            </a:extLst>
+          </p:cNvPr>
+          <p:cNvSpPr/>
+          <p:nvPr/>
+        </p:nvSpPr>
+        <p:spPr>
+          <a:xfrm>
+            <a:off x="6400800" y="480060"/>
+            <a:ext cx="3859306" cy="783964"/>
+          </a:xfrm>
+          <a:prstGeom prst="rect">
+            <a:avLst/>
+          </a:prstGeom>
+          <a:solidFill>
+            <a:schemeClr val="bg1"/>
+          </a:solidFill>
+          <a:ln>
+            <a:noFill/>
+          </a:ln>
+        </p:spPr>
+        <p:style>
+          <a:lnRef idx="2">
+            <a:schemeClr val="accent1">
+              <a:shade val="50000"/>
+            </a:schemeClr>
+          </a:lnRef>
+          <a:fillRef idx="1">
+            <a:schemeClr val="accent1"/>
+          </a:fillRef>
+          <a:effectRef idx="0">
+            <a:schemeClr val="accent1"/>
+          </a:effectRef>
+          <a:fontRef idx="minor">
+            <a:schemeClr val="lt1"/>
+          </a:fontRef>
+        </p:style>
+        <p:txBody>
+          <a:bodyPr rtlCol="0" anchor="ctr"/>
+          <a:lstStyle/>
+          <a:p>
+            <a:pPr algn="ctr"/>
+            <a:endParaRPr lang="en-US"/>
+          </a:p>
+        </p:txBody>
+      </p:sp>
+    </p:spTree>
+    <p:extLst>
+      <p:ext uri="{BB962C8B-B14F-4D97-AF65-F5344CB8AC3E}">
+        <p14:creationId xmlns:p14="http://schemas.microsoft.com/office/powerpoint/2010/main" val="283520634"/>
+      </p:ext>
+    </p:extLst>
+  </p:cSld>
+  <p:clrMapOvr>
+    <a:masterClrMapping/>
+  </p:clrMapOvr>
+</p:sld>
+</file>
+
+<file path=ppt/slides/slide9.xml><?xml version="1.0" encoding="utf-8"?>
+<p:sld xmlns:a="http://schemas.openxmlformats.org/drawingml/2006/main" xmlns:r="http://schemas.openxmlformats.org/officeDocument/2006/relationships" xmlns:p="http://schemas.openxmlformats.org/presentationml/2006/main">
+  <p:cSld>
+    <p:spTree>
+      <p:nvGrpSpPr>
+        <p:cNvPr id="1" name=""/>
+        <p:cNvGrpSpPr/>
+        <p:nvPr/>
+      </p:nvGrpSpPr>
+      <p:grpSpPr>
+        <a:xfrm>
+          <a:off x="0" y="0"/>
+          <a:ext cx="0" cy="0"/>
+          <a:chOff x="0" y="0"/>
+          <a:chExt cx="0" cy="0"/>
+        </a:xfrm>
+      </p:grpSpPr>
+      <p:sp>
+        <p:nvSpPr>
+          <p:cNvPr id="4" name="TextBox 3">
+            <a:extLst>
+              <a:ext uri="{FF2B5EF4-FFF2-40B4-BE49-F238E27FC236}">
+                <a16:creationId xmlns:a16="http://schemas.microsoft.com/office/drawing/2014/main" id="{D5050B6B-3846-9A2B-7BC3-45612652DBCE}"/>
+              </a:ext>
+            </a:extLst>
+          </p:cNvPr>
+          <p:cNvSpPr txBox="1"/>
+          <p:nvPr/>
+        </p:nvSpPr>
+        <p:spPr>
+          <a:xfrm>
+            <a:off x="3260558" y="2967335"/>
+            <a:ext cx="5670884" cy="923330"/>
+          </a:xfrm>
+          <a:prstGeom prst="rect">
+            <a:avLst/>
+          </a:prstGeom>
+          <a:solidFill>
+            <a:srgbClr val="C00000"/>
+          </a:solidFill>
+          <a:ln>
+            <a:solidFill>
+              <a:srgbClr val="C00000"/>
+            </a:solidFill>
+          </a:ln>
+          <a:effectLst>
+            <a:outerShdw blurRad="50800" dist="38100" dir="2700000" algn="tl" rotWithShape="0">
+              <a:prstClr val="black">
+                <a:alpha val="40000"/>
+              </a:prstClr>
+            </a:outerShdw>
+          </a:effectLst>
+        </p:spPr>
+        <p:txBody>
+          <a:bodyPr wrap="square" rtlCol="0">
+            <a:spAutoFit/>
+          </a:bodyPr>
+          <a:lstStyle/>
+          <a:p>
+            <a:pPr algn="ctr"/>
+            <a:r>
+              <a:rPr lang="en-US" sz="5400" dirty="0">
+                <a:solidFill>
+                  <a:schemeClr val="bg1">
+                    <a:lumMod val="95000"/>
+                  </a:schemeClr>
+                </a:solidFill>
+                <a:latin typeface="Segoe UI" panose="020B0502040204020203" pitchFamily="34" charset="0"/>
+                <a:cs typeface="Segoe UI" panose="020B0502040204020203" pitchFamily="34" charset="0"/>
+              </a:rPr>
+              <a:t>Remove Liquidity</a:t>
+            </a:r>
+          </a:p>
+        </p:txBody>
+      </p:sp>
+    </p:spTree>
+    <p:extLst>
+      <p:ext uri="{BB962C8B-B14F-4D97-AF65-F5344CB8AC3E}">
+        <p14:creationId xmlns:p14="http://schemas.microsoft.com/office/powerpoint/2010/main" val="2868943526"/>
       </p:ext>
     </p:extLst>
   </p:cSld>

</xml_diff>